<commit_message>
made edits to the powerpoint presentation
</commit_message>
<xml_diff>
--- a/PowerPoint Presentation/GrowthPlot_Presentation.pptx
+++ b/PowerPoint Presentation/GrowthPlot_Presentation.pptx
@@ -13,12 +13,13 @@
     <p:sldId id="261" r:id="rId7"/>
     <p:sldId id="263" r:id="rId8"/>
     <p:sldId id="266" r:id="rId9"/>
-    <p:sldId id="264" r:id="rId10"/>
-    <p:sldId id="265" r:id="rId11"/>
-    <p:sldId id="267" r:id="rId12"/>
-    <p:sldId id="269" r:id="rId13"/>
-    <p:sldId id="259" r:id="rId14"/>
-    <p:sldId id="260" r:id="rId15"/>
+    <p:sldId id="270" r:id="rId10"/>
+    <p:sldId id="264" r:id="rId11"/>
+    <p:sldId id="265" r:id="rId12"/>
+    <p:sldId id="267" r:id="rId13"/>
+    <p:sldId id="269" r:id="rId14"/>
+    <p:sldId id="259" r:id="rId15"/>
+    <p:sldId id="260" r:id="rId16"/>
   </p:sldIdLst>
   <p:sldSz cx="9144000" cy="6858000" type="screen4x3"/>
   <p:notesSz cx="6858000" cy="9144000"/>
@@ -3126,7 +3127,7 @@
           <a:p>
             <a:r>
               <a:rPr lang="en-US" dirty="0" smtClean="0"/>
-              <a:t>Applications</a:t>
+              <a:t>Impact</a:t>
             </a:r>
             <a:endParaRPr lang="en-US" dirty="0"/>
           </a:p>
@@ -3147,7 +3148,17 @@
           <a:bodyPr/>
           <a:lstStyle/>
           <a:p>
-            <a:endParaRPr lang="en-US"/>
+            <a:r>
+              <a:rPr lang="en-US" dirty="0" smtClean="0"/>
+              <a:t>Having accurate growth data available to families and clinicians</a:t>
+            </a:r>
+          </a:p>
+          <a:p>
+            <a:r>
+              <a:rPr lang="en-US" dirty="0" smtClean="0"/>
+              <a:t>(example)</a:t>
+            </a:r>
+            <a:endParaRPr lang="en-US" dirty="0"/>
           </a:p>
         </p:txBody>
       </p:sp>
@@ -3229,7 +3240,7 @@
           <a:p>
             <a:r>
               <a:rPr lang="en-US" dirty="0" smtClean="0"/>
-              <a:t>Future</a:t>
+              <a:t>Applications</a:t>
             </a:r>
             <a:endParaRPr lang="en-US" dirty="0"/>
           </a:p>
@@ -3250,7 +3261,23 @@
           <a:bodyPr/>
           <a:lstStyle/>
           <a:p>
-            <a:endParaRPr lang="en-US"/>
+            <a:r>
+              <a:rPr lang="en-US" dirty="0" smtClean="0"/>
+              <a:t>Open source project</a:t>
+            </a:r>
+          </a:p>
+          <a:p>
+            <a:pPr lvl="1"/>
+            <a:r>
+              <a:rPr lang="en-US" dirty="0" smtClean="0"/>
+              <a:t>able to integrate with other health-focused applications</a:t>
+            </a:r>
+          </a:p>
+          <a:p>
+            <a:pPr lvl="1">
+              <a:buNone/>
+            </a:pPr>
+            <a:endParaRPr lang="en-US" dirty="0"/>
           </a:p>
         </p:txBody>
       </p:sp>
@@ -3322,6 +3349,109 @@
         </p:nvSpPr>
         <p:spPr>
           <a:xfrm>
+            <a:off x="2173480" y="274638"/>
+            <a:ext cx="6513319" cy="1143000"/>
+          </a:xfrm>
+        </p:spPr>
+        <p:txBody>
+          <a:bodyPr/>
+          <a:lstStyle/>
+          <a:p>
+            <a:r>
+              <a:rPr lang="en-US" dirty="0" smtClean="0"/>
+              <a:t>Future</a:t>
+            </a:r>
+            <a:endParaRPr lang="en-US" dirty="0"/>
+          </a:p>
+        </p:txBody>
+      </p:sp>
+      <p:sp>
+        <p:nvSpPr>
+          <p:cNvPr id="3" name="Content Placeholder 2"/>
+          <p:cNvSpPr>
+            <a:spLocks noGrp="1"/>
+          </p:cNvSpPr>
+          <p:nvPr>
+            <p:ph idx="1"/>
+          </p:nvPr>
+        </p:nvSpPr>
+        <p:spPr/>
+        <p:txBody>
+          <a:bodyPr/>
+          <a:lstStyle/>
+          <a:p>
+            <a:endParaRPr lang="en-US" dirty="0"/>
+          </a:p>
+        </p:txBody>
+      </p:sp>
+      <p:pic>
+        <p:nvPicPr>
+          <p:cNvPr id="4" name="Picture 3" descr="Logo_Login.png"/>
+          <p:cNvPicPr>
+            <a:picLocks noChangeAspect="1"/>
+          </p:cNvPicPr>
+          <p:nvPr/>
+        </p:nvPicPr>
+        <p:blipFill>
+          <a:blip r:embed="rId2"/>
+          <a:stretch>
+            <a:fillRect/>
+          </a:stretch>
+        </p:blipFill>
+        <p:spPr>
+          <a:xfrm>
+            <a:off x="432095" y="366633"/>
+            <a:ext cx="1584249" cy="990156"/>
+          </a:xfrm>
+          <a:prstGeom prst="rect">
+            <a:avLst/>
+          </a:prstGeom>
+        </p:spPr>
+      </p:pic>
+    </p:spTree>
+  </p:cSld>
+  <p:clrMapOvr>
+    <a:masterClrMapping/>
+  </p:clrMapOvr>
+  <p:timing>
+    <p:tnLst>
+      <p:par>
+        <p:cTn id="1" dur="indefinite" restart="never" nodeType="tmRoot"/>
+      </p:par>
+    </p:tnLst>
+  </p:timing>
+</p:sld>
+</file>
+
+<file path=ppt/slides/slide13.xml><?xml version="1.0" encoding="utf-8"?>
+<p:sld xmlns:a="http://schemas.openxmlformats.org/drawingml/2006/main" xmlns:r="http://schemas.openxmlformats.org/officeDocument/2006/relationships" xmlns:mc="http://schemas.openxmlformats.org/markup-compatibility/2006" xmlns:mv="urn:schemas-microsoft-com:mac:vml" xmlns:p="http://schemas.openxmlformats.org/presentationml/2006/main" mc:Ignorable="mv" mc:PreserveAttributes="mv:*">
+  <p:cSld>
+    <p:spTree>
+      <p:nvGrpSpPr>
+        <p:cNvPr id="1" name=""/>
+        <p:cNvGrpSpPr/>
+        <p:nvPr/>
+      </p:nvGrpSpPr>
+      <p:grpSpPr>
+        <a:xfrm>
+          <a:off x="0" y="0"/>
+          <a:ext cx="0" cy="0"/>
+          <a:chOff x="0" y="0"/>
+          <a:chExt cx="0" cy="0"/>
+        </a:xfrm>
+      </p:grpSpPr>
+      <p:sp>
+        <p:nvSpPr>
+          <p:cNvPr id="2" name="Title 1"/>
+          <p:cNvSpPr>
+            <a:spLocks noGrp="1"/>
+          </p:cNvSpPr>
+          <p:nvPr>
+            <p:ph type="title"/>
+          </p:nvPr>
+        </p:nvSpPr>
+        <p:spPr>
+          <a:xfrm>
             <a:off x="2173480" y="2710122"/>
             <a:ext cx="6513319" cy="1143000"/>
           </a:xfrm>
@@ -3377,7 +3507,7 @@
 </p:sld>
 </file>
 
-<file path=ppt/slides/slide13.xml><?xml version="1.0" encoding="utf-8"?>
+<file path=ppt/slides/slide14.xml><?xml version="1.0" encoding="utf-8"?>
 <p:sld xmlns:a="http://schemas.openxmlformats.org/drawingml/2006/main" xmlns:r="http://schemas.openxmlformats.org/officeDocument/2006/relationships" xmlns:mc="http://schemas.openxmlformats.org/markup-compatibility/2006" xmlns:mv="urn:schemas-microsoft-com:mac:vml" xmlns:p="http://schemas.openxmlformats.org/presentationml/2006/main" mc:Ignorable="mv" mc:PreserveAttributes="mv:*">
   <p:cSld>
     <p:spTree>
@@ -3447,7 +3577,7 @@
 </p:sld>
 </file>
 
-<file path=ppt/slides/slide14.xml><?xml version="1.0" encoding="utf-8"?>
+<file path=ppt/slides/slide15.xml><?xml version="1.0" encoding="utf-8"?>
 <p:sld xmlns:a="http://schemas.openxmlformats.org/drawingml/2006/main" xmlns:r="http://schemas.openxmlformats.org/officeDocument/2006/relationships" xmlns:mc="http://schemas.openxmlformats.org/markup-compatibility/2006" xmlns:mv="urn:schemas-microsoft-com:mac:vml" xmlns:p="http://schemas.openxmlformats.org/presentationml/2006/main" mc:Ignorable="mv" mc:PreserveAttributes="mv:*">
   <p:cSld>
     <p:spTree>
@@ -3630,10 +3760,50 @@
         </p:nvSpPr>
         <p:spPr/>
         <p:txBody>
-          <a:bodyPr/>
-          <a:lstStyle/>
-          <a:p>
-            <a:endParaRPr lang="en-US"/>
+          <a:bodyPr>
+            <a:normAutofit/>
+          </a:bodyPr>
+          <a:lstStyle/>
+          <a:p>
+            <a:r>
+              <a:rPr lang="en-US" dirty="0" smtClean="0"/>
+              <a:t>Appropriate growth is a measure of good health</a:t>
+            </a:r>
+          </a:p>
+          <a:p>
+            <a:r>
+              <a:rPr lang="en-US" dirty="0" smtClean="0"/>
+              <a:t>This involves serially measuring and tracking:</a:t>
+            </a:r>
+          </a:p>
+          <a:p>
+            <a:pPr lvl="1"/>
+            <a:r>
+              <a:rPr lang="en-US" dirty="0" smtClean="0"/>
+              <a:t>length/height</a:t>
+            </a:r>
+          </a:p>
+          <a:p>
+            <a:pPr lvl="1"/>
+            <a:r>
+              <a:rPr lang="en-US" dirty="0" smtClean="0"/>
+              <a:t>head circumference</a:t>
+            </a:r>
+          </a:p>
+          <a:p>
+            <a:pPr lvl="1"/>
+            <a:r>
+              <a:rPr lang="en-US" dirty="0" smtClean="0"/>
+              <a:t>weight</a:t>
+            </a:r>
+          </a:p>
+          <a:p>
+            <a:pPr lvl="1"/>
+            <a:r>
+              <a:rPr lang="en-US" dirty="0" smtClean="0"/>
+              <a:t>BMI</a:t>
+            </a:r>
+            <a:endParaRPr lang="en-US" dirty="0"/>
           </a:p>
         </p:txBody>
       </p:sp>
@@ -3731,12 +3901,21 @@
             <p:ph idx="1"/>
           </p:nvPr>
         </p:nvSpPr>
-        <p:spPr/>
-        <p:txBody>
-          <a:bodyPr/>
-          <a:lstStyle/>
-          <a:p>
-            <a:endParaRPr lang="en-US"/>
+        <p:spPr>
+          <a:xfrm>
+            <a:off x="4954158" y="1600200"/>
+            <a:ext cx="3732641" cy="4525963"/>
+          </a:xfrm>
+        </p:spPr>
+        <p:txBody>
+          <a:bodyPr/>
+          <a:lstStyle/>
+          <a:p>
+            <a:r>
+              <a:rPr lang="en-US" dirty="0" smtClean="0"/>
+              <a:t>INSERT PIC OF PAPER CHART</a:t>
+            </a:r>
+            <a:endParaRPr lang="en-US" dirty="0"/>
           </a:p>
         </p:txBody>
       </p:sp>
@@ -3764,6 +3943,200 @@
           </a:prstGeom>
         </p:spPr>
       </p:pic>
+      <p:sp>
+        <p:nvSpPr>
+          <p:cNvPr id="5" name="Content Placeholder 2"/>
+          <p:cNvSpPr txBox="1">
+            <a:spLocks/>
+          </p:cNvSpPr>
+          <p:nvPr/>
+        </p:nvSpPr>
+        <p:spPr>
+          <a:xfrm>
+            <a:off x="851251" y="1600200"/>
+            <a:ext cx="3732641" cy="4525963"/>
+          </a:xfrm>
+          <a:prstGeom prst="rect">
+            <a:avLst/>
+          </a:prstGeom>
+        </p:spPr>
+        <p:txBody>
+          <a:bodyPr vert="horz" lIns="91440" tIns="45720" rIns="91440" bIns="45720" rtlCol="0">
+            <a:normAutofit fontScale="92500" lnSpcReduction="10000"/>
+          </a:bodyPr>
+          <a:lstStyle/>
+          <a:p>
+            <a:pPr marL="342900" marR="0" lvl="0" indent="-342900" algn="l" defTabSz="457200" rtl="0" eaLnBrk="1" fontAlgn="auto" latinLnBrk="0" hangingPunct="1">
+              <a:lnSpc>
+                <a:spcPct val="100000"/>
+              </a:lnSpc>
+              <a:spcBef>
+                <a:spcPct val="20000"/>
+              </a:spcBef>
+              <a:spcAft>
+                <a:spcPts val="0"/>
+              </a:spcAft>
+              <a:buClrTx/>
+              <a:buSzTx/>
+              <a:buFont typeface="Arial"/>
+              <a:buChar char="•"/>
+              <a:tabLst/>
+              <a:defRPr/>
+            </a:pPr>
+            <a:r>
+              <a:rPr lang="en-US" sz="3200" dirty="0" smtClean="0"/>
+              <a:t>Current charts are:</a:t>
+            </a:r>
+            <a:endParaRPr lang="en-US" sz="2800" dirty="0" smtClean="0">
+              <a:solidFill>
+                <a:prstClr val="black"/>
+              </a:solidFill>
+            </a:endParaRPr>
+          </a:p>
+          <a:p>
+            <a:pPr marL="742950" lvl="1" indent="-285750">
+              <a:spcBef>
+                <a:spcPct val="20000"/>
+              </a:spcBef>
+              <a:buFont typeface="Arial"/>
+              <a:buChar char="–"/>
+            </a:pPr>
+            <a:r>
+              <a:rPr lang="en-US" sz="2800" dirty="0">
+                <a:solidFill>
+                  <a:prstClr val="black"/>
+                </a:solidFill>
+              </a:rPr>
+              <a:t>hard-to-plot </a:t>
+            </a:r>
+          </a:p>
+          <a:p>
+            <a:pPr marL="742950" lvl="1" indent="-285750">
+              <a:spcBef>
+                <a:spcPct val="20000"/>
+              </a:spcBef>
+              <a:buFont typeface="Arial"/>
+              <a:buChar char="–"/>
+            </a:pPr>
+            <a:r>
+              <a:rPr lang="en-US" sz="2800" dirty="0" smtClean="0">
+                <a:solidFill>
+                  <a:prstClr val="black"/>
+                </a:solidFill>
+              </a:rPr>
+              <a:t>hard-to-read</a:t>
+            </a:r>
+          </a:p>
+          <a:p>
+            <a:pPr marL="1200150" lvl="2" indent="-285750">
+              <a:spcBef>
+                <a:spcPct val="20000"/>
+              </a:spcBef>
+              <a:buFont typeface="Arial"/>
+              <a:buChar char="–"/>
+            </a:pPr>
+            <a:r>
+              <a:rPr lang="en-US" sz="2800" dirty="0">
+                <a:solidFill>
+                  <a:prstClr val="black"/>
+                </a:solidFill>
+              </a:rPr>
+              <a:t>does not provide exact </a:t>
+            </a:r>
+            <a:r>
+              <a:rPr lang="en-US" sz="2800" dirty="0" smtClean="0">
+                <a:solidFill>
+                  <a:prstClr val="black"/>
+                </a:solidFill>
+              </a:rPr>
+              <a:t>percentiles</a:t>
+            </a:r>
+          </a:p>
+          <a:p>
+            <a:pPr marL="742950" lvl="1" indent="-285750">
+              <a:spcBef>
+                <a:spcPct val="20000"/>
+              </a:spcBef>
+              <a:buFont typeface="Arial"/>
+              <a:buChar char="–"/>
+            </a:pPr>
+            <a:r>
+              <a:rPr lang="en-US" sz="2800" dirty="0" smtClean="0">
+                <a:solidFill>
+                  <a:prstClr val="black"/>
+                </a:solidFill>
+              </a:rPr>
+              <a:t>not available to the families</a:t>
+            </a:r>
+          </a:p>
+          <a:p>
+            <a:pPr marL="742950" lvl="1" indent="-285750">
+              <a:spcBef>
+                <a:spcPct val="20000"/>
+              </a:spcBef>
+              <a:buFont typeface="Arial"/>
+              <a:buChar char="–"/>
+            </a:pPr>
+            <a:r>
+              <a:rPr lang="en-US" sz="2800" dirty="0" smtClean="0">
+                <a:solidFill>
+                  <a:prstClr val="black"/>
+                </a:solidFill>
+              </a:rPr>
+              <a:t>incomplete</a:t>
+            </a:r>
+          </a:p>
+          <a:p>
+            <a:pPr marL="1200150" lvl="2" indent="-285750">
+              <a:spcBef>
+                <a:spcPct val="20000"/>
+              </a:spcBef>
+              <a:buFont typeface="Arial"/>
+              <a:buChar char="–"/>
+            </a:pPr>
+            <a:r>
+              <a:rPr lang="en-US" sz="2800" dirty="0" smtClean="0">
+                <a:solidFill>
+                  <a:prstClr val="black"/>
+                </a:solidFill>
+              </a:rPr>
+              <a:t>living in different places</a:t>
+            </a:r>
+          </a:p>
+          <a:p>
+            <a:pPr marL="1200150" lvl="2" indent="-285750">
+              <a:spcBef>
+                <a:spcPct val="20000"/>
+              </a:spcBef>
+              <a:buFont typeface="Arial"/>
+              <a:buChar char="–"/>
+            </a:pPr>
+            <a:endParaRPr lang="en-US" sz="2800" dirty="0" smtClean="0">
+              <a:solidFill>
+                <a:prstClr val="black"/>
+              </a:solidFill>
+            </a:endParaRPr>
+          </a:p>
+          <a:p>
+            <a:pPr marL="342900" marR="0" lvl="0" indent="-342900" algn="l" defTabSz="457200" rtl="0" eaLnBrk="1" fontAlgn="auto" latinLnBrk="0" hangingPunct="1">
+              <a:lnSpc>
+                <a:spcPct val="100000"/>
+              </a:lnSpc>
+              <a:spcBef>
+                <a:spcPct val="20000"/>
+              </a:spcBef>
+              <a:spcAft>
+                <a:spcPts val="0"/>
+              </a:spcAft>
+              <a:buClrTx/>
+              <a:buSzTx/>
+              <a:tabLst/>
+              <a:defRPr/>
+            </a:pPr>
+            <a:endParaRPr lang="en-US" sz="3200" dirty="0" smtClean="0"/>
+          </a:p>
+        </p:txBody>
+      </p:sp>
     </p:spTree>
   </p:cSld>
   <p:clrMapOvr>
@@ -3834,12 +4207,87 @@
             <p:ph idx="1"/>
           </p:nvPr>
         </p:nvSpPr>
-        <p:spPr/>
-        <p:txBody>
-          <a:bodyPr/>
-          <a:lstStyle/>
-          <a:p>
-            <a:endParaRPr lang="en-US"/>
+        <p:spPr>
+          <a:xfrm>
+            <a:off x="457200" y="1600200"/>
+            <a:ext cx="4688448" cy="4525963"/>
+          </a:xfrm>
+        </p:spPr>
+        <p:txBody>
+          <a:bodyPr>
+            <a:normAutofit fontScale="85000" lnSpcReduction="20000"/>
+          </a:bodyPr>
+          <a:lstStyle/>
+          <a:p>
+            <a:r>
+              <a:rPr lang="en-US" dirty="0" smtClean="0"/>
+              <a:t>Shortcomings include:</a:t>
+            </a:r>
+          </a:p>
+          <a:p>
+            <a:pPr lvl="1"/>
+            <a:r>
+              <a:rPr lang="en-US" dirty="0" smtClean="0"/>
+              <a:t>Does not store the information</a:t>
+            </a:r>
+            <a:endParaRPr lang="en-US" dirty="0" smtClean="0"/>
+          </a:p>
+          <a:p>
+            <a:pPr lvl="1"/>
+            <a:r>
+              <a:rPr lang="en-US" dirty="0" smtClean="0"/>
+              <a:t>Can’t access it from certain devices</a:t>
+            </a:r>
+          </a:p>
+          <a:p>
+            <a:pPr lvl="1"/>
+            <a:r>
+              <a:rPr lang="en-US" dirty="0" smtClean="0"/>
+              <a:t>Cost</a:t>
+            </a:r>
+          </a:p>
+          <a:p>
+            <a:pPr lvl="2"/>
+            <a:r>
+              <a:rPr lang="en-US" dirty="0" smtClean="0"/>
+              <a:t>Limiting # of children</a:t>
+            </a:r>
+          </a:p>
+          <a:p>
+            <a:pPr lvl="2"/>
+            <a:r>
+              <a:rPr lang="en-US" dirty="0" smtClean="0"/>
+              <a:t>Advertisements in the way</a:t>
+            </a:r>
+          </a:p>
+          <a:p>
+            <a:pPr lvl="1"/>
+            <a:r>
+              <a:rPr lang="en-US" dirty="0" smtClean="0"/>
+              <a:t>Not user-friendly</a:t>
+            </a:r>
+          </a:p>
+          <a:p>
+            <a:pPr lvl="1"/>
+            <a:r>
+              <a:rPr lang="en-US" dirty="0" smtClean="0"/>
+              <a:t>Not share-able</a:t>
+            </a:r>
+          </a:p>
+          <a:p>
+            <a:pPr lvl="1"/>
+            <a:r>
+              <a:rPr lang="en-US" dirty="0" smtClean="0"/>
+              <a:t>Metrics not right</a:t>
+            </a:r>
+          </a:p>
+          <a:p>
+            <a:pPr lvl="1"/>
+            <a:r>
+              <a:rPr lang="en-US" dirty="0" smtClean="0"/>
+              <a:t>Doesn’t include WHO Canadian curves</a:t>
+            </a:r>
+            <a:endParaRPr lang="en-US" dirty="0"/>
           </a:p>
         </p:txBody>
       </p:sp>
@@ -3867,6 +4315,80 @@
           </a:prstGeom>
         </p:spPr>
       </p:pic>
+      <p:sp>
+        <p:nvSpPr>
+          <p:cNvPr id="5" name="Content Placeholder 2"/>
+          <p:cNvSpPr txBox="1">
+            <a:spLocks/>
+          </p:cNvSpPr>
+          <p:nvPr/>
+        </p:nvSpPr>
+        <p:spPr>
+          <a:xfrm>
+            <a:off x="4954158" y="1600200"/>
+            <a:ext cx="3732641" cy="4525963"/>
+          </a:xfrm>
+          <a:prstGeom prst="rect">
+            <a:avLst/>
+          </a:prstGeom>
+        </p:spPr>
+        <p:txBody>
+          <a:bodyPr vert="horz" lIns="91440" tIns="45720" rIns="91440" bIns="45720" rtlCol="0">
+            <a:normAutofit/>
+          </a:bodyPr>
+          <a:lstStyle/>
+          <a:p>
+            <a:pPr marL="342900" marR="0" lvl="0" indent="-342900" algn="l" defTabSz="457200" rtl="0" eaLnBrk="1" fontAlgn="auto" latinLnBrk="0" hangingPunct="1">
+              <a:lnSpc>
+                <a:spcPct val="100000"/>
+              </a:lnSpc>
+              <a:spcBef>
+                <a:spcPct val="20000"/>
+              </a:spcBef>
+              <a:spcAft>
+                <a:spcPts val="0"/>
+              </a:spcAft>
+              <a:buClrTx/>
+              <a:buSzTx/>
+              <a:buFont typeface="Arial"/>
+              <a:buChar char="•"/>
+              <a:tabLst/>
+              <a:defRPr/>
+            </a:pPr>
+            <a:r>
+              <a:rPr kumimoji="0" lang="en-US" sz="3200" b="0" i="0" u="none" strike="noStrike" kern="1200" cap="none" spc="0" normalizeH="0" baseline="0" noProof="0" smtClean="0">
+                <a:ln>
+                  <a:noFill/>
+                </a:ln>
+                <a:solidFill>
+                  <a:schemeClr val="tx1"/>
+                </a:solidFill>
+                <a:effectLst/>
+                <a:uLnTx/>
+                <a:uFillTx/>
+                <a:latin typeface="+mn-lt"/>
+                <a:ea typeface="+mn-ea"/>
+                <a:cs typeface="+mn-cs"/>
+              </a:rPr>
+              <a:t>INSERT PIC OF PAPER CHART</a:t>
+            </a:r>
+            <a:endParaRPr kumimoji="0" lang="en-US" sz="3200" b="0" i="0" u="none" strike="noStrike" kern="1200" cap="none" spc="0" normalizeH="0" baseline="0" noProof="0" dirty="0" smtClean="0">
+              <a:ln>
+                <a:noFill/>
+              </a:ln>
+              <a:solidFill>
+                <a:schemeClr val="tx1"/>
+              </a:solidFill>
+              <a:effectLst/>
+              <a:uLnTx/>
+              <a:uFillTx/>
+              <a:latin typeface="+mn-lt"/>
+              <a:ea typeface="+mn-ea"/>
+              <a:cs typeface="+mn-cs"/>
+            </a:endParaRPr>
+          </a:p>
+        </p:txBody>
+      </p:sp>
     </p:spTree>
   </p:cSld>
   <p:clrMapOvr>
@@ -3941,6 +4463,40 @@
         <p:txBody>
           <a:bodyPr/>
           <a:lstStyle/>
+          <a:p>
+            <a:r>
+              <a:rPr lang="en-US" dirty="0" smtClean="0"/>
+              <a:t>Make it easy for patients to input and share the data</a:t>
+            </a:r>
+          </a:p>
+          <a:p>
+            <a:r>
+              <a:rPr lang="en-US" dirty="0"/>
+              <a:t>(</a:t>
+            </a:r>
+            <a:r>
+              <a:rPr lang="en-US" dirty="0" smtClean="0"/>
+              <a:t>Include the multiple growth points) </a:t>
+            </a:r>
+          </a:p>
+          <a:p>
+            <a:r>
+              <a:rPr lang="en-US" dirty="0" smtClean="0"/>
+              <a:t>(Ability to switch between curves)</a:t>
+            </a:r>
+          </a:p>
+          <a:p>
+            <a:r>
+              <a:rPr lang="en-US" dirty="0" smtClean="0"/>
+              <a:t>Visually appealing (graphs)</a:t>
+            </a:r>
+          </a:p>
+          <a:p>
+            <a:r>
+              <a:rPr lang="en-US" dirty="0" smtClean="0"/>
+              <a:t>Maintaining accuracy (tables + calculations)</a:t>
+            </a:r>
+          </a:p>
           <a:p>
             <a:endParaRPr lang="en-US" dirty="0"/>
           </a:p>
@@ -4230,7 +4786,7 @@
           <a:p>
             <a:r>
               <a:rPr lang="en-US" dirty="0" smtClean="0"/>
-              <a:t>Impact</a:t>
+              <a:t>Feedback</a:t>
             </a:r>
             <a:endParaRPr lang="en-US" dirty="0"/>
           </a:p>

</xml_diff>

<commit_message>
made changes to the presentation
</commit_message>
<xml_diff>
--- a/PowerPoint Presentation/GrowthPlot_Presentation.pptx
+++ b/PowerPoint Presentation/GrowthPlot_Presentation.pptx
@@ -1,9 +1,12 @@
 
 <file path=ppt/presentation.xml><?xml version="1.0" encoding="utf-8"?>
-<p:presentation xmlns:a="http://schemas.openxmlformats.org/drawingml/2006/main" xmlns:r="http://schemas.openxmlformats.org/officeDocument/2006/relationships" xmlns:mc="http://schemas.openxmlformats.org/markup-compatibility/2006" xmlns:mv="urn:schemas-microsoft-com:mac:vml" xmlns:p="http://schemas.openxmlformats.org/presentationml/2006/main" mc:Ignorable="mv" mc:PreserveAttributes="mv:*" saveSubsetFonts="1" autoCompressPictures="0">
+<p:presentation xmlns:a="http://schemas.openxmlformats.org/drawingml/2006/main" xmlns:r="http://schemas.openxmlformats.org/officeDocument/2006/relationships" xmlns:p="http://schemas.openxmlformats.org/presentationml/2006/main" saveSubsetFonts="1" autoCompressPictures="0">
   <p:sldMasterIdLst>
     <p:sldMasterId id="2147483648" r:id="rId1"/>
   </p:sldMasterIdLst>
+  <p:notesMasterIdLst>
+    <p:notesMasterId r:id="rId17"/>
+  </p:notesMasterIdLst>
   <p:sldIdLst>
     <p:sldId id="256" r:id="rId2"/>
     <p:sldId id="257" r:id="rId3"/>
@@ -121,8 +124,839 @@
 </p:presentation>
 </file>
 
+<file path=ppt/notesMasters/notesMaster1.xml><?xml version="1.0" encoding="utf-8"?>
+<p:notesMaster xmlns:a="http://schemas.openxmlformats.org/drawingml/2006/main" xmlns:r="http://schemas.openxmlformats.org/officeDocument/2006/relationships" xmlns:p="http://schemas.openxmlformats.org/presentationml/2006/main">
+  <p:cSld>
+    <p:bg>
+      <p:bgRef idx="1001">
+        <a:schemeClr val="bg1"/>
+      </p:bgRef>
+    </p:bg>
+    <p:spTree>
+      <p:nvGrpSpPr>
+        <p:cNvPr id="1" name=""/>
+        <p:cNvGrpSpPr/>
+        <p:nvPr/>
+      </p:nvGrpSpPr>
+      <p:grpSpPr>
+        <a:xfrm>
+          <a:off x="0" y="0"/>
+          <a:ext cx="0" cy="0"/>
+          <a:chOff x="0" y="0"/>
+          <a:chExt cx="0" cy="0"/>
+        </a:xfrm>
+      </p:grpSpPr>
+      <p:sp>
+        <p:nvSpPr>
+          <p:cNvPr id="2" name="Header Placeholder 1"/>
+          <p:cNvSpPr>
+            <a:spLocks noGrp="1"/>
+          </p:cNvSpPr>
+          <p:nvPr>
+            <p:ph type="hdr" sz="quarter"/>
+          </p:nvPr>
+        </p:nvSpPr>
+        <p:spPr>
+          <a:xfrm>
+            <a:off x="0" y="0"/>
+            <a:ext cx="2971800" cy="457200"/>
+          </a:xfrm>
+          <a:prstGeom prst="rect">
+            <a:avLst/>
+          </a:prstGeom>
+        </p:spPr>
+        <p:txBody>
+          <a:bodyPr vert="horz" lIns="91440" tIns="45720" rIns="91440" bIns="45720" rtlCol="0"/>
+          <a:lstStyle>
+            <a:lvl1pPr algn="l">
+              <a:defRPr sz="1200"/>
+            </a:lvl1pPr>
+          </a:lstStyle>
+          <a:p>
+            <a:endParaRPr lang="en-US"/>
+          </a:p>
+        </p:txBody>
+      </p:sp>
+      <p:sp>
+        <p:nvSpPr>
+          <p:cNvPr id="3" name="Date Placeholder 2"/>
+          <p:cNvSpPr>
+            <a:spLocks noGrp="1"/>
+          </p:cNvSpPr>
+          <p:nvPr>
+            <p:ph type="dt" idx="1"/>
+          </p:nvPr>
+        </p:nvSpPr>
+        <p:spPr>
+          <a:xfrm>
+            <a:off x="3884613" y="0"/>
+            <a:ext cx="2971800" cy="457200"/>
+          </a:xfrm>
+          <a:prstGeom prst="rect">
+            <a:avLst/>
+          </a:prstGeom>
+        </p:spPr>
+        <p:txBody>
+          <a:bodyPr vert="horz" lIns="91440" tIns="45720" rIns="91440" bIns="45720" rtlCol="0"/>
+          <a:lstStyle>
+            <a:lvl1pPr algn="r">
+              <a:defRPr sz="1200"/>
+            </a:lvl1pPr>
+          </a:lstStyle>
+          <a:p>
+            <a:fld id="{6453922B-525A-DD45-AC88-50237FE00329}" type="datetimeFigureOut">
+              <a:rPr lang="en-US" smtClean="0"/>
+              <a:t>15-06-18</a:t>
+            </a:fld>
+            <a:endParaRPr lang="en-US"/>
+          </a:p>
+        </p:txBody>
+      </p:sp>
+      <p:sp>
+        <p:nvSpPr>
+          <p:cNvPr id="4" name="Slide Image Placeholder 3"/>
+          <p:cNvSpPr>
+            <a:spLocks noGrp="1" noRot="1" noChangeAspect="1"/>
+          </p:cNvSpPr>
+          <p:nvPr>
+            <p:ph type="sldImg" idx="2"/>
+          </p:nvPr>
+        </p:nvSpPr>
+        <p:spPr>
+          <a:xfrm>
+            <a:off x="1143000" y="685800"/>
+            <a:ext cx="4572000" cy="3429000"/>
+          </a:xfrm>
+          <a:prstGeom prst="rect">
+            <a:avLst/>
+          </a:prstGeom>
+          <a:noFill/>
+          <a:ln w="12700">
+            <a:solidFill>
+              <a:prstClr val="black"/>
+            </a:solidFill>
+          </a:ln>
+        </p:spPr>
+        <p:txBody>
+          <a:bodyPr vert="horz" lIns="91440" tIns="45720" rIns="91440" bIns="45720" rtlCol="0" anchor="ctr"/>
+          <a:lstStyle/>
+          <a:p>
+            <a:endParaRPr lang="en-US"/>
+          </a:p>
+        </p:txBody>
+      </p:sp>
+      <p:sp>
+        <p:nvSpPr>
+          <p:cNvPr id="5" name="Notes Placeholder 4"/>
+          <p:cNvSpPr>
+            <a:spLocks noGrp="1"/>
+          </p:cNvSpPr>
+          <p:nvPr>
+            <p:ph type="body" sz="quarter" idx="3"/>
+          </p:nvPr>
+        </p:nvSpPr>
+        <p:spPr>
+          <a:xfrm>
+            <a:off x="685800" y="4343400"/>
+            <a:ext cx="5486400" cy="4114800"/>
+          </a:xfrm>
+          <a:prstGeom prst="rect">
+            <a:avLst/>
+          </a:prstGeom>
+        </p:spPr>
+        <p:txBody>
+          <a:bodyPr vert="horz" lIns="91440" tIns="45720" rIns="91440" bIns="45720" rtlCol="0"/>
+          <a:lstStyle/>
+          <a:p>
+            <a:pPr lvl="0"/>
+            <a:r>
+              <a:rPr lang="en-CA" smtClean="0"/>
+              <a:t>Click to edit Master text styles</a:t>
+            </a:r>
+          </a:p>
+          <a:p>
+            <a:pPr lvl="1"/>
+            <a:r>
+              <a:rPr lang="en-CA" smtClean="0"/>
+              <a:t>Second level</a:t>
+            </a:r>
+          </a:p>
+          <a:p>
+            <a:pPr lvl="2"/>
+            <a:r>
+              <a:rPr lang="en-CA" smtClean="0"/>
+              <a:t>Third level</a:t>
+            </a:r>
+          </a:p>
+          <a:p>
+            <a:pPr lvl="3"/>
+            <a:r>
+              <a:rPr lang="en-CA" smtClean="0"/>
+              <a:t>Fourth level</a:t>
+            </a:r>
+          </a:p>
+          <a:p>
+            <a:pPr lvl="4"/>
+            <a:r>
+              <a:rPr lang="en-CA" smtClean="0"/>
+              <a:t>Fifth level</a:t>
+            </a:r>
+            <a:endParaRPr lang="en-US"/>
+          </a:p>
+        </p:txBody>
+      </p:sp>
+      <p:sp>
+        <p:nvSpPr>
+          <p:cNvPr id="6" name="Footer Placeholder 5"/>
+          <p:cNvSpPr>
+            <a:spLocks noGrp="1"/>
+          </p:cNvSpPr>
+          <p:nvPr>
+            <p:ph type="ftr" sz="quarter" idx="4"/>
+          </p:nvPr>
+        </p:nvSpPr>
+        <p:spPr>
+          <a:xfrm>
+            <a:off x="0" y="8685213"/>
+            <a:ext cx="2971800" cy="457200"/>
+          </a:xfrm>
+          <a:prstGeom prst="rect">
+            <a:avLst/>
+          </a:prstGeom>
+        </p:spPr>
+        <p:txBody>
+          <a:bodyPr vert="horz" lIns="91440" tIns="45720" rIns="91440" bIns="45720" rtlCol="0" anchor="b"/>
+          <a:lstStyle>
+            <a:lvl1pPr algn="l">
+              <a:defRPr sz="1200"/>
+            </a:lvl1pPr>
+          </a:lstStyle>
+          <a:p>
+            <a:endParaRPr lang="en-US"/>
+          </a:p>
+        </p:txBody>
+      </p:sp>
+      <p:sp>
+        <p:nvSpPr>
+          <p:cNvPr id="7" name="Slide Number Placeholder 6"/>
+          <p:cNvSpPr>
+            <a:spLocks noGrp="1"/>
+          </p:cNvSpPr>
+          <p:nvPr>
+            <p:ph type="sldNum" sz="quarter" idx="5"/>
+          </p:nvPr>
+        </p:nvSpPr>
+        <p:spPr>
+          <a:xfrm>
+            <a:off x="3884613" y="8685213"/>
+            <a:ext cx="2971800" cy="457200"/>
+          </a:xfrm>
+          <a:prstGeom prst="rect">
+            <a:avLst/>
+          </a:prstGeom>
+        </p:spPr>
+        <p:txBody>
+          <a:bodyPr vert="horz" lIns="91440" tIns="45720" rIns="91440" bIns="45720" rtlCol="0" anchor="b"/>
+          <a:lstStyle>
+            <a:lvl1pPr algn="r">
+              <a:defRPr sz="1200"/>
+            </a:lvl1pPr>
+          </a:lstStyle>
+          <a:p>
+            <a:fld id="{E1159CB3-932F-C14D-8E49-A78F6374A8D6}" type="slidenum">
+              <a:rPr lang="en-US" smtClean="0"/>
+              <a:t>‹#›</a:t>
+            </a:fld>
+            <a:endParaRPr lang="en-US"/>
+          </a:p>
+        </p:txBody>
+      </p:sp>
+    </p:spTree>
+    <p:extLst>
+      <p:ext uri="{BB962C8B-B14F-4D97-AF65-F5344CB8AC3E}">
+        <p14:creationId xmlns:p14="http://schemas.microsoft.com/office/powerpoint/2010/main" val="3798197792"/>
+      </p:ext>
+    </p:extLst>
+  </p:cSld>
+  <p:clrMap bg1="lt1" tx1="dk1" bg2="lt2" tx2="dk2" accent1="accent1" accent2="accent2" accent3="accent3" accent4="accent4" accent5="accent5" accent6="accent6" hlink="hlink" folHlink="folHlink"/>
+  <p:notesStyle>
+    <a:lvl1pPr marL="0" algn="l" defTabSz="457200" rtl="0" eaLnBrk="1" latinLnBrk="0" hangingPunct="1">
+      <a:defRPr sz="1200" kern="1200">
+        <a:solidFill>
+          <a:schemeClr val="tx1"/>
+        </a:solidFill>
+        <a:latin typeface="+mn-lt"/>
+        <a:ea typeface="+mn-ea"/>
+        <a:cs typeface="+mn-cs"/>
+      </a:defRPr>
+    </a:lvl1pPr>
+    <a:lvl2pPr marL="457200" algn="l" defTabSz="457200" rtl="0" eaLnBrk="1" latinLnBrk="0" hangingPunct="1">
+      <a:defRPr sz="1200" kern="1200">
+        <a:solidFill>
+          <a:schemeClr val="tx1"/>
+        </a:solidFill>
+        <a:latin typeface="+mn-lt"/>
+        <a:ea typeface="+mn-ea"/>
+        <a:cs typeface="+mn-cs"/>
+      </a:defRPr>
+    </a:lvl2pPr>
+    <a:lvl3pPr marL="914400" algn="l" defTabSz="457200" rtl="0" eaLnBrk="1" latinLnBrk="0" hangingPunct="1">
+      <a:defRPr sz="1200" kern="1200">
+        <a:solidFill>
+          <a:schemeClr val="tx1"/>
+        </a:solidFill>
+        <a:latin typeface="+mn-lt"/>
+        <a:ea typeface="+mn-ea"/>
+        <a:cs typeface="+mn-cs"/>
+      </a:defRPr>
+    </a:lvl3pPr>
+    <a:lvl4pPr marL="1371600" algn="l" defTabSz="457200" rtl="0" eaLnBrk="1" latinLnBrk="0" hangingPunct="1">
+      <a:defRPr sz="1200" kern="1200">
+        <a:solidFill>
+          <a:schemeClr val="tx1"/>
+        </a:solidFill>
+        <a:latin typeface="+mn-lt"/>
+        <a:ea typeface="+mn-ea"/>
+        <a:cs typeface="+mn-cs"/>
+      </a:defRPr>
+    </a:lvl4pPr>
+    <a:lvl5pPr marL="1828800" algn="l" defTabSz="457200" rtl="0" eaLnBrk="1" latinLnBrk="0" hangingPunct="1">
+      <a:defRPr sz="1200" kern="1200">
+        <a:solidFill>
+          <a:schemeClr val="tx1"/>
+        </a:solidFill>
+        <a:latin typeface="+mn-lt"/>
+        <a:ea typeface="+mn-ea"/>
+        <a:cs typeface="+mn-cs"/>
+      </a:defRPr>
+    </a:lvl5pPr>
+    <a:lvl6pPr marL="2286000" algn="l" defTabSz="457200" rtl="0" eaLnBrk="1" latinLnBrk="0" hangingPunct="1">
+      <a:defRPr sz="1200" kern="1200">
+        <a:solidFill>
+          <a:schemeClr val="tx1"/>
+        </a:solidFill>
+        <a:latin typeface="+mn-lt"/>
+        <a:ea typeface="+mn-ea"/>
+        <a:cs typeface="+mn-cs"/>
+      </a:defRPr>
+    </a:lvl6pPr>
+    <a:lvl7pPr marL="2743200" algn="l" defTabSz="457200" rtl="0" eaLnBrk="1" latinLnBrk="0" hangingPunct="1">
+      <a:defRPr sz="1200" kern="1200">
+        <a:solidFill>
+          <a:schemeClr val="tx1"/>
+        </a:solidFill>
+        <a:latin typeface="+mn-lt"/>
+        <a:ea typeface="+mn-ea"/>
+        <a:cs typeface="+mn-cs"/>
+      </a:defRPr>
+    </a:lvl7pPr>
+    <a:lvl8pPr marL="3200400" algn="l" defTabSz="457200" rtl="0" eaLnBrk="1" latinLnBrk="0" hangingPunct="1">
+      <a:defRPr sz="1200" kern="1200">
+        <a:solidFill>
+          <a:schemeClr val="tx1"/>
+        </a:solidFill>
+        <a:latin typeface="+mn-lt"/>
+        <a:ea typeface="+mn-ea"/>
+        <a:cs typeface="+mn-cs"/>
+      </a:defRPr>
+    </a:lvl8pPr>
+    <a:lvl9pPr marL="3657600" algn="l" defTabSz="457200" rtl="0" eaLnBrk="1" latinLnBrk="0" hangingPunct="1">
+      <a:defRPr sz="1200" kern="1200">
+        <a:solidFill>
+          <a:schemeClr val="tx1"/>
+        </a:solidFill>
+        <a:latin typeface="+mn-lt"/>
+        <a:ea typeface="+mn-ea"/>
+        <a:cs typeface="+mn-cs"/>
+      </a:defRPr>
+    </a:lvl9pPr>
+  </p:notesStyle>
+</p:notesMaster>
+</file>
+
+<file path=ppt/notesSlides/notesSlide1.xml><?xml version="1.0" encoding="utf-8"?>
+<p:notes xmlns:a="http://schemas.openxmlformats.org/drawingml/2006/main" xmlns:r="http://schemas.openxmlformats.org/officeDocument/2006/relationships" xmlns:p="http://schemas.openxmlformats.org/presentationml/2006/main">
+  <p:cSld>
+    <p:spTree>
+      <p:nvGrpSpPr>
+        <p:cNvPr id="1" name=""/>
+        <p:cNvGrpSpPr/>
+        <p:nvPr/>
+      </p:nvGrpSpPr>
+      <p:grpSpPr>
+        <a:xfrm>
+          <a:off x="0" y="0"/>
+          <a:ext cx="0" cy="0"/>
+          <a:chOff x="0" y="0"/>
+          <a:chExt cx="0" cy="0"/>
+        </a:xfrm>
+      </p:grpSpPr>
+      <p:sp>
+        <p:nvSpPr>
+          <p:cNvPr id="2" name="Slide Image Placeholder 1"/>
+          <p:cNvSpPr>
+            <a:spLocks noGrp="1" noRot="1" noChangeAspect="1"/>
+          </p:cNvSpPr>
+          <p:nvPr>
+            <p:ph type="sldImg"/>
+          </p:nvPr>
+        </p:nvSpPr>
+        <p:spPr/>
+      </p:sp>
+      <p:sp>
+        <p:nvSpPr>
+          <p:cNvPr id="3" name="Notes Placeholder 2"/>
+          <p:cNvSpPr>
+            <a:spLocks noGrp="1"/>
+          </p:cNvSpPr>
+          <p:nvPr>
+            <p:ph type="body" idx="1"/>
+          </p:nvPr>
+        </p:nvSpPr>
+        <p:spPr/>
+        <p:txBody>
+          <a:bodyPr/>
+          <a:lstStyle/>
+          <a:p>
+            <a:pPr marL="342900" marR="0" lvl="0" indent="-342900" algn="l" defTabSz="457200" rtl="0" eaLnBrk="1" fontAlgn="auto" latinLnBrk="0" hangingPunct="1">
+              <a:lnSpc>
+                <a:spcPct val="100000"/>
+              </a:lnSpc>
+              <a:spcBef>
+                <a:spcPct val="20000"/>
+              </a:spcBef>
+              <a:spcAft>
+                <a:spcPts val="0"/>
+              </a:spcAft>
+              <a:buClrTx/>
+              <a:buSzTx/>
+              <a:buFont typeface="Arial"/>
+              <a:buChar char="•"/>
+              <a:tabLst/>
+              <a:defRPr/>
+            </a:pPr>
+            <a:r>
+              <a:rPr lang="en-US" sz="3200" dirty="0" smtClean="0"/>
+              <a:t>Current charts are:</a:t>
+            </a:r>
+            <a:endParaRPr lang="en-US" sz="2800" dirty="0" smtClean="0">
+              <a:solidFill>
+                <a:prstClr val="black"/>
+              </a:solidFill>
+            </a:endParaRPr>
+          </a:p>
+          <a:p>
+            <a:pPr marL="742950" lvl="1" indent="-285750">
+              <a:spcBef>
+                <a:spcPct val="20000"/>
+              </a:spcBef>
+              <a:buFont typeface="Arial"/>
+              <a:buChar char="–"/>
+            </a:pPr>
+            <a:r>
+              <a:rPr lang="en-US" sz="2800" dirty="0" smtClean="0">
+                <a:solidFill>
+                  <a:prstClr val="black"/>
+                </a:solidFill>
+              </a:rPr>
+              <a:t>hard-to-plot </a:t>
+            </a:r>
+          </a:p>
+          <a:p>
+            <a:pPr marL="742950" lvl="1" indent="-285750">
+              <a:spcBef>
+                <a:spcPct val="20000"/>
+              </a:spcBef>
+              <a:buFont typeface="Arial"/>
+              <a:buChar char="–"/>
+            </a:pPr>
+            <a:r>
+              <a:rPr lang="en-US" sz="2800" dirty="0" smtClean="0">
+                <a:solidFill>
+                  <a:prstClr val="black"/>
+                </a:solidFill>
+              </a:rPr>
+              <a:t>hard-to-read</a:t>
+            </a:r>
+          </a:p>
+          <a:p>
+            <a:pPr marL="1200150" lvl="2" indent="-285750">
+              <a:spcBef>
+                <a:spcPct val="20000"/>
+              </a:spcBef>
+              <a:buFont typeface="Arial"/>
+              <a:buChar char="–"/>
+            </a:pPr>
+            <a:r>
+              <a:rPr lang="en-US" sz="2800" dirty="0" smtClean="0">
+                <a:solidFill>
+                  <a:prstClr val="black"/>
+                </a:solidFill>
+              </a:rPr>
+              <a:t>does not provide exact percentiles</a:t>
+            </a:r>
+          </a:p>
+          <a:p>
+            <a:pPr marL="742950" lvl="1" indent="-285750">
+              <a:spcBef>
+                <a:spcPct val="20000"/>
+              </a:spcBef>
+              <a:buFont typeface="Arial"/>
+              <a:buChar char="–"/>
+            </a:pPr>
+            <a:r>
+              <a:rPr lang="en-US" sz="2800" dirty="0" smtClean="0">
+                <a:solidFill>
+                  <a:prstClr val="black"/>
+                </a:solidFill>
+              </a:rPr>
+              <a:t>not available to the families</a:t>
+            </a:r>
+          </a:p>
+          <a:p>
+            <a:pPr marL="742950" lvl="1" indent="-285750">
+              <a:spcBef>
+                <a:spcPct val="20000"/>
+              </a:spcBef>
+              <a:buFont typeface="Arial"/>
+              <a:buChar char="–"/>
+            </a:pPr>
+            <a:r>
+              <a:rPr lang="en-US" sz="2800" dirty="0" smtClean="0">
+                <a:solidFill>
+                  <a:prstClr val="black"/>
+                </a:solidFill>
+              </a:rPr>
+              <a:t>incomplete</a:t>
+            </a:r>
+          </a:p>
+          <a:p>
+            <a:pPr marL="1200150" lvl="2" indent="-285750">
+              <a:spcBef>
+                <a:spcPct val="20000"/>
+              </a:spcBef>
+              <a:buFont typeface="Arial"/>
+              <a:buChar char="–"/>
+            </a:pPr>
+            <a:r>
+              <a:rPr lang="en-US" sz="2800" dirty="0" smtClean="0">
+                <a:solidFill>
+                  <a:prstClr val="black"/>
+                </a:solidFill>
+              </a:rPr>
+              <a:t>living in different places</a:t>
+            </a:r>
+          </a:p>
+          <a:p>
+            <a:endParaRPr lang="en-US" dirty="0"/>
+          </a:p>
+        </p:txBody>
+      </p:sp>
+      <p:sp>
+        <p:nvSpPr>
+          <p:cNvPr id="4" name="Slide Number Placeholder 3"/>
+          <p:cNvSpPr>
+            <a:spLocks noGrp="1"/>
+          </p:cNvSpPr>
+          <p:nvPr>
+            <p:ph type="sldNum" sz="quarter" idx="10"/>
+          </p:nvPr>
+        </p:nvSpPr>
+        <p:spPr/>
+        <p:txBody>
+          <a:bodyPr/>
+          <a:lstStyle/>
+          <a:p>
+            <a:fld id="{E1159CB3-932F-C14D-8E49-A78F6374A8D6}" type="slidenum">
+              <a:rPr lang="en-US" smtClean="0"/>
+              <a:t>4</a:t>
+            </a:fld>
+            <a:endParaRPr lang="en-US"/>
+          </a:p>
+        </p:txBody>
+      </p:sp>
+    </p:spTree>
+    <p:extLst>
+      <p:ext uri="{BB962C8B-B14F-4D97-AF65-F5344CB8AC3E}">
+        <p14:creationId xmlns:p14="http://schemas.microsoft.com/office/powerpoint/2010/main" val="2127494680"/>
+      </p:ext>
+    </p:extLst>
+  </p:cSld>
+  <p:clrMapOvr>
+    <a:masterClrMapping/>
+  </p:clrMapOvr>
+</p:notes>
+</file>
+
+<file path=ppt/notesSlides/notesSlide2.xml><?xml version="1.0" encoding="utf-8"?>
+<p:notes xmlns:a="http://schemas.openxmlformats.org/drawingml/2006/main" xmlns:r="http://schemas.openxmlformats.org/officeDocument/2006/relationships" xmlns:p="http://schemas.openxmlformats.org/presentationml/2006/main">
+  <p:cSld>
+    <p:spTree>
+      <p:nvGrpSpPr>
+        <p:cNvPr id="1" name=""/>
+        <p:cNvGrpSpPr/>
+        <p:nvPr/>
+      </p:nvGrpSpPr>
+      <p:grpSpPr>
+        <a:xfrm>
+          <a:off x="0" y="0"/>
+          <a:ext cx="0" cy="0"/>
+          <a:chOff x="0" y="0"/>
+          <a:chExt cx="0" cy="0"/>
+        </a:xfrm>
+      </p:grpSpPr>
+      <p:sp>
+        <p:nvSpPr>
+          <p:cNvPr id="2" name="Slide Image Placeholder 1"/>
+          <p:cNvSpPr>
+            <a:spLocks noGrp="1" noRot="1" noChangeAspect="1"/>
+          </p:cNvSpPr>
+          <p:nvPr>
+            <p:ph type="sldImg"/>
+          </p:nvPr>
+        </p:nvSpPr>
+        <p:spPr/>
+      </p:sp>
+      <p:sp>
+        <p:nvSpPr>
+          <p:cNvPr id="3" name="Notes Placeholder 2"/>
+          <p:cNvSpPr>
+            <a:spLocks noGrp="1"/>
+          </p:cNvSpPr>
+          <p:nvPr>
+            <p:ph type="body" idx="1"/>
+          </p:nvPr>
+        </p:nvSpPr>
+        <p:spPr/>
+        <p:txBody>
+          <a:bodyPr/>
+          <a:lstStyle/>
+          <a:p>
+            <a:r>
+              <a:rPr lang="en-US" dirty="0" smtClean="0"/>
+              <a:t>Shortcomings include:</a:t>
+            </a:r>
+          </a:p>
+          <a:p>
+            <a:pPr lvl="1"/>
+            <a:r>
+              <a:rPr lang="en-US" dirty="0" smtClean="0"/>
+              <a:t>Does not store the information</a:t>
+            </a:r>
+          </a:p>
+          <a:p>
+            <a:pPr lvl="1"/>
+            <a:r>
+              <a:rPr lang="en-US" dirty="0" smtClean="0"/>
+              <a:t>Can’t access it from certain devices</a:t>
+            </a:r>
+          </a:p>
+          <a:p>
+            <a:pPr lvl="1"/>
+            <a:r>
+              <a:rPr lang="en-US" dirty="0" smtClean="0"/>
+              <a:t>Cost</a:t>
+            </a:r>
+          </a:p>
+          <a:p>
+            <a:pPr lvl="2"/>
+            <a:r>
+              <a:rPr lang="en-US" dirty="0" smtClean="0"/>
+              <a:t>Limiting # of children</a:t>
+            </a:r>
+          </a:p>
+          <a:p>
+            <a:pPr lvl="2"/>
+            <a:r>
+              <a:rPr lang="en-US" dirty="0" smtClean="0"/>
+              <a:t>Advertisements in the way</a:t>
+            </a:r>
+          </a:p>
+          <a:p>
+            <a:pPr lvl="1"/>
+            <a:r>
+              <a:rPr lang="en-US" dirty="0" smtClean="0"/>
+              <a:t>Not user-friendly</a:t>
+            </a:r>
+          </a:p>
+          <a:p>
+            <a:pPr lvl="1"/>
+            <a:r>
+              <a:rPr lang="en-US" dirty="0" smtClean="0"/>
+              <a:t>Not share-able</a:t>
+            </a:r>
+          </a:p>
+          <a:p>
+            <a:pPr lvl="1"/>
+            <a:r>
+              <a:rPr lang="en-US" dirty="0" smtClean="0"/>
+              <a:t>Metrics not right</a:t>
+            </a:r>
+          </a:p>
+          <a:p>
+            <a:pPr lvl="1"/>
+            <a:r>
+              <a:rPr lang="en-US" dirty="0" smtClean="0"/>
+              <a:t>Doesn’t include WHO Canadian curves</a:t>
+            </a:r>
+          </a:p>
+          <a:p>
+            <a:endParaRPr lang="en-US" dirty="0"/>
+          </a:p>
+        </p:txBody>
+      </p:sp>
+      <p:sp>
+        <p:nvSpPr>
+          <p:cNvPr id="4" name="Slide Number Placeholder 3"/>
+          <p:cNvSpPr>
+            <a:spLocks noGrp="1"/>
+          </p:cNvSpPr>
+          <p:nvPr>
+            <p:ph type="sldNum" sz="quarter" idx="10"/>
+          </p:nvPr>
+        </p:nvSpPr>
+        <p:spPr/>
+        <p:txBody>
+          <a:bodyPr/>
+          <a:lstStyle/>
+          <a:p>
+            <a:fld id="{E1159CB3-932F-C14D-8E49-A78F6374A8D6}" type="slidenum">
+              <a:rPr lang="en-US" smtClean="0"/>
+              <a:t>5</a:t>
+            </a:fld>
+            <a:endParaRPr lang="en-US"/>
+          </a:p>
+        </p:txBody>
+      </p:sp>
+    </p:spTree>
+    <p:extLst>
+      <p:ext uri="{BB962C8B-B14F-4D97-AF65-F5344CB8AC3E}">
+        <p14:creationId xmlns:p14="http://schemas.microsoft.com/office/powerpoint/2010/main" val="3011414378"/>
+      </p:ext>
+    </p:extLst>
+  </p:cSld>
+  <p:clrMapOvr>
+    <a:masterClrMapping/>
+  </p:clrMapOvr>
+</p:notes>
+</file>
+
+<file path=ppt/notesSlides/notesSlide3.xml><?xml version="1.0" encoding="utf-8"?>
+<p:notes xmlns:a="http://schemas.openxmlformats.org/drawingml/2006/main" xmlns:r="http://schemas.openxmlformats.org/officeDocument/2006/relationships" xmlns:p="http://schemas.openxmlformats.org/presentationml/2006/main">
+  <p:cSld>
+    <p:spTree>
+      <p:nvGrpSpPr>
+        <p:cNvPr id="1" name=""/>
+        <p:cNvGrpSpPr/>
+        <p:nvPr/>
+      </p:nvGrpSpPr>
+      <p:grpSpPr>
+        <a:xfrm>
+          <a:off x="0" y="0"/>
+          <a:ext cx="0" cy="0"/>
+          <a:chOff x="0" y="0"/>
+          <a:chExt cx="0" cy="0"/>
+        </a:xfrm>
+      </p:grpSpPr>
+      <p:sp>
+        <p:nvSpPr>
+          <p:cNvPr id="2" name="Slide Image Placeholder 1"/>
+          <p:cNvSpPr>
+            <a:spLocks noGrp="1" noRot="1" noChangeAspect="1"/>
+          </p:cNvSpPr>
+          <p:nvPr>
+            <p:ph type="sldImg"/>
+          </p:nvPr>
+        </p:nvSpPr>
+        <p:spPr/>
+      </p:sp>
+      <p:sp>
+        <p:nvSpPr>
+          <p:cNvPr id="3" name="Notes Placeholder 2"/>
+          <p:cNvSpPr>
+            <a:spLocks noGrp="1"/>
+          </p:cNvSpPr>
+          <p:nvPr>
+            <p:ph type="body" idx="1"/>
+          </p:nvPr>
+        </p:nvSpPr>
+        <p:spPr/>
+        <p:txBody>
+          <a:bodyPr/>
+          <a:lstStyle/>
+          <a:p>
+            <a:r>
+              <a:rPr lang="en-US" dirty="0" smtClean="0"/>
+              <a:t>Make it easy for patients to input and share the data</a:t>
+            </a:r>
+          </a:p>
+          <a:p>
+            <a:r>
+              <a:rPr lang="en-US" dirty="0" smtClean="0"/>
+              <a:t>(Include the multiple growth points) </a:t>
+            </a:r>
+          </a:p>
+          <a:p>
+            <a:r>
+              <a:rPr lang="en-US" dirty="0" smtClean="0"/>
+              <a:t>(Ability to switch between curves)</a:t>
+            </a:r>
+          </a:p>
+          <a:p>
+            <a:r>
+              <a:rPr lang="en-US" dirty="0" smtClean="0"/>
+              <a:t>Visually appealing (graphs)</a:t>
+            </a:r>
+          </a:p>
+          <a:p>
+            <a:r>
+              <a:rPr lang="en-US" dirty="0" smtClean="0"/>
+              <a:t>Maintaining accuracy (tables + calculations)</a:t>
+            </a:r>
+          </a:p>
+          <a:p>
+            <a:endParaRPr lang="en-US" dirty="0"/>
+          </a:p>
+        </p:txBody>
+      </p:sp>
+      <p:sp>
+        <p:nvSpPr>
+          <p:cNvPr id="4" name="Slide Number Placeholder 3"/>
+          <p:cNvSpPr>
+            <a:spLocks noGrp="1"/>
+          </p:cNvSpPr>
+          <p:nvPr>
+            <p:ph type="sldNum" sz="quarter" idx="10"/>
+          </p:nvPr>
+        </p:nvSpPr>
+        <p:spPr/>
+        <p:txBody>
+          <a:bodyPr/>
+          <a:lstStyle/>
+          <a:p>
+            <a:fld id="{E1159CB3-932F-C14D-8E49-A78F6374A8D6}" type="slidenum">
+              <a:rPr lang="en-US" smtClean="0"/>
+              <a:t>6</a:t>
+            </a:fld>
+            <a:endParaRPr lang="en-US"/>
+          </a:p>
+        </p:txBody>
+      </p:sp>
+    </p:spTree>
+    <p:extLst>
+      <p:ext uri="{BB962C8B-B14F-4D97-AF65-F5344CB8AC3E}">
+        <p14:creationId xmlns:p14="http://schemas.microsoft.com/office/powerpoint/2010/main" val="3342411284"/>
+      </p:ext>
+    </p:extLst>
+  </p:cSld>
+  <p:clrMapOvr>
+    <a:masterClrMapping/>
+  </p:clrMapOvr>
+</p:notes>
+</file>
+
 <file path=ppt/slideLayouts/slideLayout1.xml><?xml version="1.0" encoding="utf-8"?>
-<p:sldLayout xmlns:a="http://schemas.openxmlformats.org/drawingml/2006/main" xmlns:r="http://schemas.openxmlformats.org/officeDocument/2006/relationships" xmlns:mc="http://schemas.openxmlformats.org/markup-compatibility/2006" xmlns:mv="urn:schemas-microsoft-com:mac:vml" xmlns:p="http://schemas.openxmlformats.org/presentationml/2006/main" mc:Ignorable="mv" mc:PreserveAttributes="mv:*" type="title" preserve="1">
+<p:sldLayout xmlns:a="http://schemas.openxmlformats.org/drawingml/2006/main" xmlns:r="http://schemas.openxmlformats.org/officeDocument/2006/relationships" xmlns:p="http://schemas.openxmlformats.org/presentationml/2006/main" type="title" preserve="1">
   <p:cSld name="Title Slide">
     <p:spTree>
       <p:nvGrpSpPr>
@@ -302,7 +1136,7 @@
           <a:p>
             <a:fld id="{F74420B2-42E2-144C-B565-A6F35EDDC21A}" type="datetimeFigureOut">
               <a:rPr lang="en-US" smtClean="0"/>
-              <a:t>6/14/15</a:t>
+              <a:t>15-06-18</a:t>
             </a:fld>
             <a:endParaRPr lang="en-US"/>
           </a:p>
@@ -359,7 +1193,7 @@
 </file>
 
 <file path=ppt/slideLayouts/slideLayout10.xml><?xml version="1.0" encoding="utf-8"?>
-<p:sldLayout xmlns:a="http://schemas.openxmlformats.org/drawingml/2006/main" xmlns:r="http://schemas.openxmlformats.org/officeDocument/2006/relationships" xmlns:mc="http://schemas.openxmlformats.org/markup-compatibility/2006" xmlns:mv="urn:schemas-microsoft-com:mac:vml" xmlns:p="http://schemas.openxmlformats.org/presentationml/2006/main" mc:Ignorable="mv" mc:PreserveAttributes="mv:*" type="vertTx" preserve="1">
+<p:sldLayout xmlns:a="http://schemas.openxmlformats.org/drawingml/2006/main" xmlns:r="http://schemas.openxmlformats.org/officeDocument/2006/relationships" xmlns:p="http://schemas.openxmlformats.org/presentationml/2006/main" type="vertTx" preserve="1">
   <p:cSld name="Title and Vertical Text">
     <p:spTree>
       <p:nvGrpSpPr>
@@ -467,7 +1301,7 @@
           <a:p>
             <a:fld id="{F74420B2-42E2-144C-B565-A6F35EDDC21A}" type="datetimeFigureOut">
               <a:rPr lang="en-US" smtClean="0"/>
-              <a:t>6/14/15</a:t>
+              <a:t>15-06-18</a:t>
             </a:fld>
             <a:endParaRPr lang="en-US"/>
           </a:p>
@@ -524,7 +1358,7 @@
 </file>
 
 <file path=ppt/slideLayouts/slideLayout11.xml><?xml version="1.0" encoding="utf-8"?>
-<p:sldLayout xmlns:a="http://schemas.openxmlformats.org/drawingml/2006/main" xmlns:r="http://schemas.openxmlformats.org/officeDocument/2006/relationships" xmlns:mc="http://schemas.openxmlformats.org/markup-compatibility/2006" xmlns:mv="urn:schemas-microsoft-com:mac:vml" xmlns:p="http://schemas.openxmlformats.org/presentationml/2006/main" mc:Ignorable="mv" mc:PreserveAttributes="mv:*" type="vertTitleAndTx" preserve="1">
+<p:sldLayout xmlns:a="http://schemas.openxmlformats.org/drawingml/2006/main" xmlns:r="http://schemas.openxmlformats.org/officeDocument/2006/relationships" xmlns:p="http://schemas.openxmlformats.org/presentationml/2006/main" type="vertTitleAndTx" preserve="1">
   <p:cSld name="Vertical Title and Text">
     <p:spTree>
       <p:nvGrpSpPr>
@@ -642,7 +1476,7 @@
           <a:p>
             <a:fld id="{F74420B2-42E2-144C-B565-A6F35EDDC21A}" type="datetimeFigureOut">
               <a:rPr lang="en-US" smtClean="0"/>
-              <a:t>6/14/15</a:t>
+              <a:t>15-06-18</a:t>
             </a:fld>
             <a:endParaRPr lang="en-US"/>
           </a:p>
@@ -699,7 +1533,7 @@
 </file>
 
 <file path=ppt/slideLayouts/slideLayout2.xml><?xml version="1.0" encoding="utf-8"?>
-<p:sldLayout xmlns:a="http://schemas.openxmlformats.org/drawingml/2006/main" xmlns:r="http://schemas.openxmlformats.org/officeDocument/2006/relationships" xmlns:mc="http://schemas.openxmlformats.org/markup-compatibility/2006" xmlns:mv="urn:schemas-microsoft-com:mac:vml" xmlns:p="http://schemas.openxmlformats.org/presentationml/2006/main" mc:Ignorable="mv" mc:PreserveAttributes="mv:*" type="obj" preserve="1">
+<p:sldLayout xmlns:a="http://schemas.openxmlformats.org/drawingml/2006/main" xmlns:r="http://schemas.openxmlformats.org/officeDocument/2006/relationships" xmlns:p="http://schemas.openxmlformats.org/presentationml/2006/main" type="obj" preserve="1">
   <p:cSld name="Title and Content">
     <p:spTree>
       <p:nvGrpSpPr>
@@ -807,7 +1641,7 @@
           <a:p>
             <a:fld id="{F74420B2-42E2-144C-B565-A6F35EDDC21A}" type="datetimeFigureOut">
               <a:rPr lang="en-US" smtClean="0"/>
-              <a:t>6/14/15</a:t>
+              <a:t>15-06-18</a:t>
             </a:fld>
             <a:endParaRPr lang="en-US"/>
           </a:p>
@@ -864,7 +1698,7 @@
 </file>
 
 <file path=ppt/slideLayouts/slideLayout3.xml><?xml version="1.0" encoding="utf-8"?>
-<p:sldLayout xmlns:a="http://schemas.openxmlformats.org/drawingml/2006/main" xmlns:r="http://schemas.openxmlformats.org/officeDocument/2006/relationships" xmlns:mc="http://schemas.openxmlformats.org/markup-compatibility/2006" xmlns:mv="urn:schemas-microsoft-com:mac:vml" xmlns:p="http://schemas.openxmlformats.org/presentationml/2006/main" mc:Ignorable="mv" mc:PreserveAttributes="mv:*" type="secHead" preserve="1">
+<p:sldLayout xmlns:a="http://schemas.openxmlformats.org/drawingml/2006/main" xmlns:r="http://schemas.openxmlformats.org/officeDocument/2006/relationships" xmlns:p="http://schemas.openxmlformats.org/presentationml/2006/main" type="secHead" preserve="1">
   <p:cSld name="Section Header">
     <p:spTree>
       <p:nvGrpSpPr>
@@ -1048,7 +1882,7 @@
           <a:p>
             <a:fld id="{F74420B2-42E2-144C-B565-A6F35EDDC21A}" type="datetimeFigureOut">
               <a:rPr lang="en-US" smtClean="0"/>
-              <a:t>6/14/15</a:t>
+              <a:t>15-06-18</a:t>
             </a:fld>
             <a:endParaRPr lang="en-US"/>
           </a:p>
@@ -1105,7 +1939,7 @@
 </file>
 
 <file path=ppt/slideLayouts/slideLayout4.xml><?xml version="1.0" encoding="utf-8"?>
-<p:sldLayout xmlns:a="http://schemas.openxmlformats.org/drawingml/2006/main" xmlns:r="http://schemas.openxmlformats.org/officeDocument/2006/relationships" xmlns:mc="http://schemas.openxmlformats.org/markup-compatibility/2006" xmlns:mv="urn:schemas-microsoft-com:mac:vml" xmlns:p="http://schemas.openxmlformats.org/presentationml/2006/main" mc:Ignorable="mv" mc:PreserveAttributes="mv:*" type="twoObj" preserve="1">
+<p:sldLayout xmlns:a="http://schemas.openxmlformats.org/drawingml/2006/main" xmlns:r="http://schemas.openxmlformats.org/officeDocument/2006/relationships" xmlns:p="http://schemas.openxmlformats.org/presentationml/2006/main" type="twoObj" preserve="1">
   <p:cSld name="Two Content">
     <p:spTree>
       <p:nvGrpSpPr>
@@ -1331,7 +2165,7 @@
           <a:p>
             <a:fld id="{F74420B2-42E2-144C-B565-A6F35EDDC21A}" type="datetimeFigureOut">
               <a:rPr lang="en-US" smtClean="0"/>
-              <a:t>6/14/15</a:t>
+              <a:t>15-06-18</a:t>
             </a:fld>
             <a:endParaRPr lang="en-US"/>
           </a:p>
@@ -1388,7 +2222,7 @@
 </file>
 
 <file path=ppt/slideLayouts/slideLayout5.xml><?xml version="1.0" encoding="utf-8"?>
-<p:sldLayout xmlns:a="http://schemas.openxmlformats.org/drawingml/2006/main" xmlns:r="http://schemas.openxmlformats.org/officeDocument/2006/relationships" xmlns:mc="http://schemas.openxmlformats.org/markup-compatibility/2006" xmlns:mv="urn:schemas-microsoft-com:mac:vml" xmlns:p="http://schemas.openxmlformats.org/presentationml/2006/main" mc:Ignorable="mv" mc:PreserveAttributes="mv:*" type="twoTxTwoObj" preserve="1">
+<p:sldLayout xmlns:a="http://schemas.openxmlformats.org/drawingml/2006/main" xmlns:r="http://schemas.openxmlformats.org/officeDocument/2006/relationships" xmlns:p="http://schemas.openxmlformats.org/presentationml/2006/main" type="twoTxTwoObj" preserve="1">
   <p:cSld name="Comparison">
     <p:spTree>
       <p:nvGrpSpPr>
@@ -1748,7 +2582,7 @@
           <a:p>
             <a:fld id="{F74420B2-42E2-144C-B565-A6F35EDDC21A}" type="datetimeFigureOut">
               <a:rPr lang="en-US" smtClean="0"/>
-              <a:t>6/14/15</a:t>
+              <a:t>15-06-18</a:t>
             </a:fld>
             <a:endParaRPr lang="en-US"/>
           </a:p>
@@ -1805,7 +2639,7 @@
 </file>
 
 <file path=ppt/slideLayouts/slideLayout6.xml><?xml version="1.0" encoding="utf-8"?>
-<p:sldLayout xmlns:a="http://schemas.openxmlformats.org/drawingml/2006/main" xmlns:r="http://schemas.openxmlformats.org/officeDocument/2006/relationships" xmlns:mc="http://schemas.openxmlformats.org/markup-compatibility/2006" xmlns:mv="urn:schemas-microsoft-com:mac:vml" xmlns:p="http://schemas.openxmlformats.org/presentationml/2006/main" mc:Ignorable="mv" mc:PreserveAttributes="mv:*" type="titleOnly" preserve="1">
+<p:sldLayout xmlns:a="http://schemas.openxmlformats.org/drawingml/2006/main" xmlns:r="http://schemas.openxmlformats.org/officeDocument/2006/relationships" xmlns:p="http://schemas.openxmlformats.org/presentationml/2006/main" type="titleOnly" preserve="1">
   <p:cSld name="Title Only">
     <p:spTree>
       <p:nvGrpSpPr>
@@ -1861,7 +2695,7 @@
           <a:p>
             <a:fld id="{F74420B2-42E2-144C-B565-A6F35EDDC21A}" type="datetimeFigureOut">
               <a:rPr lang="en-US" smtClean="0"/>
-              <a:t>6/14/15</a:t>
+              <a:t>15-06-18</a:t>
             </a:fld>
             <a:endParaRPr lang="en-US"/>
           </a:p>
@@ -1918,7 +2752,7 @@
 </file>
 
 <file path=ppt/slideLayouts/slideLayout7.xml><?xml version="1.0" encoding="utf-8"?>
-<p:sldLayout xmlns:a="http://schemas.openxmlformats.org/drawingml/2006/main" xmlns:r="http://schemas.openxmlformats.org/officeDocument/2006/relationships" xmlns:mc="http://schemas.openxmlformats.org/markup-compatibility/2006" xmlns:mv="urn:schemas-microsoft-com:mac:vml" xmlns:p="http://schemas.openxmlformats.org/presentationml/2006/main" mc:Ignorable="mv" mc:PreserveAttributes="mv:*" type="blank" preserve="1">
+<p:sldLayout xmlns:a="http://schemas.openxmlformats.org/drawingml/2006/main" xmlns:r="http://schemas.openxmlformats.org/officeDocument/2006/relationships" xmlns:p="http://schemas.openxmlformats.org/presentationml/2006/main" type="blank" preserve="1">
   <p:cSld name="Blank">
     <p:spTree>
       <p:nvGrpSpPr>
@@ -1951,7 +2785,7 @@
           <a:p>
             <a:fld id="{F74420B2-42E2-144C-B565-A6F35EDDC21A}" type="datetimeFigureOut">
               <a:rPr lang="en-US" smtClean="0"/>
-              <a:t>6/14/15</a:t>
+              <a:t>15-06-18</a:t>
             </a:fld>
             <a:endParaRPr lang="en-US"/>
           </a:p>
@@ -2008,7 +2842,7 @@
 </file>
 
 <file path=ppt/slideLayouts/slideLayout8.xml><?xml version="1.0" encoding="utf-8"?>
-<p:sldLayout xmlns:a="http://schemas.openxmlformats.org/drawingml/2006/main" xmlns:r="http://schemas.openxmlformats.org/officeDocument/2006/relationships" xmlns:mc="http://schemas.openxmlformats.org/markup-compatibility/2006" xmlns:mv="urn:schemas-microsoft-com:mac:vml" xmlns:p="http://schemas.openxmlformats.org/presentationml/2006/main" mc:Ignorable="mv" mc:PreserveAttributes="mv:*" type="objTx" preserve="1">
+<p:sldLayout xmlns:a="http://schemas.openxmlformats.org/drawingml/2006/main" xmlns:r="http://schemas.openxmlformats.org/officeDocument/2006/relationships" xmlns:p="http://schemas.openxmlformats.org/presentationml/2006/main" type="objTx" preserve="1">
   <p:cSld name="Content with Caption">
     <p:spTree>
       <p:nvGrpSpPr>
@@ -2223,7 +3057,7 @@
           <a:p>
             <a:fld id="{F74420B2-42E2-144C-B565-A6F35EDDC21A}" type="datetimeFigureOut">
               <a:rPr lang="en-US" smtClean="0"/>
-              <a:t>6/14/15</a:t>
+              <a:t>15-06-18</a:t>
             </a:fld>
             <a:endParaRPr lang="en-US"/>
           </a:p>
@@ -2280,7 +3114,7 @@
 </file>
 
 <file path=ppt/slideLayouts/slideLayout9.xml><?xml version="1.0" encoding="utf-8"?>
-<p:sldLayout xmlns:a="http://schemas.openxmlformats.org/drawingml/2006/main" xmlns:r="http://schemas.openxmlformats.org/officeDocument/2006/relationships" xmlns:mc="http://schemas.openxmlformats.org/markup-compatibility/2006" xmlns:mv="urn:schemas-microsoft-com:mac:vml" xmlns:p="http://schemas.openxmlformats.org/presentationml/2006/main" mc:Ignorable="mv" mc:PreserveAttributes="mv:*" type="picTx" preserve="1">
+<p:sldLayout xmlns:a="http://schemas.openxmlformats.org/drawingml/2006/main" xmlns:r="http://schemas.openxmlformats.org/officeDocument/2006/relationships" xmlns:p="http://schemas.openxmlformats.org/presentationml/2006/main" type="picTx" preserve="1">
   <p:cSld name="Picture with Caption">
     <p:spTree>
       <p:nvGrpSpPr>
@@ -2471,7 +3305,7 @@
           <a:p>
             <a:fld id="{F74420B2-42E2-144C-B565-A6F35EDDC21A}" type="datetimeFigureOut">
               <a:rPr lang="en-US" smtClean="0"/>
-              <a:t>6/14/15</a:t>
+              <a:t>15-06-18</a:t>
             </a:fld>
             <a:endParaRPr lang="en-US"/>
           </a:p>
@@ -2528,7 +3362,7 @@
 </file>
 
 <file path=ppt/slideMasters/slideMaster1.xml><?xml version="1.0" encoding="utf-8"?>
-<p:sldMaster xmlns:a="http://schemas.openxmlformats.org/drawingml/2006/main" xmlns:r="http://schemas.openxmlformats.org/officeDocument/2006/relationships" xmlns:mc="http://schemas.openxmlformats.org/markup-compatibility/2006" xmlns:mv="urn:schemas-microsoft-com:mac:vml" xmlns:p="http://schemas.openxmlformats.org/presentationml/2006/main" mc:Ignorable="mv" mc:PreserveAttributes="mv:*">
+<p:sldMaster xmlns:a="http://schemas.openxmlformats.org/drawingml/2006/main" xmlns:r="http://schemas.openxmlformats.org/officeDocument/2006/relationships" xmlns:p="http://schemas.openxmlformats.org/presentationml/2006/main">
   <p:cSld>
     <p:bg>
       <p:bgRef idx="1001">
@@ -2679,7 +3513,7 @@
           <a:p>
             <a:fld id="{F74420B2-42E2-144C-B565-A6F35EDDC21A}" type="datetimeFigureOut">
               <a:rPr lang="en-US" smtClean="0"/>
-              <a:t>6/14/15</a:t>
+              <a:t>15-06-18</a:t>
             </a:fld>
             <a:endParaRPr lang="en-US"/>
           </a:p>
@@ -3033,7 +3867,7 @@
 </file>
 
 <file path=ppt/slides/slide1.xml><?xml version="1.0" encoding="utf-8"?>
-<p:sld xmlns:a="http://schemas.openxmlformats.org/drawingml/2006/main" xmlns:r="http://schemas.openxmlformats.org/officeDocument/2006/relationships" xmlns:mc="http://schemas.openxmlformats.org/markup-compatibility/2006" xmlns:mv="urn:schemas-microsoft-com:mac:vml" xmlns:p="http://schemas.openxmlformats.org/presentationml/2006/main" mc:Ignorable="mv" mc:PreserveAttributes="mv:*">
+<p:sld xmlns:a="http://schemas.openxmlformats.org/drawingml/2006/main" xmlns:r="http://schemas.openxmlformats.org/officeDocument/2006/relationships" xmlns:p="http://schemas.openxmlformats.org/presentationml/2006/main">
   <p:cSld>
     <p:spTree>
       <p:nvGrpSpPr>
@@ -3065,8 +3899,32 @@
         </p:blipFill>
         <p:spPr>
           <a:xfrm>
-            <a:off x="811796" y="1069072"/>
-            <a:ext cx="7572810" cy="4733006"/>
+            <a:off x="691772" y="1186027"/>
+            <a:ext cx="7796083" cy="4872552"/>
+          </a:xfrm>
+          <a:prstGeom prst="rect">
+            <a:avLst/>
+          </a:prstGeom>
+        </p:spPr>
+      </p:pic>
+      <p:pic>
+        <p:nvPicPr>
+          <p:cNvPr id="2" name="Picture 1"/>
+          <p:cNvPicPr>
+            <a:picLocks noChangeAspect="1"/>
+          </p:cNvPicPr>
+          <p:nvPr/>
+        </p:nvPicPr>
+        <p:blipFill>
+          <a:blip r:embed="rId3"/>
+          <a:stretch>
+            <a:fillRect/>
+          </a:stretch>
+        </p:blipFill>
+        <p:spPr>
+          <a:xfrm>
+            <a:off x="6319133" y="249293"/>
+            <a:ext cx="2631231" cy="747708"/>
           </a:xfrm>
           <a:prstGeom prst="rect">
             <a:avLst/>
@@ -3081,7 +3939,7 @@
   <p:timing>
     <p:tnLst>
       <p:par>
-        <p:cTn id="1" dur="indefinite" restart="never" nodeType="tmRoot"/>
+        <p:cTn xmlns:p14="http://schemas.microsoft.com/office/powerpoint/2010/main" id="1" dur="indefinite" restart="never" nodeType="tmRoot"/>
       </p:par>
     </p:tnLst>
   </p:timing>
@@ -3089,7 +3947,7 @@
 </file>
 
 <file path=ppt/slides/slide10.xml><?xml version="1.0" encoding="utf-8"?>
-<p:sld xmlns:a="http://schemas.openxmlformats.org/drawingml/2006/main" xmlns:r="http://schemas.openxmlformats.org/officeDocument/2006/relationships" xmlns:mc="http://schemas.openxmlformats.org/markup-compatibility/2006" xmlns:mv="urn:schemas-microsoft-com:mac:vml" xmlns:p="http://schemas.openxmlformats.org/presentationml/2006/main" mc:Ignorable="mv" mc:PreserveAttributes="mv:*">
+<p:sld xmlns:a="http://schemas.openxmlformats.org/drawingml/2006/main" xmlns:r="http://schemas.openxmlformats.org/officeDocument/2006/relationships" xmlns:p="http://schemas.openxmlformats.org/presentationml/2006/main">
   <p:cSld>
     <p:spTree>
       <p:nvGrpSpPr>
@@ -3194,7 +4052,7 @@
   <p:timing>
     <p:tnLst>
       <p:par>
-        <p:cTn id="1" dur="indefinite" restart="never" nodeType="tmRoot"/>
+        <p:cTn xmlns:p14="http://schemas.microsoft.com/office/powerpoint/2010/main" id="1" dur="indefinite" restart="never" nodeType="tmRoot"/>
       </p:par>
     </p:tnLst>
   </p:timing>
@@ -3202,7 +4060,7 @@
 </file>
 
 <file path=ppt/slides/slide11.xml><?xml version="1.0" encoding="utf-8"?>
-<p:sld xmlns:a="http://schemas.openxmlformats.org/drawingml/2006/main" xmlns:r="http://schemas.openxmlformats.org/officeDocument/2006/relationships" xmlns:mc="http://schemas.openxmlformats.org/markup-compatibility/2006" xmlns:mv="urn:schemas-microsoft-com:mac:vml" xmlns:p="http://schemas.openxmlformats.org/presentationml/2006/main" mc:Ignorable="mv" mc:PreserveAttributes="mv:*">
+<p:sld xmlns:a="http://schemas.openxmlformats.org/drawingml/2006/main" xmlns:r="http://schemas.openxmlformats.org/officeDocument/2006/relationships" xmlns:p="http://schemas.openxmlformats.org/presentationml/2006/main">
   <p:cSld>
     <p:spTree>
       <p:nvGrpSpPr>
@@ -3313,7 +4171,7 @@
   <p:timing>
     <p:tnLst>
       <p:par>
-        <p:cTn id="1" dur="indefinite" restart="never" nodeType="tmRoot"/>
+        <p:cTn xmlns:p14="http://schemas.microsoft.com/office/powerpoint/2010/main" id="1" dur="indefinite" restart="never" nodeType="tmRoot"/>
       </p:par>
     </p:tnLst>
   </p:timing>
@@ -3321,7 +4179,7 @@
 </file>
 
 <file path=ppt/slides/slide12.xml><?xml version="1.0" encoding="utf-8"?>
-<p:sld xmlns:a="http://schemas.openxmlformats.org/drawingml/2006/main" xmlns:r="http://schemas.openxmlformats.org/officeDocument/2006/relationships" xmlns:mc="http://schemas.openxmlformats.org/markup-compatibility/2006" xmlns:mv="urn:schemas-microsoft-com:mac:vml" xmlns:p="http://schemas.openxmlformats.org/presentationml/2006/main" mc:Ignorable="mv" mc:PreserveAttributes="mv:*">
+<p:sld xmlns:a="http://schemas.openxmlformats.org/drawingml/2006/main" xmlns:r="http://schemas.openxmlformats.org/officeDocument/2006/relationships" xmlns:p="http://schemas.openxmlformats.org/presentationml/2006/main">
   <p:cSld>
     <p:spTree>
       <p:nvGrpSpPr>
@@ -3416,7 +4274,7 @@
   <p:timing>
     <p:tnLst>
       <p:par>
-        <p:cTn id="1" dur="indefinite" restart="never" nodeType="tmRoot"/>
+        <p:cTn xmlns:p14="http://schemas.microsoft.com/office/powerpoint/2010/main" id="1" dur="indefinite" restart="never" nodeType="tmRoot"/>
       </p:par>
     </p:tnLst>
   </p:timing>
@@ -3424,7 +4282,7 @@
 </file>
 
 <file path=ppt/slides/slide13.xml><?xml version="1.0" encoding="utf-8"?>
-<p:sld xmlns:a="http://schemas.openxmlformats.org/drawingml/2006/main" xmlns:r="http://schemas.openxmlformats.org/officeDocument/2006/relationships" xmlns:mc="http://schemas.openxmlformats.org/markup-compatibility/2006" xmlns:mv="urn:schemas-microsoft-com:mac:vml" xmlns:p="http://schemas.openxmlformats.org/presentationml/2006/main" mc:Ignorable="mv" mc:PreserveAttributes="mv:*">
+<p:sld xmlns:a="http://schemas.openxmlformats.org/drawingml/2006/main" xmlns:r="http://schemas.openxmlformats.org/officeDocument/2006/relationships" xmlns:p="http://schemas.openxmlformats.org/presentationml/2006/main">
   <p:cSld>
     <p:spTree>
       <p:nvGrpSpPr>
@@ -3500,7 +4358,7 @@
   <p:timing>
     <p:tnLst>
       <p:par>
-        <p:cTn id="1" dur="indefinite" restart="never" nodeType="tmRoot"/>
+        <p:cTn xmlns:p14="http://schemas.microsoft.com/office/powerpoint/2010/main" id="1" dur="indefinite" restart="never" nodeType="tmRoot"/>
       </p:par>
     </p:tnLst>
   </p:timing>
@@ -3508,7 +4366,7 @@
 </file>
 
 <file path=ppt/slides/slide14.xml><?xml version="1.0" encoding="utf-8"?>
-<p:sld xmlns:a="http://schemas.openxmlformats.org/drawingml/2006/main" xmlns:r="http://schemas.openxmlformats.org/officeDocument/2006/relationships" xmlns:mc="http://schemas.openxmlformats.org/markup-compatibility/2006" xmlns:mv="urn:schemas-microsoft-com:mac:vml" xmlns:p="http://schemas.openxmlformats.org/presentationml/2006/main" mc:Ignorable="mv" mc:PreserveAttributes="mv:*">
+<p:sld xmlns:a="http://schemas.openxmlformats.org/drawingml/2006/main" xmlns:r="http://schemas.openxmlformats.org/officeDocument/2006/relationships" xmlns:p="http://schemas.openxmlformats.org/presentationml/2006/main">
   <p:cSld>
     <p:spTree>
       <p:nvGrpSpPr>
@@ -3570,7 +4428,7 @@
   <p:timing>
     <p:tnLst>
       <p:par>
-        <p:cTn id="1" dur="indefinite" restart="never" nodeType="tmRoot"/>
+        <p:cTn xmlns:p14="http://schemas.microsoft.com/office/powerpoint/2010/main" id="1" dur="indefinite" restart="never" nodeType="tmRoot"/>
       </p:par>
     </p:tnLst>
   </p:timing>
@@ -3578,7 +4436,7 @@
 </file>
 
 <file path=ppt/slides/slide15.xml><?xml version="1.0" encoding="utf-8"?>
-<p:sld xmlns:a="http://schemas.openxmlformats.org/drawingml/2006/main" xmlns:r="http://schemas.openxmlformats.org/officeDocument/2006/relationships" xmlns:mc="http://schemas.openxmlformats.org/markup-compatibility/2006" xmlns:mv="urn:schemas-microsoft-com:mac:vml" xmlns:p="http://schemas.openxmlformats.org/presentationml/2006/main" mc:Ignorable="mv" mc:PreserveAttributes="mv:*">
+<p:sld xmlns:a="http://schemas.openxmlformats.org/drawingml/2006/main" xmlns:r="http://schemas.openxmlformats.org/officeDocument/2006/relationships" xmlns:p="http://schemas.openxmlformats.org/presentationml/2006/main">
   <p:cSld>
     <p:spTree>
       <p:nvGrpSpPr>
@@ -3640,7 +4498,7 @@
   <p:timing>
     <p:tnLst>
       <p:par>
-        <p:cTn id="1" dur="indefinite" restart="never" nodeType="tmRoot"/>
+        <p:cTn xmlns:p14="http://schemas.microsoft.com/office/powerpoint/2010/main" id="1" dur="indefinite" restart="never" nodeType="tmRoot"/>
       </p:par>
     </p:tnLst>
   </p:timing>
@@ -3648,7 +4506,7 @@
 </file>
 
 <file path=ppt/slides/slide2.xml><?xml version="1.0" encoding="utf-8"?>
-<p:sld xmlns:a="http://schemas.openxmlformats.org/drawingml/2006/main" xmlns:r="http://schemas.openxmlformats.org/officeDocument/2006/relationships" xmlns:mc="http://schemas.openxmlformats.org/markup-compatibility/2006" xmlns:mv="urn:schemas-microsoft-com:mac:vml" xmlns:p="http://schemas.openxmlformats.org/presentationml/2006/main" mc:Ignorable="mv" mc:PreserveAttributes="mv:*">
+<p:sld xmlns:a="http://schemas.openxmlformats.org/drawingml/2006/main" xmlns:r="http://schemas.openxmlformats.org/officeDocument/2006/relationships" xmlns:p="http://schemas.openxmlformats.org/presentationml/2006/main">
   <p:cSld>
     <p:spTree>
       <p:nvGrpSpPr>
@@ -3680,8 +4538,182 @@
         </p:blipFill>
         <p:spPr>
           <a:xfrm>
-            <a:off x="0" y="700055"/>
-            <a:ext cx="9144000" cy="5457889"/>
+            <a:off x="948663" y="302282"/>
+            <a:ext cx="7283052" cy="4347123"/>
+          </a:xfrm>
+          <a:prstGeom prst="rect">
+            <a:avLst/>
+          </a:prstGeom>
+        </p:spPr>
+      </p:pic>
+      <p:sp>
+        <p:nvSpPr>
+          <p:cNvPr id="3" name="Content Placeholder 2"/>
+          <p:cNvSpPr>
+            <a:spLocks noGrp="1"/>
+          </p:cNvSpPr>
+          <p:nvPr>
+            <p:ph idx="1"/>
+          </p:nvPr>
+        </p:nvSpPr>
+        <p:spPr>
+          <a:xfrm>
+            <a:off x="503103" y="5247711"/>
+            <a:ext cx="8229600" cy="1383319"/>
+          </a:xfrm>
+        </p:spPr>
+        <p:txBody>
+          <a:bodyPr>
+            <a:normAutofit fontScale="70000" lnSpcReduction="20000"/>
+          </a:bodyPr>
+          <a:lstStyle/>
+          <a:p>
+            <a:pPr marL="0" indent="0">
+              <a:buNone/>
+            </a:pPr>
+            <a:r>
+              <a:rPr lang="en-US" b="1" dirty="0" smtClean="0"/>
+              <a:t>Led by: </a:t>
+            </a:r>
+            <a:r>
+              <a:rPr lang="en-US" dirty="0" smtClean="0"/>
+              <a:t>Dr. Vishal </a:t>
+            </a:r>
+            <a:r>
+              <a:rPr lang="en-US" dirty="0" err="1" smtClean="0"/>
+              <a:t>Avinashi</a:t>
+            </a:r>
+            <a:endParaRPr lang="en-US" dirty="0" smtClean="0"/>
+          </a:p>
+          <a:p>
+            <a:endParaRPr lang="en-US" dirty="0" smtClean="0"/>
+          </a:p>
+          <a:p>
+            <a:pPr marL="0" indent="0">
+              <a:buNone/>
+            </a:pPr>
+            <a:r>
+              <a:rPr lang="en-US" b="1" dirty="0" smtClean="0"/>
+              <a:t>Team Members: </a:t>
+            </a:r>
+            <a:r>
+              <a:rPr lang="en-US" dirty="0" err="1"/>
+              <a:t>Sohail</a:t>
+            </a:r>
+            <a:r>
+              <a:rPr lang="en-US" dirty="0"/>
+              <a:t> </a:t>
+            </a:r>
+            <a:r>
+              <a:rPr lang="en-US" dirty="0" err="1" smtClean="0"/>
+              <a:t>Vaghari</a:t>
+            </a:r>
+            <a:r>
+              <a:rPr lang="en-US" dirty="0" smtClean="0"/>
+              <a:t>, </a:t>
+            </a:r>
+            <a:r>
+              <a:rPr lang="en-US" dirty="0"/>
+              <a:t>Dou </a:t>
+            </a:r>
+            <a:r>
+              <a:rPr lang="en-US" dirty="0" err="1" smtClean="0"/>
+              <a:t>Mok</a:t>
+            </a:r>
+            <a:r>
+              <a:rPr lang="en-US" dirty="0" smtClean="0"/>
+              <a:t>, </a:t>
+            </a:r>
+            <a:r>
+              <a:rPr lang="en-US" dirty="0"/>
+              <a:t>Kayla </a:t>
+            </a:r>
+            <a:r>
+              <a:rPr lang="en-US" dirty="0" smtClean="0"/>
+              <a:t>Lee, </a:t>
+            </a:r>
+            <a:r>
+              <a:rPr lang="en-US" dirty="0"/>
+              <a:t>John </a:t>
+            </a:r>
+            <a:r>
+              <a:rPr lang="en-US" dirty="0" smtClean="0"/>
+              <a:t>Lim, </a:t>
+            </a:r>
+            <a:r>
+              <a:rPr lang="en-US" dirty="0" err="1"/>
+              <a:t>Aditi</a:t>
+            </a:r>
+            <a:r>
+              <a:rPr lang="en-US" dirty="0"/>
+              <a:t> </a:t>
+            </a:r>
+            <a:r>
+              <a:rPr lang="en-US" dirty="0" err="1" smtClean="0"/>
+              <a:t>Chak</a:t>
+            </a:r>
+            <a:r>
+              <a:rPr lang="en-US" dirty="0" smtClean="0"/>
+              <a:t>, </a:t>
+            </a:r>
+            <a:r>
+              <a:rPr lang="en-US" dirty="0" err="1"/>
+              <a:t>Akiff</a:t>
+            </a:r>
+            <a:r>
+              <a:rPr lang="en-US" dirty="0"/>
+              <a:t> </a:t>
+            </a:r>
+            <a:r>
+              <a:rPr lang="en-US" dirty="0" err="1" smtClean="0"/>
+              <a:t>Manji</a:t>
+            </a:r>
+            <a:r>
+              <a:rPr lang="en-US" dirty="0" smtClean="0"/>
+              <a:t>, </a:t>
+            </a:r>
+            <a:r>
+              <a:rPr lang="en-US" dirty="0"/>
+              <a:t>Lisa </a:t>
+            </a:r>
+            <a:r>
+              <a:rPr lang="en-US" dirty="0" smtClean="0"/>
+              <a:t>Wong, </a:t>
+            </a:r>
+            <a:r>
+              <a:rPr lang="en-US" dirty="0"/>
+              <a:t>Eric </a:t>
+            </a:r>
+            <a:r>
+              <a:rPr lang="en-US" dirty="0" smtClean="0"/>
+              <a:t>Kim, Yi </a:t>
+            </a:r>
+            <a:r>
+              <a:rPr lang="en-US" dirty="0"/>
+              <a:t>Tan</a:t>
+            </a:r>
+            <a:endParaRPr lang="en-US" dirty="0"/>
+          </a:p>
+        </p:txBody>
+      </p:sp>
+      <p:pic>
+        <p:nvPicPr>
+          <p:cNvPr id="2" name="Picture 1"/>
+          <p:cNvPicPr>
+            <a:picLocks noChangeAspect="1"/>
+          </p:cNvPicPr>
+          <p:nvPr/>
+        </p:nvPicPr>
+        <p:blipFill>
+          <a:blip r:embed="rId3"/>
+          <a:stretch>
+            <a:fillRect/>
+          </a:stretch>
+        </p:blipFill>
+        <p:spPr>
+          <a:xfrm>
+            <a:off x="3781277" y="5023619"/>
+            <a:ext cx="1145494" cy="804381"/>
           </a:xfrm>
           <a:prstGeom prst="rect">
             <a:avLst/>
@@ -3696,7 +4728,7 @@
   <p:timing>
     <p:tnLst>
       <p:par>
-        <p:cTn id="1" dur="indefinite" restart="never" nodeType="tmRoot"/>
+        <p:cTn xmlns:p14="http://schemas.microsoft.com/office/powerpoint/2010/main" id="1" dur="indefinite" restart="never" nodeType="tmRoot"/>
       </p:par>
     </p:tnLst>
   </p:timing>
@@ -3704,7 +4736,7 @@
 </file>
 
 <file path=ppt/slides/slide3.xml><?xml version="1.0" encoding="utf-8"?>
-<p:sld xmlns:a="http://schemas.openxmlformats.org/drawingml/2006/main" xmlns:r="http://schemas.openxmlformats.org/officeDocument/2006/relationships" xmlns:mc="http://schemas.openxmlformats.org/markup-compatibility/2006" xmlns:mv="urn:schemas-microsoft-com:mac:vml" xmlns:p="http://schemas.openxmlformats.org/presentationml/2006/main" mc:Ignorable="mv" mc:PreserveAttributes="mv:*">
+<p:sld xmlns:a="http://schemas.openxmlformats.org/drawingml/2006/main" xmlns:r="http://schemas.openxmlformats.org/officeDocument/2006/relationships" xmlns:p="http://schemas.openxmlformats.org/presentationml/2006/main">
   <p:cSld>
     <p:spTree>
       <p:nvGrpSpPr>
@@ -3839,7 +4871,7 @@
   <p:timing>
     <p:tnLst>
       <p:par>
-        <p:cTn id="1" dur="indefinite" restart="never" nodeType="tmRoot"/>
+        <p:cTn xmlns:p14="http://schemas.microsoft.com/office/powerpoint/2010/main" id="1" dur="indefinite" restart="never" nodeType="tmRoot"/>
       </p:par>
     </p:tnLst>
   </p:timing>
@@ -3847,7 +4879,7 @@
 </file>
 
 <file path=ppt/slides/slide4.xml><?xml version="1.0" encoding="utf-8"?>
-<p:sld xmlns:a="http://schemas.openxmlformats.org/drawingml/2006/main" xmlns:r="http://schemas.openxmlformats.org/officeDocument/2006/relationships" xmlns:mc="http://schemas.openxmlformats.org/markup-compatibility/2006" xmlns:mv="urn:schemas-microsoft-com:mac:vml" xmlns:p="http://schemas.openxmlformats.org/presentationml/2006/main" mc:Ignorable="mv" mc:PreserveAttributes="mv:*">
+<p:sld xmlns:a="http://schemas.openxmlformats.org/drawingml/2006/main" xmlns:r="http://schemas.openxmlformats.org/officeDocument/2006/relationships" xmlns:p="http://schemas.openxmlformats.org/presentationml/2006/main">
   <p:cSld>
     <p:spTree>
       <p:nvGrpSpPr>
@@ -3928,7 +4960,7 @@
           <p:nvPr/>
         </p:nvPicPr>
         <p:blipFill>
-          <a:blip r:embed="rId2"/>
+          <a:blip r:embed="rId3"/>
           <a:stretch>
             <a:fillRect/>
           </a:stretch>
@@ -4145,7 +5177,7 @@
   <p:timing>
     <p:tnLst>
       <p:par>
-        <p:cTn id="1" dur="indefinite" restart="never" nodeType="tmRoot"/>
+        <p:cTn xmlns:p14="http://schemas.microsoft.com/office/powerpoint/2010/main" id="1" dur="indefinite" restart="never" nodeType="tmRoot"/>
       </p:par>
     </p:tnLst>
   </p:timing>
@@ -4153,7 +5185,7 @@
 </file>
 
 <file path=ppt/slides/slide5.xml><?xml version="1.0" encoding="utf-8"?>
-<p:sld xmlns:a="http://schemas.openxmlformats.org/drawingml/2006/main" xmlns:r="http://schemas.openxmlformats.org/officeDocument/2006/relationships" xmlns:mc="http://schemas.openxmlformats.org/markup-compatibility/2006" xmlns:mv="urn:schemas-microsoft-com:mac:vml" xmlns:p="http://schemas.openxmlformats.org/presentationml/2006/main" mc:Ignorable="mv" mc:PreserveAttributes="mv:*">
+<p:sld xmlns:a="http://schemas.openxmlformats.org/drawingml/2006/main" xmlns:r="http://schemas.openxmlformats.org/officeDocument/2006/relationships" xmlns:p="http://schemas.openxmlformats.org/presentationml/2006/main">
   <p:cSld>
     <p:spTree>
       <p:nvGrpSpPr>
@@ -4230,7 +5262,6 @@
               <a:rPr lang="en-US" dirty="0" smtClean="0"/>
               <a:t>Does not store the information</a:t>
             </a:r>
-            <a:endParaRPr lang="en-US" dirty="0" smtClean="0"/>
           </a:p>
           <a:p>
             <a:pPr lvl="1"/>
@@ -4300,7 +5331,7 @@
           <p:nvPr/>
         </p:nvPicPr>
         <p:blipFill>
-          <a:blip r:embed="rId2"/>
+          <a:blip r:embed="rId3"/>
           <a:stretch>
             <a:fillRect/>
           </a:stretch>
@@ -4356,7 +5387,7 @@
               <a:defRPr/>
             </a:pPr>
             <a:r>
-              <a:rPr kumimoji="0" lang="en-US" sz="3200" b="0" i="0" u="none" strike="noStrike" kern="1200" cap="none" spc="0" normalizeH="0" baseline="0" noProof="0" smtClean="0">
+              <a:rPr kumimoji="0" lang="en-US" sz="3200" b="0" i="0" u="none" strike="noStrike" kern="1200" cap="none" spc="0" normalizeH="0" baseline="0" noProof="0" dirty="0" smtClean="0">
                 <a:ln>
                   <a:noFill/>
                 </a:ln>
@@ -4370,7 +5401,41 @@
                 <a:ea typeface="+mn-ea"/>
                 <a:cs typeface="+mn-cs"/>
               </a:rPr>
-              <a:t>INSERT PIC OF PAPER CHART</a:t>
+              <a:t>INSERT PIC </a:t>
+            </a:r>
+            <a:r>
+              <a:rPr kumimoji="0" lang="en-US" sz="3200" b="0" i="0" u="none" strike="noStrike" kern="1200" cap="none" spc="0" normalizeH="0" baseline="0" noProof="0" dirty="0" smtClean="0">
+                <a:ln>
+                  <a:noFill/>
+                </a:ln>
+                <a:solidFill>
+                  <a:schemeClr val="tx1"/>
+                </a:solidFill>
+                <a:effectLst/>
+                <a:uLnTx/>
+                <a:uFillTx/>
+                <a:latin typeface="+mn-lt"/>
+                <a:ea typeface="+mn-ea"/>
+                <a:cs typeface="+mn-cs"/>
+              </a:rPr>
+              <a:t>OF</a:t>
+            </a:r>
+            <a:r>
+              <a:rPr kumimoji="0" lang="en-US" sz="3200" b="0" i="0" u="none" strike="noStrike" kern="1200" cap="none" spc="0" normalizeH="0" noProof="0" dirty="0" smtClean="0">
+                <a:ln>
+                  <a:noFill/>
+                </a:ln>
+                <a:solidFill>
+                  <a:schemeClr val="tx1"/>
+                </a:solidFill>
+                <a:effectLst/>
+                <a:uLnTx/>
+                <a:uFillTx/>
+                <a:latin typeface="+mn-lt"/>
+                <a:ea typeface="+mn-ea"/>
+                <a:cs typeface="+mn-cs"/>
+              </a:rPr>
+              <a:t> OTHER APPS/SITES</a:t>
             </a:r>
             <a:endParaRPr kumimoji="0" lang="en-US" sz="3200" b="0" i="0" u="none" strike="noStrike" kern="1200" cap="none" spc="0" normalizeH="0" baseline="0" noProof="0" dirty="0" smtClean="0">
               <a:ln>
@@ -4397,7 +5462,7 @@
   <p:timing>
     <p:tnLst>
       <p:par>
-        <p:cTn id="1" dur="indefinite" restart="never" nodeType="tmRoot"/>
+        <p:cTn xmlns:p14="http://schemas.microsoft.com/office/powerpoint/2010/main" id="1" dur="indefinite" restart="never" nodeType="tmRoot"/>
       </p:par>
     </p:tnLst>
   </p:timing>
@@ -4405,7 +5470,7 @@
 </file>
 
 <file path=ppt/slides/slide6.xml><?xml version="1.0" encoding="utf-8"?>
-<p:sld xmlns:a="http://schemas.openxmlformats.org/drawingml/2006/main" xmlns:r="http://schemas.openxmlformats.org/officeDocument/2006/relationships" xmlns:mc="http://schemas.openxmlformats.org/markup-compatibility/2006" xmlns:mv="urn:schemas-microsoft-com:mac:vml" xmlns:p="http://schemas.openxmlformats.org/presentationml/2006/main" mc:Ignorable="mv" mc:PreserveAttributes="mv:*">
+<p:sld xmlns:a="http://schemas.openxmlformats.org/drawingml/2006/main" xmlns:r="http://schemas.openxmlformats.org/officeDocument/2006/relationships" xmlns:p="http://schemas.openxmlformats.org/presentationml/2006/main">
   <p:cSld>
     <p:spTree>
       <p:nvGrpSpPr>
@@ -4499,6 +5564,109 @@
           </a:p>
           <a:p>
             <a:endParaRPr lang="en-US" dirty="0"/>
+          </a:p>
+        </p:txBody>
+      </p:sp>
+      <p:pic>
+        <p:nvPicPr>
+          <p:cNvPr id="4" name="Picture 3" descr="Logo_Login.png"/>
+          <p:cNvPicPr>
+            <a:picLocks noChangeAspect="1"/>
+          </p:cNvPicPr>
+          <p:nvPr/>
+        </p:nvPicPr>
+        <p:blipFill>
+          <a:blip r:embed="rId3"/>
+          <a:stretch>
+            <a:fillRect/>
+          </a:stretch>
+        </p:blipFill>
+        <p:spPr>
+          <a:xfrm>
+            <a:off x="432095" y="366633"/>
+            <a:ext cx="1584249" cy="990156"/>
+          </a:xfrm>
+          <a:prstGeom prst="rect">
+            <a:avLst/>
+          </a:prstGeom>
+        </p:spPr>
+      </p:pic>
+    </p:spTree>
+  </p:cSld>
+  <p:clrMapOvr>
+    <a:masterClrMapping/>
+  </p:clrMapOvr>
+  <p:timing>
+    <p:tnLst>
+      <p:par>
+        <p:cTn xmlns:p14="http://schemas.microsoft.com/office/powerpoint/2010/main" id="1" dur="indefinite" restart="never" nodeType="tmRoot"/>
+      </p:par>
+    </p:tnLst>
+  </p:timing>
+</p:sld>
+</file>
+
+<file path=ppt/slides/slide7.xml><?xml version="1.0" encoding="utf-8"?>
+<p:sld xmlns:a="http://schemas.openxmlformats.org/drawingml/2006/main" xmlns:r="http://schemas.openxmlformats.org/officeDocument/2006/relationships" xmlns:p="http://schemas.openxmlformats.org/presentationml/2006/main">
+  <p:cSld>
+    <p:spTree>
+      <p:nvGrpSpPr>
+        <p:cNvPr id="1" name=""/>
+        <p:cNvGrpSpPr/>
+        <p:nvPr/>
+      </p:nvGrpSpPr>
+      <p:grpSpPr>
+        <a:xfrm>
+          <a:off x="0" y="0"/>
+          <a:ext cx="0" cy="0"/>
+          <a:chOff x="0" y="0"/>
+          <a:chExt cx="0" cy="0"/>
+        </a:xfrm>
+      </p:grpSpPr>
+      <p:sp>
+        <p:nvSpPr>
+          <p:cNvPr id="2" name="Title 1"/>
+          <p:cNvSpPr>
+            <a:spLocks noGrp="1"/>
+          </p:cNvSpPr>
+          <p:nvPr>
+            <p:ph type="title"/>
+          </p:nvPr>
+        </p:nvSpPr>
+        <p:spPr>
+          <a:xfrm>
+            <a:off x="2173480" y="274638"/>
+            <a:ext cx="6513319" cy="1143000"/>
+          </a:xfrm>
+        </p:spPr>
+        <p:txBody>
+          <a:bodyPr/>
+          <a:lstStyle/>
+          <a:p>
+            <a:r>
+              <a:rPr lang="en-US" dirty="0" smtClean="0"/>
+              <a:t>Features</a:t>
+            </a:r>
+            <a:endParaRPr lang="en-US" dirty="0"/>
+          </a:p>
+        </p:txBody>
+      </p:sp>
+      <p:sp>
+        <p:nvSpPr>
+          <p:cNvPr id="3" name="Content Placeholder 2"/>
+          <p:cNvSpPr>
+            <a:spLocks noGrp="1"/>
+          </p:cNvSpPr>
+          <p:nvPr>
+            <p:ph idx="1"/>
+          </p:nvPr>
+        </p:nvSpPr>
+        <p:spPr/>
+        <p:txBody>
+          <a:bodyPr/>
+          <a:lstStyle/>
+          <a:p>
+            <a:endParaRPr lang="en-US"/>
           </a:p>
         </p:txBody>
       </p:sp>
@@ -4534,15 +5702,15 @@
   <p:timing>
     <p:tnLst>
       <p:par>
-        <p:cTn id="1" dur="indefinite" restart="never" nodeType="tmRoot"/>
+        <p:cTn xmlns:p14="http://schemas.microsoft.com/office/powerpoint/2010/main" id="1" dur="indefinite" restart="never" nodeType="tmRoot"/>
       </p:par>
     </p:tnLst>
   </p:timing>
 </p:sld>
 </file>
 
-<file path=ppt/slides/slide7.xml><?xml version="1.0" encoding="utf-8"?>
-<p:sld xmlns:a="http://schemas.openxmlformats.org/drawingml/2006/main" xmlns:r="http://schemas.openxmlformats.org/officeDocument/2006/relationships" xmlns:mc="http://schemas.openxmlformats.org/markup-compatibility/2006" xmlns:mv="urn:schemas-microsoft-com:mac:vml" xmlns:p="http://schemas.openxmlformats.org/presentationml/2006/main" mc:Ignorable="mv" mc:PreserveAttributes="mv:*">
+<file path=ppt/slides/slide8.xml><?xml version="1.0" encoding="utf-8"?>
+<p:sld xmlns:a="http://schemas.openxmlformats.org/drawingml/2006/main" xmlns:r="http://schemas.openxmlformats.org/officeDocument/2006/relationships" xmlns:p="http://schemas.openxmlformats.org/presentationml/2006/main">
   <p:cSld>
     <p:spTree>
       <p:nvGrpSpPr>
@@ -4580,7 +5748,499 @@
           <a:p>
             <a:r>
               <a:rPr lang="en-US" dirty="0" smtClean="0"/>
-              <a:t>Features</a:t>
+              <a:t>3 Easy Steps</a:t>
+            </a:r>
+            <a:endParaRPr lang="en-US" dirty="0"/>
+          </a:p>
+        </p:txBody>
+      </p:sp>
+      <p:pic>
+        <p:nvPicPr>
+          <p:cNvPr id="4" name="Picture 3" descr="Logo_Login.png"/>
+          <p:cNvPicPr>
+            <a:picLocks noChangeAspect="1"/>
+          </p:cNvPicPr>
+          <p:nvPr/>
+        </p:nvPicPr>
+        <p:blipFill>
+          <a:blip r:embed="rId2"/>
+          <a:stretch>
+            <a:fillRect/>
+          </a:stretch>
+        </p:blipFill>
+        <p:spPr>
+          <a:xfrm>
+            <a:off x="432095" y="366633"/>
+            <a:ext cx="1584249" cy="990156"/>
+          </a:xfrm>
+          <a:prstGeom prst="rect">
+            <a:avLst/>
+          </a:prstGeom>
+        </p:spPr>
+      </p:pic>
+      <p:sp>
+        <p:nvSpPr>
+          <p:cNvPr id="6" name="Content Placeholder 2"/>
+          <p:cNvSpPr>
+            <a:spLocks noGrp="1"/>
+          </p:cNvSpPr>
+          <p:nvPr>
+            <p:ph idx="1"/>
+          </p:nvPr>
+        </p:nvSpPr>
+        <p:spPr>
+          <a:xfrm>
+            <a:off x="432095" y="1739900"/>
+            <a:ext cx="2488905" cy="4525963"/>
+          </a:xfrm>
+        </p:spPr>
+        <p:style>
+          <a:lnRef idx="2">
+            <a:schemeClr val="dk1"/>
+          </a:lnRef>
+          <a:fillRef idx="1">
+            <a:schemeClr val="lt1"/>
+          </a:fillRef>
+          <a:effectRef idx="0">
+            <a:schemeClr val="dk1"/>
+          </a:effectRef>
+          <a:fontRef idx="minor">
+            <a:schemeClr val="dk1"/>
+          </a:fontRef>
+        </p:style>
+        <p:txBody>
+          <a:bodyPr/>
+          <a:lstStyle/>
+          <a:p>
+            <a:r>
+              <a:rPr lang="en-US" dirty="0" smtClean="0"/>
+              <a:t>INSERT </a:t>
+            </a:r>
+            <a:r>
+              <a:rPr lang="en-US" dirty="0" smtClean="0"/>
+              <a:t>PIC OF STEP 1</a:t>
+            </a:r>
+            <a:endParaRPr lang="en-US" dirty="0"/>
+          </a:p>
+        </p:txBody>
+      </p:sp>
+      <p:sp>
+        <p:nvSpPr>
+          <p:cNvPr id="7" name="Content Placeholder 2"/>
+          <p:cNvSpPr txBox="1">
+            <a:spLocks/>
+          </p:cNvSpPr>
+          <p:nvPr/>
+        </p:nvSpPr>
+        <p:spPr>
+          <a:xfrm>
+            <a:off x="3492795" y="1739900"/>
+            <a:ext cx="2488905" cy="4525963"/>
+          </a:xfrm>
+          <a:prstGeom prst="rect">
+            <a:avLst/>
+          </a:prstGeom>
+        </p:spPr>
+        <p:style>
+          <a:lnRef idx="2">
+            <a:schemeClr val="dk1"/>
+          </a:lnRef>
+          <a:fillRef idx="1">
+            <a:schemeClr val="lt1"/>
+          </a:fillRef>
+          <a:effectRef idx="0">
+            <a:schemeClr val="dk1"/>
+          </a:effectRef>
+          <a:fontRef idx="minor">
+            <a:schemeClr val="dk1"/>
+          </a:fontRef>
+        </p:style>
+        <p:txBody>
+          <a:bodyPr vert="horz" lIns="91440" tIns="45720" rIns="91440" bIns="45720" rtlCol="0">
+            <a:normAutofit/>
+          </a:bodyPr>
+          <a:lstStyle>
+            <a:lvl1pPr marL="342900" indent="-342900" algn="l" defTabSz="457200" rtl="0" eaLnBrk="1" latinLnBrk="0" hangingPunct="1">
+              <a:spcBef>
+                <a:spcPct val="20000"/>
+              </a:spcBef>
+              <a:buFont typeface="Arial"/>
+              <a:buChar char="•"/>
+              <a:defRPr sz="3200" kern="1200">
+                <a:solidFill>
+                  <a:schemeClr val="tx1"/>
+                </a:solidFill>
+                <a:latin typeface="+mn-lt"/>
+                <a:ea typeface="+mn-ea"/>
+                <a:cs typeface="+mn-cs"/>
+              </a:defRPr>
+            </a:lvl1pPr>
+            <a:lvl2pPr marL="742950" indent="-285750" algn="l" defTabSz="457200" rtl="0" eaLnBrk="1" latinLnBrk="0" hangingPunct="1">
+              <a:spcBef>
+                <a:spcPct val="20000"/>
+              </a:spcBef>
+              <a:buFont typeface="Arial"/>
+              <a:buChar char="–"/>
+              <a:defRPr sz="2800" kern="1200">
+                <a:solidFill>
+                  <a:schemeClr val="tx1"/>
+                </a:solidFill>
+                <a:latin typeface="+mn-lt"/>
+                <a:ea typeface="+mn-ea"/>
+                <a:cs typeface="+mn-cs"/>
+              </a:defRPr>
+            </a:lvl2pPr>
+            <a:lvl3pPr marL="1143000" indent="-228600" algn="l" defTabSz="457200" rtl="0" eaLnBrk="1" latinLnBrk="0" hangingPunct="1">
+              <a:spcBef>
+                <a:spcPct val="20000"/>
+              </a:spcBef>
+              <a:buFont typeface="Arial"/>
+              <a:buChar char="•"/>
+              <a:defRPr sz="2400" kern="1200">
+                <a:solidFill>
+                  <a:schemeClr val="tx1"/>
+                </a:solidFill>
+                <a:latin typeface="+mn-lt"/>
+                <a:ea typeface="+mn-ea"/>
+                <a:cs typeface="+mn-cs"/>
+              </a:defRPr>
+            </a:lvl3pPr>
+            <a:lvl4pPr marL="1600200" indent="-228600" algn="l" defTabSz="457200" rtl="0" eaLnBrk="1" latinLnBrk="0" hangingPunct="1">
+              <a:spcBef>
+                <a:spcPct val="20000"/>
+              </a:spcBef>
+              <a:buFont typeface="Arial"/>
+              <a:buChar char="–"/>
+              <a:defRPr sz="2000" kern="1200">
+                <a:solidFill>
+                  <a:schemeClr val="tx1"/>
+                </a:solidFill>
+                <a:latin typeface="+mn-lt"/>
+                <a:ea typeface="+mn-ea"/>
+                <a:cs typeface="+mn-cs"/>
+              </a:defRPr>
+            </a:lvl4pPr>
+            <a:lvl5pPr marL="2057400" indent="-228600" algn="l" defTabSz="457200" rtl="0" eaLnBrk="1" latinLnBrk="0" hangingPunct="1">
+              <a:spcBef>
+                <a:spcPct val="20000"/>
+              </a:spcBef>
+              <a:buFont typeface="Arial"/>
+              <a:buChar char="»"/>
+              <a:defRPr sz="2000" kern="1200">
+                <a:solidFill>
+                  <a:schemeClr val="tx1"/>
+                </a:solidFill>
+                <a:latin typeface="+mn-lt"/>
+                <a:ea typeface="+mn-ea"/>
+                <a:cs typeface="+mn-cs"/>
+              </a:defRPr>
+            </a:lvl5pPr>
+            <a:lvl6pPr marL="2514600" indent="-228600" algn="l" defTabSz="457200" rtl="0" eaLnBrk="1" latinLnBrk="0" hangingPunct="1">
+              <a:spcBef>
+                <a:spcPct val="20000"/>
+              </a:spcBef>
+              <a:buFont typeface="Arial"/>
+              <a:buChar char="•"/>
+              <a:defRPr sz="2000" kern="1200">
+                <a:solidFill>
+                  <a:schemeClr val="tx1"/>
+                </a:solidFill>
+                <a:latin typeface="+mn-lt"/>
+                <a:ea typeface="+mn-ea"/>
+                <a:cs typeface="+mn-cs"/>
+              </a:defRPr>
+            </a:lvl6pPr>
+            <a:lvl7pPr marL="2971800" indent="-228600" algn="l" defTabSz="457200" rtl="0" eaLnBrk="1" latinLnBrk="0" hangingPunct="1">
+              <a:spcBef>
+                <a:spcPct val="20000"/>
+              </a:spcBef>
+              <a:buFont typeface="Arial"/>
+              <a:buChar char="•"/>
+              <a:defRPr sz="2000" kern="1200">
+                <a:solidFill>
+                  <a:schemeClr val="tx1"/>
+                </a:solidFill>
+                <a:latin typeface="+mn-lt"/>
+                <a:ea typeface="+mn-ea"/>
+                <a:cs typeface="+mn-cs"/>
+              </a:defRPr>
+            </a:lvl7pPr>
+            <a:lvl8pPr marL="3429000" indent="-228600" algn="l" defTabSz="457200" rtl="0" eaLnBrk="1" latinLnBrk="0" hangingPunct="1">
+              <a:spcBef>
+                <a:spcPct val="20000"/>
+              </a:spcBef>
+              <a:buFont typeface="Arial"/>
+              <a:buChar char="•"/>
+              <a:defRPr sz="2000" kern="1200">
+                <a:solidFill>
+                  <a:schemeClr val="tx1"/>
+                </a:solidFill>
+                <a:latin typeface="+mn-lt"/>
+                <a:ea typeface="+mn-ea"/>
+                <a:cs typeface="+mn-cs"/>
+              </a:defRPr>
+            </a:lvl8pPr>
+            <a:lvl9pPr marL="3886200" indent="-228600" algn="l" defTabSz="457200" rtl="0" eaLnBrk="1" latinLnBrk="0" hangingPunct="1">
+              <a:spcBef>
+                <a:spcPct val="20000"/>
+              </a:spcBef>
+              <a:buFont typeface="Arial"/>
+              <a:buChar char="•"/>
+              <a:defRPr sz="2000" kern="1200">
+                <a:solidFill>
+                  <a:schemeClr val="tx1"/>
+                </a:solidFill>
+                <a:latin typeface="+mn-lt"/>
+                <a:ea typeface="+mn-ea"/>
+                <a:cs typeface="+mn-cs"/>
+              </a:defRPr>
+            </a:lvl9pPr>
+          </a:lstStyle>
+          <a:p>
+            <a:r>
+              <a:rPr lang="en-US" dirty="0" smtClean="0"/>
+              <a:t>INSERT PIC OF STEP 2</a:t>
+            </a:r>
+            <a:endParaRPr lang="en-US" dirty="0"/>
+          </a:p>
+        </p:txBody>
+      </p:sp>
+      <p:sp>
+        <p:nvSpPr>
+          <p:cNvPr id="8" name="Content Placeholder 2"/>
+          <p:cNvSpPr txBox="1">
+            <a:spLocks/>
+          </p:cNvSpPr>
+          <p:nvPr/>
+        </p:nvSpPr>
+        <p:spPr>
+          <a:xfrm>
+            <a:off x="6464595" y="1739900"/>
+            <a:ext cx="2488905" cy="4525963"/>
+          </a:xfrm>
+          <a:prstGeom prst="rect">
+            <a:avLst/>
+          </a:prstGeom>
+        </p:spPr>
+        <p:style>
+          <a:lnRef idx="2">
+            <a:schemeClr val="dk1"/>
+          </a:lnRef>
+          <a:fillRef idx="1">
+            <a:schemeClr val="lt1"/>
+          </a:fillRef>
+          <a:effectRef idx="0">
+            <a:schemeClr val="dk1"/>
+          </a:effectRef>
+          <a:fontRef idx="minor">
+            <a:schemeClr val="dk1"/>
+          </a:fontRef>
+        </p:style>
+        <p:txBody>
+          <a:bodyPr vert="horz" lIns="91440" tIns="45720" rIns="91440" bIns="45720" rtlCol="0">
+            <a:normAutofit/>
+          </a:bodyPr>
+          <a:lstStyle>
+            <a:lvl1pPr marL="342900" indent="-342900" algn="l" defTabSz="457200" rtl="0" eaLnBrk="1" latinLnBrk="0" hangingPunct="1">
+              <a:spcBef>
+                <a:spcPct val="20000"/>
+              </a:spcBef>
+              <a:buFont typeface="Arial"/>
+              <a:buChar char="•"/>
+              <a:defRPr sz="3200" kern="1200">
+                <a:solidFill>
+                  <a:schemeClr val="tx1"/>
+                </a:solidFill>
+                <a:latin typeface="+mn-lt"/>
+                <a:ea typeface="+mn-ea"/>
+                <a:cs typeface="+mn-cs"/>
+              </a:defRPr>
+            </a:lvl1pPr>
+            <a:lvl2pPr marL="742950" indent="-285750" algn="l" defTabSz="457200" rtl="0" eaLnBrk="1" latinLnBrk="0" hangingPunct="1">
+              <a:spcBef>
+                <a:spcPct val="20000"/>
+              </a:spcBef>
+              <a:buFont typeface="Arial"/>
+              <a:buChar char="–"/>
+              <a:defRPr sz="2800" kern="1200">
+                <a:solidFill>
+                  <a:schemeClr val="tx1"/>
+                </a:solidFill>
+                <a:latin typeface="+mn-lt"/>
+                <a:ea typeface="+mn-ea"/>
+                <a:cs typeface="+mn-cs"/>
+              </a:defRPr>
+            </a:lvl2pPr>
+            <a:lvl3pPr marL="1143000" indent="-228600" algn="l" defTabSz="457200" rtl="0" eaLnBrk="1" latinLnBrk="0" hangingPunct="1">
+              <a:spcBef>
+                <a:spcPct val="20000"/>
+              </a:spcBef>
+              <a:buFont typeface="Arial"/>
+              <a:buChar char="•"/>
+              <a:defRPr sz="2400" kern="1200">
+                <a:solidFill>
+                  <a:schemeClr val="tx1"/>
+                </a:solidFill>
+                <a:latin typeface="+mn-lt"/>
+                <a:ea typeface="+mn-ea"/>
+                <a:cs typeface="+mn-cs"/>
+              </a:defRPr>
+            </a:lvl3pPr>
+            <a:lvl4pPr marL="1600200" indent="-228600" algn="l" defTabSz="457200" rtl="0" eaLnBrk="1" latinLnBrk="0" hangingPunct="1">
+              <a:spcBef>
+                <a:spcPct val="20000"/>
+              </a:spcBef>
+              <a:buFont typeface="Arial"/>
+              <a:buChar char="–"/>
+              <a:defRPr sz="2000" kern="1200">
+                <a:solidFill>
+                  <a:schemeClr val="tx1"/>
+                </a:solidFill>
+                <a:latin typeface="+mn-lt"/>
+                <a:ea typeface="+mn-ea"/>
+                <a:cs typeface="+mn-cs"/>
+              </a:defRPr>
+            </a:lvl4pPr>
+            <a:lvl5pPr marL="2057400" indent="-228600" algn="l" defTabSz="457200" rtl="0" eaLnBrk="1" latinLnBrk="0" hangingPunct="1">
+              <a:spcBef>
+                <a:spcPct val="20000"/>
+              </a:spcBef>
+              <a:buFont typeface="Arial"/>
+              <a:buChar char="»"/>
+              <a:defRPr sz="2000" kern="1200">
+                <a:solidFill>
+                  <a:schemeClr val="tx1"/>
+                </a:solidFill>
+                <a:latin typeface="+mn-lt"/>
+                <a:ea typeface="+mn-ea"/>
+                <a:cs typeface="+mn-cs"/>
+              </a:defRPr>
+            </a:lvl5pPr>
+            <a:lvl6pPr marL="2514600" indent="-228600" algn="l" defTabSz="457200" rtl="0" eaLnBrk="1" latinLnBrk="0" hangingPunct="1">
+              <a:spcBef>
+                <a:spcPct val="20000"/>
+              </a:spcBef>
+              <a:buFont typeface="Arial"/>
+              <a:buChar char="•"/>
+              <a:defRPr sz="2000" kern="1200">
+                <a:solidFill>
+                  <a:schemeClr val="tx1"/>
+                </a:solidFill>
+                <a:latin typeface="+mn-lt"/>
+                <a:ea typeface="+mn-ea"/>
+                <a:cs typeface="+mn-cs"/>
+              </a:defRPr>
+            </a:lvl6pPr>
+            <a:lvl7pPr marL="2971800" indent="-228600" algn="l" defTabSz="457200" rtl="0" eaLnBrk="1" latinLnBrk="0" hangingPunct="1">
+              <a:spcBef>
+                <a:spcPct val="20000"/>
+              </a:spcBef>
+              <a:buFont typeface="Arial"/>
+              <a:buChar char="•"/>
+              <a:defRPr sz="2000" kern="1200">
+                <a:solidFill>
+                  <a:schemeClr val="tx1"/>
+                </a:solidFill>
+                <a:latin typeface="+mn-lt"/>
+                <a:ea typeface="+mn-ea"/>
+                <a:cs typeface="+mn-cs"/>
+              </a:defRPr>
+            </a:lvl7pPr>
+            <a:lvl8pPr marL="3429000" indent="-228600" algn="l" defTabSz="457200" rtl="0" eaLnBrk="1" latinLnBrk="0" hangingPunct="1">
+              <a:spcBef>
+                <a:spcPct val="20000"/>
+              </a:spcBef>
+              <a:buFont typeface="Arial"/>
+              <a:buChar char="•"/>
+              <a:defRPr sz="2000" kern="1200">
+                <a:solidFill>
+                  <a:schemeClr val="tx1"/>
+                </a:solidFill>
+                <a:latin typeface="+mn-lt"/>
+                <a:ea typeface="+mn-ea"/>
+                <a:cs typeface="+mn-cs"/>
+              </a:defRPr>
+            </a:lvl8pPr>
+            <a:lvl9pPr marL="3886200" indent="-228600" algn="l" defTabSz="457200" rtl="0" eaLnBrk="1" latinLnBrk="0" hangingPunct="1">
+              <a:spcBef>
+                <a:spcPct val="20000"/>
+              </a:spcBef>
+              <a:buFont typeface="Arial"/>
+              <a:buChar char="•"/>
+              <a:defRPr sz="2000" kern="1200">
+                <a:solidFill>
+                  <a:schemeClr val="tx1"/>
+                </a:solidFill>
+                <a:latin typeface="+mn-lt"/>
+                <a:ea typeface="+mn-ea"/>
+                <a:cs typeface="+mn-cs"/>
+              </a:defRPr>
+            </a:lvl9pPr>
+          </a:lstStyle>
+          <a:p>
+            <a:r>
+              <a:rPr lang="en-US" dirty="0" smtClean="0"/>
+              <a:t>INSERT PIC OF STEP 3</a:t>
+            </a:r>
+            <a:endParaRPr lang="en-US" dirty="0"/>
+          </a:p>
+        </p:txBody>
+      </p:sp>
+    </p:spTree>
+  </p:cSld>
+  <p:clrMapOvr>
+    <a:masterClrMapping/>
+  </p:clrMapOvr>
+  <p:timing>
+    <p:tnLst>
+      <p:par>
+        <p:cTn xmlns:p14="http://schemas.microsoft.com/office/powerpoint/2010/main" id="1" dur="indefinite" restart="never" nodeType="tmRoot"/>
+      </p:par>
+    </p:tnLst>
+  </p:timing>
+</p:sld>
+</file>
+
+<file path=ppt/slides/slide9.xml><?xml version="1.0" encoding="utf-8"?>
+<p:sld xmlns:a="http://schemas.openxmlformats.org/drawingml/2006/main" xmlns:r="http://schemas.openxmlformats.org/officeDocument/2006/relationships" xmlns:p="http://schemas.openxmlformats.org/presentationml/2006/main">
+  <p:cSld>
+    <p:spTree>
+      <p:nvGrpSpPr>
+        <p:cNvPr id="1" name=""/>
+        <p:cNvGrpSpPr/>
+        <p:nvPr/>
+      </p:nvGrpSpPr>
+      <p:grpSpPr>
+        <a:xfrm>
+          <a:off x="0" y="0"/>
+          <a:ext cx="0" cy="0"/>
+          <a:chOff x="0" y="0"/>
+          <a:chExt cx="0" cy="0"/>
+        </a:xfrm>
+      </p:grpSpPr>
+      <p:sp>
+        <p:nvSpPr>
+          <p:cNvPr id="2" name="Title 1"/>
+          <p:cNvSpPr>
+            <a:spLocks noGrp="1"/>
+          </p:cNvSpPr>
+          <p:nvPr>
+            <p:ph type="title"/>
+          </p:nvPr>
+        </p:nvSpPr>
+        <p:spPr>
+          <a:xfrm>
+            <a:off x="2173480" y="274638"/>
+            <a:ext cx="6513319" cy="1143000"/>
+          </a:xfrm>
+        </p:spPr>
+        <p:txBody>
+          <a:bodyPr/>
+          <a:lstStyle/>
+          <a:p>
+            <a:r>
+              <a:rPr lang="en-US" dirty="0" smtClean="0"/>
+              <a:t>Feedback</a:t>
             </a:r>
             <a:endParaRPr lang="en-US" dirty="0"/>
           </a:p>
@@ -4637,213 +6297,7 @@
   <p:timing>
     <p:tnLst>
       <p:par>
-        <p:cTn id="1" dur="indefinite" restart="never" nodeType="tmRoot"/>
-      </p:par>
-    </p:tnLst>
-  </p:timing>
-</p:sld>
-</file>
-
-<file path=ppt/slides/slide8.xml><?xml version="1.0" encoding="utf-8"?>
-<p:sld xmlns:a="http://schemas.openxmlformats.org/drawingml/2006/main" xmlns:r="http://schemas.openxmlformats.org/officeDocument/2006/relationships" xmlns:mc="http://schemas.openxmlformats.org/markup-compatibility/2006" xmlns:mv="urn:schemas-microsoft-com:mac:vml" xmlns:p="http://schemas.openxmlformats.org/presentationml/2006/main" mc:Ignorable="mv" mc:PreserveAttributes="mv:*">
-  <p:cSld>
-    <p:spTree>
-      <p:nvGrpSpPr>
-        <p:cNvPr id="1" name=""/>
-        <p:cNvGrpSpPr/>
-        <p:nvPr/>
-      </p:nvGrpSpPr>
-      <p:grpSpPr>
-        <a:xfrm>
-          <a:off x="0" y="0"/>
-          <a:ext cx="0" cy="0"/>
-          <a:chOff x="0" y="0"/>
-          <a:chExt cx="0" cy="0"/>
-        </a:xfrm>
-      </p:grpSpPr>
-      <p:sp>
-        <p:nvSpPr>
-          <p:cNvPr id="2" name="Title 1"/>
-          <p:cNvSpPr>
-            <a:spLocks noGrp="1"/>
-          </p:cNvSpPr>
-          <p:nvPr>
-            <p:ph type="title"/>
-          </p:nvPr>
-        </p:nvSpPr>
-        <p:spPr>
-          <a:xfrm>
-            <a:off x="2173480" y="274638"/>
-            <a:ext cx="6513319" cy="1143000"/>
-          </a:xfrm>
-        </p:spPr>
-        <p:txBody>
-          <a:bodyPr/>
-          <a:lstStyle/>
-          <a:p>
-            <a:r>
-              <a:rPr lang="en-US" dirty="0" smtClean="0"/>
-              <a:t>Features</a:t>
-            </a:r>
-            <a:endParaRPr lang="en-US" dirty="0"/>
-          </a:p>
-        </p:txBody>
-      </p:sp>
-      <p:sp>
-        <p:nvSpPr>
-          <p:cNvPr id="3" name="Content Placeholder 2"/>
-          <p:cNvSpPr>
-            <a:spLocks noGrp="1"/>
-          </p:cNvSpPr>
-          <p:nvPr>
-            <p:ph idx="1"/>
-          </p:nvPr>
-        </p:nvSpPr>
-        <p:spPr/>
-        <p:txBody>
-          <a:bodyPr/>
-          <a:lstStyle/>
-          <a:p>
-            <a:endParaRPr lang="en-US"/>
-          </a:p>
-        </p:txBody>
-      </p:sp>
-      <p:pic>
-        <p:nvPicPr>
-          <p:cNvPr id="4" name="Picture 3" descr="Logo_Login.png"/>
-          <p:cNvPicPr>
-            <a:picLocks noChangeAspect="1"/>
-          </p:cNvPicPr>
-          <p:nvPr/>
-        </p:nvPicPr>
-        <p:blipFill>
-          <a:blip r:embed="rId2"/>
-          <a:stretch>
-            <a:fillRect/>
-          </a:stretch>
-        </p:blipFill>
-        <p:spPr>
-          <a:xfrm>
-            <a:off x="432095" y="366633"/>
-            <a:ext cx="1584249" cy="990156"/>
-          </a:xfrm>
-          <a:prstGeom prst="rect">
-            <a:avLst/>
-          </a:prstGeom>
-        </p:spPr>
-      </p:pic>
-    </p:spTree>
-  </p:cSld>
-  <p:clrMapOvr>
-    <a:masterClrMapping/>
-  </p:clrMapOvr>
-  <p:timing>
-    <p:tnLst>
-      <p:par>
-        <p:cTn id="1" dur="indefinite" restart="never" nodeType="tmRoot"/>
-      </p:par>
-    </p:tnLst>
-  </p:timing>
-</p:sld>
-</file>
-
-<file path=ppt/slides/slide9.xml><?xml version="1.0" encoding="utf-8"?>
-<p:sld xmlns:a="http://schemas.openxmlformats.org/drawingml/2006/main" xmlns:r="http://schemas.openxmlformats.org/officeDocument/2006/relationships" xmlns:mc="http://schemas.openxmlformats.org/markup-compatibility/2006" xmlns:mv="urn:schemas-microsoft-com:mac:vml" xmlns:p="http://schemas.openxmlformats.org/presentationml/2006/main" mc:Ignorable="mv" mc:PreserveAttributes="mv:*">
-  <p:cSld>
-    <p:spTree>
-      <p:nvGrpSpPr>
-        <p:cNvPr id="1" name=""/>
-        <p:cNvGrpSpPr/>
-        <p:nvPr/>
-      </p:nvGrpSpPr>
-      <p:grpSpPr>
-        <a:xfrm>
-          <a:off x="0" y="0"/>
-          <a:ext cx="0" cy="0"/>
-          <a:chOff x="0" y="0"/>
-          <a:chExt cx="0" cy="0"/>
-        </a:xfrm>
-      </p:grpSpPr>
-      <p:sp>
-        <p:nvSpPr>
-          <p:cNvPr id="2" name="Title 1"/>
-          <p:cNvSpPr>
-            <a:spLocks noGrp="1"/>
-          </p:cNvSpPr>
-          <p:nvPr>
-            <p:ph type="title"/>
-          </p:nvPr>
-        </p:nvSpPr>
-        <p:spPr>
-          <a:xfrm>
-            <a:off x="2173480" y="274638"/>
-            <a:ext cx="6513319" cy="1143000"/>
-          </a:xfrm>
-        </p:spPr>
-        <p:txBody>
-          <a:bodyPr/>
-          <a:lstStyle/>
-          <a:p>
-            <a:r>
-              <a:rPr lang="en-US" dirty="0" smtClean="0"/>
-              <a:t>Feedback</a:t>
-            </a:r>
-            <a:endParaRPr lang="en-US" dirty="0"/>
-          </a:p>
-        </p:txBody>
-      </p:sp>
-      <p:sp>
-        <p:nvSpPr>
-          <p:cNvPr id="3" name="Content Placeholder 2"/>
-          <p:cNvSpPr>
-            <a:spLocks noGrp="1"/>
-          </p:cNvSpPr>
-          <p:nvPr>
-            <p:ph idx="1"/>
-          </p:nvPr>
-        </p:nvSpPr>
-        <p:spPr/>
-        <p:txBody>
-          <a:bodyPr/>
-          <a:lstStyle/>
-          <a:p>
-            <a:endParaRPr lang="en-US"/>
-          </a:p>
-        </p:txBody>
-      </p:sp>
-      <p:pic>
-        <p:nvPicPr>
-          <p:cNvPr id="4" name="Picture 3" descr="Logo_Login.png"/>
-          <p:cNvPicPr>
-            <a:picLocks noChangeAspect="1"/>
-          </p:cNvPicPr>
-          <p:nvPr/>
-        </p:nvPicPr>
-        <p:blipFill>
-          <a:blip r:embed="rId2"/>
-          <a:stretch>
-            <a:fillRect/>
-          </a:stretch>
-        </p:blipFill>
-        <p:spPr>
-          <a:xfrm>
-            <a:off x="432095" y="366633"/>
-            <a:ext cx="1584249" cy="990156"/>
-          </a:xfrm>
-          <a:prstGeom prst="rect">
-            <a:avLst/>
-          </a:prstGeom>
-        </p:spPr>
-      </p:pic>
-    </p:spTree>
-  </p:cSld>
-  <p:clrMapOvr>
-    <a:masterClrMapping/>
-  </p:clrMapOvr>
-  <p:timing>
-    <p:tnLst>
-      <p:par>
-        <p:cTn id="1" dur="indefinite" restart="never" nodeType="tmRoot"/>
+        <p:cTn xmlns:p14="http://schemas.microsoft.com/office/powerpoint/2010/main" id="1" dur="indefinite" restart="never" nodeType="tmRoot"/>
       </p:par>
     </p:tnLst>
   </p:timing>
@@ -5166,4 +6620,324 @@
   </a:objectDefaults>
   <a:extraClrSchemeLst/>
 </a:theme>
+</file>
+
+<file path=ppt/theme/theme2.xml><?xml version="1.0" encoding="utf-8"?>
+<a:theme xmlns:a="http://schemas.openxmlformats.org/drawingml/2006/main" name="Office Theme">
+  <a:themeElements>
+    <a:clrScheme name="Office">
+      <a:dk1>
+        <a:sysClr val="windowText" lastClr="000000"/>
+      </a:dk1>
+      <a:lt1>
+        <a:sysClr val="window" lastClr="FFFFFF"/>
+      </a:lt1>
+      <a:dk2>
+        <a:srgbClr val="1F497D"/>
+      </a:dk2>
+      <a:lt2>
+        <a:srgbClr val="EEECE1"/>
+      </a:lt2>
+      <a:accent1>
+        <a:srgbClr val="4F81BD"/>
+      </a:accent1>
+      <a:accent2>
+        <a:srgbClr val="C0504D"/>
+      </a:accent2>
+      <a:accent3>
+        <a:srgbClr val="9BBB59"/>
+      </a:accent3>
+      <a:accent4>
+        <a:srgbClr val="8064A2"/>
+      </a:accent4>
+      <a:accent5>
+        <a:srgbClr val="4BACC6"/>
+      </a:accent5>
+      <a:accent6>
+        <a:srgbClr val="F79646"/>
+      </a:accent6>
+      <a:hlink>
+        <a:srgbClr val="0000FF"/>
+      </a:hlink>
+      <a:folHlink>
+        <a:srgbClr val="800080"/>
+      </a:folHlink>
+    </a:clrScheme>
+    <a:fontScheme name="Office">
+      <a:majorFont>
+        <a:latin typeface="Calibri"/>
+        <a:ea typeface=""/>
+        <a:cs typeface=""/>
+        <a:font script="Jpan" typeface="ＭＳ Ｐゴシック"/>
+        <a:font script="Hang" typeface="맑은 고딕"/>
+        <a:font script="Hans" typeface="宋体"/>
+        <a:font script="Hant" typeface="新細明體"/>
+        <a:font script="Arab" typeface="Times New Roman"/>
+        <a:font script="Hebr" typeface="Times New Roman"/>
+        <a:font script="Thai" typeface="Angsana New"/>
+        <a:font script="Ethi" typeface="Nyala"/>
+        <a:font script="Beng" typeface="Vrinda"/>
+        <a:font script="Gujr" typeface="Shruti"/>
+        <a:font script="Khmr" typeface="MoolBoran"/>
+        <a:font script="Knda" typeface="Tunga"/>
+        <a:font script="Guru" typeface="Raavi"/>
+        <a:font script="Cans" typeface="Euphemia"/>
+        <a:font script="Cher" typeface="Plantagenet Cherokee"/>
+        <a:font script="Yiii" typeface="Microsoft Yi Baiti"/>
+        <a:font script="Tibt" typeface="Microsoft Himalaya"/>
+        <a:font script="Thaa" typeface="MV Boli"/>
+        <a:font script="Deva" typeface="Mangal"/>
+        <a:font script="Telu" typeface="Gautami"/>
+        <a:font script="Taml" typeface="Latha"/>
+        <a:font script="Syrc" typeface="Estrangelo Edessa"/>
+        <a:font script="Orya" typeface="Kalinga"/>
+        <a:font script="Mlym" typeface="Kartika"/>
+        <a:font script="Laoo" typeface="DokChampa"/>
+        <a:font script="Sinh" typeface="Iskoola Pota"/>
+        <a:font script="Mong" typeface="Mongolian Baiti"/>
+        <a:font script="Viet" typeface="Times New Roman"/>
+        <a:font script="Uigh" typeface="Microsoft Uighur"/>
+        <a:font script="Geor" typeface="Sylfaen"/>
+      </a:majorFont>
+      <a:minorFont>
+        <a:latin typeface="Calibri"/>
+        <a:ea typeface=""/>
+        <a:cs typeface=""/>
+        <a:font script="Jpan" typeface="ＭＳ Ｐゴシック"/>
+        <a:font script="Hang" typeface="맑은 고딕"/>
+        <a:font script="Hans" typeface="宋体"/>
+        <a:font script="Hant" typeface="新細明體"/>
+        <a:font script="Arab" typeface="Arial"/>
+        <a:font script="Hebr" typeface="Arial"/>
+        <a:font script="Thai" typeface="Cordia New"/>
+        <a:font script="Ethi" typeface="Nyala"/>
+        <a:font script="Beng" typeface="Vrinda"/>
+        <a:font script="Gujr" typeface="Shruti"/>
+        <a:font script="Khmr" typeface="DaunPenh"/>
+        <a:font script="Knda" typeface="Tunga"/>
+        <a:font script="Guru" typeface="Raavi"/>
+        <a:font script="Cans" typeface="Euphemia"/>
+        <a:font script="Cher" typeface="Plantagenet Cherokee"/>
+        <a:font script="Yiii" typeface="Microsoft Yi Baiti"/>
+        <a:font script="Tibt" typeface="Microsoft Himalaya"/>
+        <a:font script="Thaa" typeface="MV Boli"/>
+        <a:font script="Deva" typeface="Mangal"/>
+        <a:font script="Telu" typeface="Gautami"/>
+        <a:font script="Taml" typeface="Latha"/>
+        <a:font script="Syrc" typeface="Estrangelo Edessa"/>
+        <a:font script="Orya" typeface="Kalinga"/>
+        <a:font script="Mlym" typeface="Kartika"/>
+        <a:font script="Laoo" typeface="DokChampa"/>
+        <a:font script="Sinh" typeface="Iskoola Pota"/>
+        <a:font script="Mong" typeface="Mongolian Baiti"/>
+        <a:font script="Viet" typeface="Arial"/>
+        <a:font script="Uigh" typeface="Microsoft Uighur"/>
+        <a:font script="Geor" typeface="Sylfaen"/>
+      </a:minorFont>
+    </a:fontScheme>
+    <a:fmtScheme name="Office">
+      <a:fillStyleLst>
+        <a:solidFill>
+          <a:schemeClr val="phClr"/>
+        </a:solidFill>
+        <a:gradFill rotWithShape="1">
+          <a:gsLst>
+            <a:gs pos="0">
+              <a:schemeClr val="phClr">
+                <a:tint val="50000"/>
+                <a:satMod val="300000"/>
+              </a:schemeClr>
+            </a:gs>
+            <a:gs pos="35000">
+              <a:schemeClr val="phClr">
+                <a:tint val="37000"/>
+                <a:satMod val="300000"/>
+              </a:schemeClr>
+            </a:gs>
+            <a:gs pos="100000">
+              <a:schemeClr val="phClr">
+                <a:tint val="15000"/>
+                <a:satMod val="350000"/>
+              </a:schemeClr>
+            </a:gs>
+          </a:gsLst>
+          <a:lin ang="16200000" scaled="1"/>
+        </a:gradFill>
+        <a:gradFill rotWithShape="1">
+          <a:gsLst>
+            <a:gs pos="0">
+              <a:schemeClr val="phClr">
+                <a:tint val="100000"/>
+                <a:shade val="100000"/>
+                <a:satMod val="130000"/>
+              </a:schemeClr>
+            </a:gs>
+            <a:gs pos="100000">
+              <a:schemeClr val="phClr">
+                <a:tint val="50000"/>
+                <a:shade val="100000"/>
+                <a:satMod val="350000"/>
+              </a:schemeClr>
+            </a:gs>
+          </a:gsLst>
+          <a:lin ang="16200000" scaled="0"/>
+        </a:gradFill>
+      </a:fillStyleLst>
+      <a:lnStyleLst>
+        <a:ln w="9525" cap="flat" cmpd="sng" algn="ctr">
+          <a:solidFill>
+            <a:schemeClr val="phClr">
+              <a:shade val="95000"/>
+              <a:satMod val="105000"/>
+            </a:schemeClr>
+          </a:solidFill>
+          <a:prstDash val="solid"/>
+        </a:ln>
+        <a:ln w="25400" cap="flat" cmpd="sng" algn="ctr">
+          <a:solidFill>
+            <a:schemeClr val="phClr"/>
+          </a:solidFill>
+          <a:prstDash val="solid"/>
+        </a:ln>
+        <a:ln w="38100" cap="flat" cmpd="sng" algn="ctr">
+          <a:solidFill>
+            <a:schemeClr val="phClr"/>
+          </a:solidFill>
+          <a:prstDash val="solid"/>
+        </a:ln>
+      </a:lnStyleLst>
+      <a:effectStyleLst>
+        <a:effectStyle>
+          <a:effectLst>
+            <a:outerShdw blurRad="40000" dist="20000" dir="5400000" rotWithShape="0">
+              <a:srgbClr val="000000">
+                <a:alpha val="38000"/>
+              </a:srgbClr>
+            </a:outerShdw>
+          </a:effectLst>
+        </a:effectStyle>
+        <a:effectStyle>
+          <a:effectLst>
+            <a:outerShdw blurRad="40000" dist="23000" dir="5400000" rotWithShape="0">
+              <a:srgbClr val="000000">
+                <a:alpha val="35000"/>
+              </a:srgbClr>
+            </a:outerShdw>
+          </a:effectLst>
+        </a:effectStyle>
+        <a:effectStyle>
+          <a:effectLst>
+            <a:outerShdw blurRad="40000" dist="23000" dir="5400000" rotWithShape="0">
+              <a:srgbClr val="000000">
+                <a:alpha val="35000"/>
+              </a:srgbClr>
+            </a:outerShdw>
+          </a:effectLst>
+          <a:scene3d>
+            <a:camera prst="orthographicFront">
+              <a:rot lat="0" lon="0" rev="0"/>
+            </a:camera>
+            <a:lightRig rig="threePt" dir="t">
+              <a:rot lat="0" lon="0" rev="1200000"/>
+            </a:lightRig>
+          </a:scene3d>
+          <a:sp3d>
+            <a:bevelT w="63500" h="25400"/>
+          </a:sp3d>
+        </a:effectStyle>
+      </a:effectStyleLst>
+      <a:bgFillStyleLst>
+        <a:solidFill>
+          <a:schemeClr val="phClr"/>
+        </a:solidFill>
+        <a:gradFill rotWithShape="1">
+          <a:gsLst>
+            <a:gs pos="0">
+              <a:schemeClr val="phClr">
+                <a:tint val="40000"/>
+                <a:satMod val="350000"/>
+              </a:schemeClr>
+            </a:gs>
+            <a:gs pos="40000">
+              <a:schemeClr val="phClr">
+                <a:tint val="45000"/>
+                <a:shade val="99000"/>
+                <a:satMod val="350000"/>
+              </a:schemeClr>
+            </a:gs>
+            <a:gs pos="100000">
+              <a:schemeClr val="phClr">
+                <a:shade val="20000"/>
+                <a:satMod val="255000"/>
+              </a:schemeClr>
+            </a:gs>
+          </a:gsLst>
+          <a:path path="circle">
+            <a:fillToRect l="50000" t="-80000" r="50000" b="180000"/>
+          </a:path>
+        </a:gradFill>
+        <a:gradFill rotWithShape="1">
+          <a:gsLst>
+            <a:gs pos="0">
+              <a:schemeClr val="phClr">
+                <a:tint val="80000"/>
+                <a:satMod val="300000"/>
+              </a:schemeClr>
+            </a:gs>
+            <a:gs pos="100000">
+              <a:schemeClr val="phClr">
+                <a:shade val="30000"/>
+                <a:satMod val="200000"/>
+              </a:schemeClr>
+            </a:gs>
+          </a:gsLst>
+          <a:path path="circle">
+            <a:fillToRect l="50000" t="50000" r="50000" b="50000"/>
+          </a:path>
+        </a:gradFill>
+      </a:bgFillStyleLst>
+    </a:fmtScheme>
+  </a:themeElements>
+  <a:objectDefaults>
+    <a:spDef>
+      <a:spPr/>
+      <a:bodyPr/>
+      <a:lstStyle/>
+      <a:style>
+        <a:lnRef idx="1">
+          <a:schemeClr val="accent1"/>
+        </a:lnRef>
+        <a:fillRef idx="3">
+          <a:schemeClr val="accent1"/>
+        </a:fillRef>
+        <a:effectRef idx="2">
+          <a:schemeClr val="accent1"/>
+        </a:effectRef>
+        <a:fontRef idx="minor">
+          <a:schemeClr val="lt1"/>
+        </a:fontRef>
+      </a:style>
+    </a:spDef>
+    <a:lnDef>
+      <a:spPr/>
+      <a:bodyPr/>
+      <a:lstStyle/>
+      <a:style>
+        <a:lnRef idx="2">
+          <a:schemeClr val="accent1"/>
+        </a:lnRef>
+        <a:fillRef idx="0">
+          <a:schemeClr val="accent1"/>
+        </a:fillRef>
+        <a:effectRef idx="1">
+          <a:schemeClr val="accent1"/>
+        </a:effectRef>
+        <a:fontRef idx="minor">
+          <a:schemeClr val="tx1"/>
+        </a:fontRef>
+      </a:style>
+    </a:lnDef>
+  </a:objectDefaults>
+  <a:extraClrSchemeLst/>
+</a:theme>
 </file>
</xml_diff>

<commit_message>
made more changes to the powerpoint
</commit_message>
<xml_diff>
--- a/PowerPoint Presentation/GrowthPlot_Presentation.pptx
+++ b/PowerPoint Presentation/GrowthPlot_Presentation.pptx
@@ -12,13 +12,13 @@
     <p:sldId id="257" r:id="rId3"/>
     <p:sldId id="258" r:id="rId4"/>
     <p:sldId id="268" r:id="rId5"/>
-    <p:sldId id="262" r:id="rId6"/>
-    <p:sldId id="261" r:id="rId7"/>
-    <p:sldId id="263" r:id="rId8"/>
-    <p:sldId id="266" r:id="rId9"/>
-    <p:sldId id="270" r:id="rId10"/>
-    <p:sldId id="264" r:id="rId11"/>
-    <p:sldId id="265" r:id="rId12"/>
+    <p:sldId id="271" r:id="rId6"/>
+    <p:sldId id="262" r:id="rId7"/>
+    <p:sldId id="261" r:id="rId8"/>
+    <p:sldId id="263" r:id="rId9"/>
+    <p:sldId id="266" r:id="rId10"/>
+    <p:sldId id="270" r:id="rId11"/>
+    <p:sldId id="264" r:id="rId12"/>
     <p:sldId id="267" r:id="rId13"/>
     <p:sldId id="269" r:id="rId14"/>
     <p:sldId id="259" r:id="rId15"/>
@@ -518,136 +518,10 @@
           <a:bodyPr/>
           <a:lstStyle/>
           <a:p>
-            <a:pPr marL="342900" marR="0" lvl="0" indent="-342900" algn="l" defTabSz="457200" rtl="0" eaLnBrk="1" fontAlgn="auto" latinLnBrk="0" hangingPunct="1">
-              <a:lnSpc>
-                <a:spcPct val="100000"/>
-              </a:lnSpc>
-              <a:spcBef>
-                <a:spcPct val="20000"/>
-              </a:spcBef>
-              <a:spcAft>
-                <a:spcPts val="0"/>
-              </a:spcAft>
-              <a:buClrTx/>
-              <a:buSzTx/>
-              <a:buFont typeface="Arial"/>
-              <a:buChar char="•"/>
-              <a:tabLst/>
-              <a:defRPr/>
-            </a:pPr>
-            <a:r>
-              <a:rPr lang="en-US" sz="3200" dirty="0" smtClean="0"/>
-              <a:t>Current charts are:</a:t>
-            </a:r>
-            <a:endParaRPr lang="en-US" sz="2800" dirty="0" smtClean="0">
-              <a:solidFill>
-                <a:prstClr val="black"/>
-              </a:solidFill>
-            </a:endParaRPr>
-          </a:p>
-          <a:p>
-            <a:pPr marL="742950" lvl="1" indent="-285750">
-              <a:spcBef>
-                <a:spcPct val="20000"/>
-              </a:spcBef>
-              <a:buFont typeface="Arial"/>
-              <a:buChar char="–"/>
-            </a:pPr>
-            <a:r>
-              <a:rPr lang="en-US" sz="2800" dirty="0" smtClean="0">
-                <a:solidFill>
-                  <a:prstClr val="black"/>
-                </a:solidFill>
-              </a:rPr>
-              <a:t>hard-to-plot </a:t>
-            </a:r>
-          </a:p>
-          <a:p>
-            <a:pPr marL="742950" lvl="1" indent="-285750">
-              <a:spcBef>
-                <a:spcPct val="20000"/>
-              </a:spcBef>
-              <a:buFont typeface="Arial"/>
-              <a:buChar char="–"/>
-            </a:pPr>
-            <a:r>
-              <a:rPr lang="en-US" sz="2800" dirty="0" smtClean="0">
-                <a:solidFill>
-                  <a:prstClr val="black"/>
-                </a:solidFill>
-              </a:rPr>
-              <a:t>hard-to-read</a:t>
-            </a:r>
-          </a:p>
-          <a:p>
-            <a:pPr marL="1200150" lvl="2" indent="-285750">
-              <a:spcBef>
-                <a:spcPct val="20000"/>
-              </a:spcBef>
-              <a:buFont typeface="Arial"/>
-              <a:buChar char="–"/>
-            </a:pPr>
-            <a:r>
-              <a:rPr lang="en-US" sz="2800" dirty="0" smtClean="0">
-                <a:solidFill>
-                  <a:prstClr val="black"/>
-                </a:solidFill>
-              </a:rPr>
-              <a:t>does not provide exact percentiles</a:t>
-            </a:r>
-          </a:p>
-          <a:p>
-            <a:pPr marL="742950" lvl="1" indent="-285750">
-              <a:spcBef>
-                <a:spcPct val="20000"/>
-              </a:spcBef>
-              <a:buFont typeface="Arial"/>
-              <a:buChar char="–"/>
-            </a:pPr>
-            <a:r>
-              <a:rPr lang="en-US" sz="2800" dirty="0" smtClean="0">
-                <a:solidFill>
-                  <a:prstClr val="black"/>
-                </a:solidFill>
-              </a:rPr>
-              <a:t>not available to the families</a:t>
-            </a:r>
-          </a:p>
-          <a:p>
-            <a:pPr marL="742950" lvl="1" indent="-285750">
-              <a:spcBef>
-                <a:spcPct val="20000"/>
-              </a:spcBef>
-              <a:buFont typeface="Arial"/>
-              <a:buChar char="–"/>
-            </a:pPr>
-            <a:r>
-              <a:rPr lang="en-US" sz="2800" dirty="0" smtClean="0">
-                <a:solidFill>
-                  <a:prstClr val="black"/>
-                </a:solidFill>
-              </a:rPr>
-              <a:t>incomplete</a:t>
-            </a:r>
-          </a:p>
-          <a:p>
-            <a:pPr marL="1200150" lvl="2" indent="-285750">
-              <a:spcBef>
-                <a:spcPct val="20000"/>
-              </a:spcBef>
-              <a:buFont typeface="Arial"/>
-              <a:buChar char="–"/>
-            </a:pPr>
-            <a:r>
-              <a:rPr lang="en-US" sz="2800" dirty="0" smtClean="0">
-                <a:solidFill>
-                  <a:prstClr val="black"/>
-                </a:solidFill>
-              </a:rPr>
-              <a:t>living in different places</a:t>
-            </a:r>
-          </a:p>
-          <a:p>
+            <a:r>
+              <a:rPr lang="en-US" dirty="0" smtClean="0"/>
+              <a:t>+ add CFRI logo</a:t>
+            </a:r>
             <a:endParaRPr lang="en-US" dirty="0"/>
           </a:p>
         </p:txBody>
@@ -669,7 +543,7 @@
           <a:p>
             <a:fld id="{E1159CB3-932F-C14D-8E49-A78F6374A8D6}" type="slidenum">
               <a:rPr lang="en-US" smtClean="0"/>
-              <a:t>4</a:t>
+              <a:t>2</a:t>
             </a:fld>
             <a:endParaRPr lang="en-US"/>
           </a:p>
@@ -678,7 +552,7 @@
     </p:spTree>
     <p:extLst>
       <p:ext uri="{BB962C8B-B14F-4D97-AF65-F5344CB8AC3E}">
-        <p14:creationId xmlns:p14="http://schemas.microsoft.com/office/powerpoint/2010/main" val="2127494680"/>
+        <p14:creationId xmlns:p14="http://schemas.microsoft.com/office/powerpoint/2010/main" val="3840811601"/>
       </p:ext>
     </p:extLst>
   </p:cSld>
@@ -732,72 +606,133 @@
           <a:bodyPr/>
           <a:lstStyle/>
           <a:p>
-            <a:r>
-              <a:rPr lang="en-US" dirty="0" smtClean="0"/>
-              <a:t>Shortcomings include:</a:t>
-            </a:r>
-          </a:p>
-          <a:p>
-            <a:pPr lvl="1"/>
-            <a:r>
-              <a:rPr lang="en-US" dirty="0" smtClean="0"/>
-              <a:t>Does not store the information</a:t>
-            </a:r>
-          </a:p>
-          <a:p>
-            <a:pPr lvl="1"/>
-            <a:r>
-              <a:rPr lang="en-US" dirty="0" smtClean="0"/>
-              <a:t>Can’t access it from certain devices</a:t>
-            </a:r>
-          </a:p>
-          <a:p>
-            <a:pPr lvl="1"/>
-            <a:r>
-              <a:rPr lang="en-US" dirty="0" smtClean="0"/>
-              <a:t>Cost</a:t>
-            </a:r>
-          </a:p>
-          <a:p>
-            <a:pPr lvl="2"/>
-            <a:r>
-              <a:rPr lang="en-US" dirty="0" smtClean="0"/>
-              <a:t>Limiting # of children</a:t>
-            </a:r>
-          </a:p>
-          <a:p>
-            <a:pPr lvl="2"/>
-            <a:r>
-              <a:rPr lang="en-US" dirty="0" smtClean="0"/>
-              <a:t>Advertisements in the way</a:t>
-            </a:r>
-          </a:p>
-          <a:p>
-            <a:pPr lvl="1"/>
-            <a:r>
-              <a:rPr lang="en-US" dirty="0" smtClean="0"/>
-              <a:t>Not user-friendly</a:t>
-            </a:r>
-          </a:p>
-          <a:p>
-            <a:pPr lvl="1"/>
-            <a:r>
-              <a:rPr lang="en-US" dirty="0" smtClean="0"/>
-              <a:t>Not share-able</a:t>
-            </a:r>
-          </a:p>
-          <a:p>
-            <a:pPr lvl="1"/>
-            <a:r>
-              <a:rPr lang="en-US" dirty="0" smtClean="0"/>
-              <a:t>Metrics not right</a:t>
-            </a:r>
-          </a:p>
-          <a:p>
-            <a:pPr lvl="1"/>
-            <a:r>
-              <a:rPr lang="en-US" dirty="0" smtClean="0"/>
-              <a:t>Doesn’t include WHO Canadian curves</a:t>
+            <a:pPr marL="342900" marR="0" lvl="0" indent="-342900" algn="l" defTabSz="457200" rtl="0" eaLnBrk="1" fontAlgn="auto" latinLnBrk="0" hangingPunct="1">
+              <a:lnSpc>
+                <a:spcPct val="100000"/>
+              </a:lnSpc>
+              <a:spcBef>
+                <a:spcPct val="20000"/>
+              </a:spcBef>
+              <a:spcAft>
+                <a:spcPts val="0"/>
+              </a:spcAft>
+              <a:buClrTx/>
+              <a:buSzTx/>
+              <a:buFont typeface="Arial"/>
+              <a:buChar char="•"/>
+              <a:tabLst/>
+              <a:defRPr/>
+            </a:pPr>
+            <a:r>
+              <a:rPr lang="en-US" sz="3200" dirty="0" smtClean="0"/>
+              <a:t>Current charts are:</a:t>
+            </a:r>
+            <a:endParaRPr lang="en-US" sz="2800" dirty="0" smtClean="0">
+              <a:solidFill>
+                <a:prstClr val="black"/>
+              </a:solidFill>
+            </a:endParaRPr>
+          </a:p>
+          <a:p>
+            <a:pPr marL="742950" lvl="1" indent="-285750">
+              <a:spcBef>
+                <a:spcPct val="20000"/>
+              </a:spcBef>
+              <a:buFont typeface="Arial"/>
+              <a:buChar char="–"/>
+            </a:pPr>
+            <a:r>
+              <a:rPr lang="en-US" sz="2800" dirty="0" smtClean="0">
+                <a:solidFill>
+                  <a:prstClr val="black"/>
+                </a:solidFill>
+              </a:rPr>
+              <a:t>hard-to-plot </a:t>
+            </a:r>
+          </a:p>
+          <a:p>
+            <a:pPr marL="742950" lvl="1" indent="-285750">
+              <a:spcBef>
+                <a:spcPct val="20000"/>
+              </a:spcBef>
+              <a:buFont typeface="Arial"/>
+              <a:buChar char="–"/>
+            </a:pPr>
+            <a:r>
+              <a:rPr lang="en-US" sz="2800" dirty="0" smtClean="0">
+                <a:solidFill>
+                  <a:prstClr val="black"/>
+                </a:solidFill>
+              </a:rPr>
+              <a:t>hard-to-read</a:t>
+            </a:r>
+          </a:p>
+          <a:p>
+            <a:pPr marL="1200150" lvl="2" indent="-285750">
+              <a:spcBef>
+                <a:spcPct val="20000"/>
+              </a:spcBef>
+              <a:buFont typeface="Arial"/>
+              <a:buChar char="–"/>
+            </a:pPr>
+            <a:r>
+              <a:rPr lang="en-US" sz="2800" dirty="0" smtClean="0">
+                <a:solidFill>
+                  <a:prstClr val="black"/>
+                </a:solidFill>
+              </a:rPr>
+              <a:t>does not provide exact percentiles</a:t>
+            </a:r>
+          </a:p>
+          <a:p>
+            <a:pPr marL="742950" lvl="1" indent="-285750">
+              <a:spcBef>
+                <a:spcPct val="20000"/>
+              </a:spcBef>
+              <a:buFont typeface="Arial"/>
+              <a:buChar char="–"/>
+            </a:pPr>
+            <a:r>
+              <a:rPr lang="en-US" sz="2800" dirty="0" smtClean="0">
+                <a:solidFill>
+                  <a:prstClr val="black"/>
+                </a:solidFill>
+              </a:rPr>
+              <a:t>not available to the families</a:t>
+            </a:r>
+          </a:p>
+          <a:p>
+            <a:pPr marL="742950" lvl="1" indent="-285750">
+              <a:spcBef>
+                <a:spcPct val="20000"/>
+              </a:spcBef>
+              <a:buFont typeface="Arial"/>
+              <a:buChar char="–"/>
+            </a:pPr>
+            <a:r>
+              <a:rPr lang="en-US" sz="2800" dirty="0" smtClean="0">
+                <a:solidFill>
+                  <a:prstClr val="black"/>
+                </a:solidFill>
+              </a:rPr>
+              <a:t>incomplete</a:t>
+            </a:r>
+          </a:p>
+          <a:p>
+            <a:pPr marL="1200150" lvl="2" indent="-285750">
+              <a:spcBef>
+                <a:spcPct val="20000"/>
+              </a:spcBef>
+              <a:buFont typeface="Arial"/>
+              <a:buChar char="–"/>
+            </a:pPr>
+            <a:r>
+              <a:rPr lang="en-US" sz="2800" dirty="0" smtClean="0">
+                <a:solidFill>
+                  <a:prstClr val="black"/>
+                </a:solidFill>
+              </a:rPr>
+              <a:t>living in different places</a:t>
             </a:r>
           </a:p>
           <a:p>
@@ -822,7 +757,7 @@
           <a:p>
             <a:fld id="{E1159CB3-932F-C14D-8E49-A78F6374A8D6}" type="slidenum">
               <a:rPr lang="en-US" smtClean="0"/>
-              <a:t>5</a:t>
+              <a:t>4</a:t>
             </a:fld>
             <a:endParaRPr lang="en-US"/>
           </a:p>
@@ -831,7 +766,7 @@
     </p:spTree>
     <p:extLst>
       <p:ext uri="{BB962C8B-B14F-4D97-AF65-F5344CB8AC3E}">
-        <p14:creationId xmlns:p14="http://schemas.microsoft.com/office/powerpoint/2010/main" val="3011414378"/>
+        <p14:creationId xmlns:p14="http://schemas.microsoft.com/office/powerpoint/2010/main" val="2127494680"/>
       </p:ext>
     </p:extLst>
   </p:cSld>
@@ -885,33 +820,286 @@
           <a:bodyPr/>
           <a:lstStyle/>
           <a:p>
+            <a:pPr marL="342900" marR="0" lvl="0" indent="-342900" algn="l" defTabSz="457200" rtl="0" eaLnBrk="1" fontAlgn="auto" latinLnBrk="0" hangingPunct="1">
+              <a:lnSpc>
+                <a:spcPct val="100000"/>
+              </a:lnSpc>
+              <a:spcBef>
+                <a:spcPct val="20000"/>
+              </a:spcBef>
+              <a:spcAft>
+                <a:spcPts val="0"/>
+              </a:spcAft>
+              <a:buClrTx/>
+              <a:buSzTx/>
+              <a:buFont typeface="Arial"/>
+              <a:buChar char="•"/>
+              <a:tabLst/>
+              <a:defRPr/>
+            </a:pPr>
+            <a:r>
+              <a:rPr lang="en-US" sz="3200" dirty="0" smtClean="0"/>
+              <a:t>Current charts are:</a:t>
+            </a:r>
+            <a:endParaRPr lang="en-US" sz="2800" dirty="0" smtClean="0">
+              <a:solidFill>
+                <a:prstClr val="black"/>
+              </a:solidFill>
+            </a:endParaRPr>
+          </a:p>
+          <a:p>
+            <a:pPr marL="742950" lvl="1" indent="-285750">
+              <a:spcBef>
+                <a:spcPct val="20000"/>
+              </a:spcBef>
+              <a:buFont typeface="Arial"/>
+              <a:buChar char="–"/>
+            </a:pPr>
+            <a:r>
+              <a:rPr lang="en-US" sz="2800" dirty="0" smtClean="0">
+                <a:solidFill>
+                  <a:prstClr val="black"/>
+                </a:solidFill>
+              </a:rPr>
+              <a:t>hard-to-plot </a:t>
+            </a:r>
+          </a:p>
+          <a:p>
+            <a:pPr marL="742950" lvl="1" indent="-285750">
+              <a:spcBef>
+                <a:spcPct val="20000"/>
+              </a:spcBef>
+              <a:buFont typeface="Arial"/>
+              <a:buChar char="–"/>
+            </a:pPr>
+            <a:r>
+              <a:rPr lang="en-US" sz="2800" dirty="0" smtClean="0">
+                <a:solidFill>
+                  <a:prstClr val="black"/>
+                </a:solidFill>
+              </a:rPr>
+              <a:t>hard-to-read</a:t>
+            </a:r>
+          </a:p>
+          <a:p>
+            <a:pPr marL="1200150" lvl="2" indent="-285750">
+              <a:spcBef>
+                <a:spcPct val="20000"/>
+              </a:spcBef>
+              <a:buFont typeface="Arial"/>
+              <a:buChar char="–"/>
+            </a:pPr>
+            <a:r>
+              <a:rPr lang="en-US" sz="2800" dirty="0" smtClean="0">
+                <a:solidFill>
+                  <a:prstClr val="black"/>
+                </a:solidFill>
+              </a:rPr>
+              <a:t>does not provide exact percentiles</a:t>
+            </a:r>
+          </a:p>
+          <a:p>
+            <a:pPr marL="742950" lvl="1" indent="-285750">
+              <a:spcBef>
+                <a:spcPct val="20000"/>
+              </a:spcBef>
+              <a:buFont typeface="Arial"/>
+              <a:buChar char="–"/>
+            </a:pPr>
+            <a:r>
+              <a:rPr lang="en-US" sz="2800" dirty="0" smtClean="0">
+                <a:solidFill>
+                  <a:prstClr val="black"/>
+                </a:solidFill>
+              </a:rPr>
+              <a:t>not available to the families</a:t>
+            </a:r>
+          </a:p>
+          <a:p>
+            <a:pPr marL="742950" lvl="1" indent="-285750">
+              <a:spcBef>
+                <a:spcPct val="20000"/>
+              </a:spcBef>
+              <a:buFont typeface="Arial"/>
+              <a:buChar char="–"/>
+            </a:pPr>
+            <a:r>
+              <a:rPr lang="en-US" sz="2800" dirty="0" smtClean="0">
+                <a:solidFill>
+                  <a:prstClr val="black"/>
+                </a:solidFill>
+              </a:rPr>
+              <a:t>incomplete</a:t>
+            </a:r>
+          </a:p>
+          <a:p>
+            <a:pPr marL="1200150" lvl="2" indent="-285750">
+              <a:spcBef>
+                <a:spcPct val="20000"/>
+              </a:spcBef>
+              <a:buFont typeface="Arial"/>
+              <a:buChar char="–"/>
+            </a:pPr>
+            <a:r>
+              <a:rPr lang="en-US" sz="2800" dirty="0" smtClean="0">
+                <a:solidFill>
+                  <a:prstClr val="black"/>
+                </a:solidFill>
+              </a:rPr>
+              <a:t>living in different places</a:t>
+            </a:r>
+          </a:p>
+          <a:p>
+            <a:endParaRPr lang="en-US" dirty="0"/>
+          </a:p>
+        </p:txBody>
+      </p:sp>
+      <p:sp>
+        <p:nvSpPr>
+          <p:cNvPr id="4" name="Slide Number Placeholder 3"/>
+          <p:cNvSpPr>
+            <a:spLocks noGrp="1"/>
+          </p:cNvSpPr>
+          <p:nvPr>
+            <p:ph type="sldNum" sz="quarter" idx="10"/>
+          </p:nvPr>
+        </p:nvSpPr>
+        <p:spPr/>
+        <p:txBody>
+          <a:bodyPr/>
+          <a:lstStyle/>
+          <a:p>
+            <a:fld id="{E1159CB3-932F-C14D-8E49-A78F6374A8D6}" type="slidenum">
+              <a:rPr lang="en-US" smtClean="0"/>
+              <a:t>5</a:t>
+            </a:fld>
+            <a:endParaRPr lang="en-US"/>
+          </a:p>
+        </p:txBody>
+      </p:sp>
+    </p:spTree>
+    <p:extLst>
+      <p:ext uri="{BB962C8B-B14F-4D97-AF65-F5344CB8AC3E}">
+        <p14:creationId xmlns:p14="http://schemas.microsoft.com/office/powerpoint/2010/main" val="2127494680"/>
+      </p:ext>
+    </p:extLst>
+  </p:cSld>
+  <p:clrMapOvr>
+    <a:masterClrMapping/>
+  </p:clrMapOvr>
+</p:notes>
+</file>
+
+<file path=ppt/notesSlides/notesSlide4.xml><?xml version="1.0" encoding="utf-8"?>
+<p:notes xmlns:a="http://schemas.openxmlformats.org/drawingml/2006/main" xmlns:r="http://schemas.openxmlformats.org/officeDocument/2006/relationships" xmlns:p="http://schemas.openxmlformats.org/presentationml/2006/main">
+  <p:cSld>
+    <p:spTree>
+      <p:nvGrpSpPr>
+        <p:cNvPr id="1" name=""/>
+        <p:cNvGrpSpPr/>
+        <p:nvPr/>
+      </p:nvGrpSpPr>
+      <p:grpSpPr>
+        <a:xfrm>
+          <a:off x="0" y="0"/>
+          <a:ext cx="0" cy="0"/>
+          <a:chOff x="0" y="0"/>
+          <a:chExt cx="0" cy="0"/>
+        </a:xfrm>
+      </p:grpSpPr>
+      <p:sp>
+        <p:nvSpPr>
+          <p:cNvPr id="2" name="Slide Image Placeholder 1"/>
+          <p:cNvSpPr>
+            <a:spLocks noGrp="1" noRot="1" noChangeAspect="1"/>
+          </p:cNvSpPr>
+          <p:nvPr>
+            <p:ph type="sldImg"/>
+          </p:nvPr>
+        </p:nvSpPr>
+        <p:spPr/>
+      </p:sp>
+      <p:sp>
+        <p:nvSpPr>
+          <p:cNvPr id="3" name="Notes Placeholder 2"/>
+          <p:cNvSpPr>
+            <a:spLocks noGrp="1"/>
+          </p:cNvSpPr>
+          <p:nvPr>
+            <p:ph type="body" idx="1"/>
+          </p:nvPr>
+        </p:nvSpPr>
+        <p:spPr/>
+        <p:txBody>
+          <a:bodyPr/>
+          <a:lstStyle/>
+          <a:p>
             <a:r>
               <a:rPr lang="en-US" dirty="0" smtClean="0"/>
-              <a:t>Make it easy for patients to input and share the data</a:t>
-            </a:r>
-          </a:p>
-          <a:p>
+              <a:t>Shortcomings include:</a:t>
+            </a:r>
+          </a:p>
+          <a:p>
+            <a:pPr lvl="1"/>
             <a:r>
               <a:rPr lang="en-US" dirty="0" smtClean="0"/>
-              <a:t>(Include the multiple growth points) </a:t>
-            </a:r>
-          </a:p>
-          <a:p>
+              <a:t>Does not store the information</a:t>
+            </a:r>
+          </a:p>
+          <a:p>
+            <a:pPr lvl="1"/>
             <a:r>
               <a:rPr lang="en-US" dirty="0" smtClean="0"/>
-              <a:t>(Ability to switch between curves)</a:t>
-            </a:r>
-          </a:p>
-          <a:p>
+              <a:t>Can’t access it from certain devices</a:t>
+            </a:r>
+          </a:p>
+          <a:p>
+            <a:pPr lvl="1"/>
             <a:r>
               <a:rPr lang="en-US" dirty="0" smtClean="0"/>
-              <a:t>Visually appealing (graphs)</a:t>
-            </a:r>
-          </a:p>
-          <a:p>
+              <a:t>Cost</a:t>
+            </a:r>
+          </a:p>
+          <a:p>
+            <a:pPr lvl="2"/>
             <a:r>
               <a:rPr lang="en-US" dirty="0" smtClean="0"/>
-              <a:t>Maintaining accuracy (tables + calculations)</a:t>
+              <a:t>Limiting # of children</a:t>
+            </a:r>
+          </a:p>
+          <a:p>
+            <a:pPr lvl="2"/>
+            <a:r>
+              <a:rPr lang="en-US" dirty="0" smtClean="0"/>
+              <a:t>Advertisements in the way</a:t>
+            </a:r>
+          </a:p>
+          <a:p>
+            <a:pPr lvl="1"/>
+            <a:r>
+              <a:rPr lang="en-US" dirty="0" smtClean="0"/>
+              <a:t>Not user-friendly</a:t>
+            </a:r>
+          </a:p>
+          <a:p>
+            <a:pPr lvl="1"/>
+            <a:r>
+              <a:rPr lang="en-US" dirty="0" smtClean="0"/>
+              <a:t>Not share-able</a:t>
+            </a:r>
+          </a:p>
+          <a:p>
+            <a:pPr lvl="1"/>
+            <a:r>
+              <a:rPr lang="en-US" dirty="0" smtClean="0"/>
+              <a:t>Metrics not right</a:t>
+            </a:r>
+          </a:p>
+          <a:p>
+            <a:pPr lvl="1"/>
+            <a:r>
+              <a:rPr lang="en-US" dirty="0" smtClean="0"/>
+              <a:t>Doesn’t include WHO Canadian curves</a:t>
             </a:r>
           </a:p>
           <a:p>
@@ -937,6 +1125,120 @@
             <a:fld id="{E1159CB3-932F-C14D-8E49-A78F6374A8D6}" type="slidenum">
               <a:rPr lang="en-US" smtClean="0"/>
               <a:t>6</a:t>
+            </a:fld>
+            <a:endParaRPr lang="en-US"/>
+          </a:p>
+        </p:txBody>
+      </p:sp>
+    </p:spTree>
+    <p:extLst>
+      <p:ext uri="{BB962C8B-B14F-4D97-AF65-F5344CB8AC3E}">
+        <p14:creationId xmlns:p14="http://schemas.microsoft.com/office/powerpoint/2010/main" val="3011414378"/>
+      </p:ext>
+    </p:extLst>
+  </p:cSld>
+  <p:clrMapOvr>
+    <a:masterClrMapping/>
+  </p:clrMapOvr>
+</p:notes>
+</file>
+
+<file path=ppt/notesSlides/notesSlide5.xml><?xml version="1.0" encoding="utf-8"?>
+<p:notes xmlns:a="http://schemas.openxmlformats.org/drawingml/2006/main" xmlns:r="http://schemas.openxmlformats.org/officeDocument/2006/relationships" xmlns:p="http://schemas.openxmlformats.org/presentationml/2006/main">
+  <p:cSld>
+    <p:spTree>
+      <p:nvGrpSpPr>
+        <p:cNvPr id="1" name=""/>
+        <p:cNvGrpSpPr/>
+        <p:nvPr/>
+      </p:nvGrpSpPr>
+      <p:grpSpPr>
+        <a:xfrm>
+          <a:off x="0" y="0"/>
+          <a:ext cx="0" cy="0"/>
+          <a:chOff x="0" y="0"/>
+          <a:chExt cx="0" cy="0"/>
+        </a:xfrm>
+      </p:grpSpPr>
+      <p:sp>
+        <p:nvSpPr>
+          <p:cNvPr id="2" name="Slide Image Placeholder 1"/>
+          <p:cNvSpPr>
+            <a:spLocks noGrp="1" noRot="1" noChangeAspect="1"/>
+          </p:cNvSpPr>
+          <p:nvPr>
+            <p:ph type="sldImg"/>
+          </p:nvPr>
+        </p:nvSpPr>
+        <p:spPr/>
+      </p:sp>
+      <p:sp>
+        <p:nvSpPr>
+          <p:cNvPr id="3" name="Notes Placeholder 2"/>
+          <p:cNvSpPr>
+            <a:spLocks noGrp="1"/>
+          </p:cNvSpPr>
+          <p:nvPr>
+            <p:ph type="body" idx="1"/>
+          </p:nvPr>
+        </p:nvSpPr>
+        <p:spPr/>
+        <p:txBody>
+          <a:bodyPr/>
+          <a:lstStyle/>
+          <a:p>
+            <a:r>
+              <a:rPr lang="en-US" dirty="0" smtClean="0"/>
+              <a:t>Make it easy for patients to input and share the data</a:t>
+            </a:r>
+          </a:p>
+          <a:p>
+            <a:r>
+              <a:rPr lang="en-US" dirty="0" smtClean="0"/>
+              <a:t>(Include the multiple growth points) </a:t>
+            </a:r>
+          </a:p>
+          <a:p>
+            <a:r>
+              <a:rPr lang="en-US" dirty="0" smtClean="0"/>
+              <a:t>(Ability to switch between curves)</a:t>
+            </a:r>
+          </a:p>
+          <a:p>
+            <a:r>
+              <a:rPr lang="en-US" dirty="0" smtClean="0"/>
+              <a:t>Visually appealing (graphs)</a:t>
+            </a:r>
+          </a:p>
+          <a:p>
+            <a:r>
+              <a:rPr lang="en-US" dirty="0" smtClean="0"/>
+              <a:t>Maintaining accuracy (tables + calculations)</a:t>
+            </a:r>
+          </a:p>
+          <a:p>
+            <a:endParaRPr lang="en-US" dirty="0"/>
+          </a:p>
+        </p:txBody>
+      </p:sp>
+      <p:sp>
+        <p:nvSpPr>
+          <p:cNvPr id="4" name="Slide Number Placeholder 3"/>
+          <p:cNvSpPr>
+            <a:spLocks noGrp="1"/>
+          </p:cNvSpPr>
+          <p:nvPr>
+            <p:ph type="sldNum" sz="quarter" idx="10"/>
+          </p:nvPr>
+        </p:nvSpPr>
+        <p:spPr/>
+        <p:txBody>
+          <a:bodyPr/>
+          <a:lstStyle/>
+          <a:p>
+            <a:fld id="{E1159CB3-932F-C14D-8E49-A78F6374A8D6}" type="slidenum">
+              <a:rPr lang="en-US" smtClean="0"/>
+              <a:t>7</a:t>
             </a:fld>
             <a:endParaRPr lang="en-US"/>
           </a:p>
@@ -3985,7 +4287,7 @@
           <a:p>
             <a:r>
               <a:rPr lang="en-US" dirty="0" smtClean="0"/>
-              <a:t>Impact</a:t>
+              <a:t>Feedback</a:t>
             </a:r>
             <a:endParaRPr lang="en-US" dirty="0"/>
           </a:p>
@@ -4003,18 +4305,43 @@
         </p:nvSpPr>
         <p:spPr/>
         <p:txBody>
-          <a:bodyPr/>
+          <a:bodyPr>
+            <a:normAutofit fontScale="92500" lnSpcReduction="20000"/>
+          </a:bodyPr>
           <a:lstStyle/>
           <a:p>
             <a:r>
               <a:rPr lang="en-US" dirty="0" smtClean="0"/>
-              <a:t>Having accurate growth data available to families and clinicians</a:t>
-            </a:r>
-          </a:p>
-          <a:p>
+              <a:t>“ It would be a more convenient way of keeping track of growth compared to the immunization chart”</a:t>
+            </a:r>
+          </a:p>
+          <a:p>
+            <a:pPr lvl="1"/>
             <a:r>
               <a:rPr lang="en-US" dirty="0" smtClean="0"/>
-              <a:t>(example)</a:t>
+              <a:t>XX, Parent of </a:t>
+            </a:r>
+          </a:p>
+          <a:p>
+            <a:pPr lvl="1"/>
+            <a:endParaRPr lang="en-US" dirty="0"/>
+          </a:p>
+          <a:p>
+            <a:pPr lvl="1"/>
+            <a:r>
+              <a:rPr lang="en-US" dirty="0" smtClean="0"/>
+              <a:t>As a parent of a child with a chronic condition, it provides me ease of mind to see my child’s growth and development – </a:t>
+            </a:r>
+          </a:p>
+          <a:p>
+            <a:pPr lvl="1"/>
+            <a:endParaRPr lang="en-US" dirty="0"/>
+          </a:p>
+          <a:p>
+            <a:pPr lvl="1"/>
+            <a:r>
+              <a:rPr lang="en-US" dirty="0" smtClean="0"/>
+              <a:t>“This is great first step that enables parents to take charge of their children’s health.”</a:t>
             </a:r>
             <a:endParaRPr lang="en-US" dirty="0"/>
           </a:p>
@@ -4098,7 +4425,7 @@
           <a:p>
             <a:r>
               <a:rPr lang="en-US" dirty="0" smtClean="0"/>
-              <a:t>Applications</a:t>
+              <a:t>Impact</a:t>
             </a:r>
             <a:endParaRPr lang="en-US" dirty="0"/>
           </a:p>
@@ -4121,20 +4448,14 @@
           <a:p>
             <a:r>
               <a:rPr lang="en-US" dirty="0" smtClean="0"/>
-              <a:t>Open source project</a:t>
-            </a:r>
-          </a:p>
-          <a:p>
-            <a:pPr lvl="1"/>
+              <a:t>Having accurate growth data available to families and clinicians</a:t>
+            </a:r>
+          </a:p>
+          <a:p>
             <a:r>
               <a:rPr lang="en-US" dirty="0" smtClean="0"/>
-              <a:t>able to integrate with other health-focused applications</a:t>
-            </a:r>
-          </a:p>
-          <a:p>
-            <a:pPr lvl="1">
-              <a:buNone/>
-            </a:pPr>
+              <a:t>(example)</a:t>
+            </a:r>
             <a:endParaRPr lang="en-US" dirty="0"/>
           </a:p>
         </p:txBody>
@@ -4238,7 +4559,51 @@
           <a:bodyPr/>
           <a:lstStyle/>
           <a:p>
-            <a:endParaRPr lang="en-US" dirty="0"/>
+            <a:r>
+              <a:rPr lang="en-US" dirty="0" smtClean="0"/>
+              <a:t>Implement different growth curves</a:t>
+            </a:r>
+          </a:p>
+          <a:p>
+            <a:pPr lvl="1"/>
+            <a:r>
+              <a:rPr lang="en-US" dirty="0" smtClean="0"/>
+              <a:t>E.g. Down’s Syndrome </a:t>
+            </a:r>
+          </a:p>
+          <a:p>
+            <a:pPr lvl="1"/>
+            <a:r>
+              <a:rPr lang="en-US" dirty="0" smtClean="0"/>
+              <a:t>Enable physician log-in to view parent inputted growth points</a:t>
+            </a:r>
+          </a:p>
+          <a:p>
+            <a:pPr lvl="1"/>
+            <a:r>
+              <a:rPr lang="en-US" dirty="0" smtClean="0"/>
+              <a:t>Email notifications</a:t>
+            </a:r>
+          </a:p>
+          <a:p>
+            <a:pPr lvl="2"/>
+            <a:r>
+              <a:rPr lang="en-US" dirty="0" smtClean="0"/>
+              <a:t>Parents will automatically get email notifications of when to input growth information</a:t>
+            </a:r>
+          </a:p>
+          <a:p>
+            <a:pPr marL="514350" lvl="1" indent="0">
+              <a:buNone/>
+            </a:pPr>
+            <a:r>
+              <a:rPr lang="en-US" dirty="0" smtClean="0"/>
+              <a:t>- Compare data with different growth curves (e.g. CPEG, WHO)</a:t>
+            </a:r>
+          </a:p>
+          <a:p>
+            <a:pPr lvl="2"/>
+            <a:endParaRPr lang="en-US" dirty="0" smtClean="0"/>
           </a:p>
         </p:txBody>
       </p:sp>
@@ -4531,7 +4896,7 @@
           <p:nvPr/>
         </p:nvPicPr>
         <p:blipFill>
-          <a:blip r:embed="rId2"/>
+          <a:blip r:embed="rId3"/>
           <a:stretch>
             <a:fillRect/>
           </a:stretch>
@@ -4705,7 +5070,7 @@
           <p:nvPr/>
         </p:nvPicPr>
         <p:blipFill>
-          <a:blip r:embed="rId3"/>
+          <a:blip r:embed="rId4"/>
           <a:stretch>
             <a:fillRect/>
           </a:stretch>
@@ -4790,7 +5155,487 @@
             <p:ph idx="1"/>
           </p:nvPr>
         </p:nvSpPr>
-        <p:spPr/>
+        <p:spPr>
+          <a:xfrm>
+            <a:off x="457200" y="1600200"/>
+            <a:ext cx="4117669" cy="4525963"/>
+          </a:xfrm>
+        </p:spPr>
+        <p:txBody>
+          <a:bodyPr>
+            <a:normAutofit fontScale="92500" lnSpcReduction="10000"/>
+          </a:bodyPr>
+          <a:lstStyle/>
+          <a:p>
+            <a:r>
+              <a:rPr lang="en-US" dirty="0" smtClean="0"/>
+              <a:t>Appropriate growth is a measure of good health</a:t>
+            </a:r>
+          </a:p>
+          <a:p>
+            <a:r>
+              <a:rPr lang="en-US" dirty="0" smtClean="0"/>
+              <a:t>This involves serially measuring and tracking:</a:t>
+            </a:r>
+          </a:p>
+          <a:p>
+            <a:pPr lvl="1"/>
+            <a:r>
+              <a:rPr lang="en-US" dirty="0" smtClean="0"/>
+              <a:t>length/height</a:t>
+            </a:r>
+          </a:p>
+          <a:p>
+            <a:pPr lvl="1"/>
+            <a:r>
+              <a:rPr lang="en-US" dirty="0" smtClean="0"/>
+              <a:t>head circumference</a:t>
+            </a:r>
+          </a:p>
+          <a:p>
+            <a:pPr lvl="1"/>
+            <a:r>
+              <a:rPr lang="en-US" dirty="0" smtClean="0"/>
+              <a:t>weight</a:t>
+            </a:r>
+          </a:p>
+          <a:p>
+            <a:pPr lvl="1"/>
+            <a:r>
+              <a:rPr lang="en-US" dirty="0" smtClean="0"/>
+              <a:t>BMI</a:t>
+            </a:r>
+            <a:endParaRPr lang="en-US" dirty="0"/>
+          </a:p>
+        </p:txBody>
+      </p:sp>
+      <p:pic>
+        <p:nvPicPr>
+          <p:cNvPr id="4" name="Picture 3" descr="Logo_Login.png"/>
+          <p:cNvPicPr>
+            <a:picLocks noChangeAspect="1"/>
+          </p:cNvPicPr>
+          <p:nvPr/>
+        </p:nvPicPr>
+        <p:blipFill>
+          <a:blip r:embed="rId2"/>
+          <a:stretch>
+            <a:fillRect/>
+          </a:stretch>
+        </p:blipFill>
+        <p:spPr>
+          <a:xfrm>
+            <a:off x="432095" y="366633"/>
+            <a:ext cx="1584249" cy="990156"/>
+          </a:xfrm>
+          <a:prstGeom prst="rect">
+            <a:avLst/>
+          </a:prstGeom>
+        </p:spPr>
+      </p:pic>
+      <p:pic>
+        <p:nvPicPr>
+          <p:cNvPr id="5" name="Picture 4"/>
+          <p:cNvPicPr>
+            <a:picLocks noChangeAspect="1"/>
+          </p:cNvPicPr>
+          <p:nvPr/>
+        </p:nvPicPr>
+        <p:blipFill>
+          <a:blip r:embed="rId3"/>
+          <a:stretch>
+            <a:fillRect/>
+          </a:stretch>
+        </p:blipFill>
+        <p:spPr>
+          <a:xfrm>
+            <a:off x="5316170" y="1538709"/>
+            <a:ext cx="2961434" cy="4450242"/>
+          </a:xfrm>
+          <a:prstGeom prst="rect">
+            <a:avLst/>
+          </a:prstGeom>
+        </p:spPr>
+      </p:pic>
+      <p:sp>
+        <p:nvSpPr>
+          <p:cNvPr id="6" name="TextBox 5"/>
+          <p:cNvSpPr txBox="1"/>
+          <p:nvPr/>
+        </p:nvSpPr>
+        <p:spPr>
+          <a:xfrm>
+            <a:off x="5285568" y="6019070"/>
+            <a:ext cx="2961434" cy="646331"/>
+          </a:xfrm>
+          <a:prstGeom prst="rect">
+            <a:avLst/>
+          </a:prstGeom>
+          <a:noFill/>
+        </p:spPr>
+        <p:txBody>
+          <a:bodyPr wrap="square" rtlCol="0">
+            <a:spAutoFit/>
+          </a:bodyPr>
+          <a:lstStyle/>
+          <a:p>
+            <a:r>
+              <a:rPr lang="en-US" sz="1200" dirty="0"/>
+              <a:t>http://</a:t>
+            </a:r>
+            <a:r>
+              <a:rPr lang="en-US" sz="1200" dirty="0" err="1"/>
+              <a:t>www.interiorclip.com</a:t>
+            </a:r>
+            <a:r>
+              <a:rPr lang="en-US" sz="1200" dirty="0"/>
+              <a:t>/interior/961x1440/growth-chart-giraffe-via-etsy-12878.html</a:t>
+            </a:r>
+          </a:p>
+        </p:txBody>
+      </p:sp>
+    </p:spTree>
+  </p:cSld>
+  <p:clrMapOvr>
+    <a:masterClrMapping/>
+  </p:clrMapOvr>
+  <p:timing>
+    <p:tnLst>
+      <p:par>
+        <p:cTn xmlns:p14="http://schemas.microsoft.com/office/powerpoint/2010/main" id="1" dur="indefinite" restart="never" nodeType="tmRoot"/>
+      </p:par>
+    </p:tnLst>
+  </p:timing>
+</p:sld>
+</file>
+
+<file path=ppt/slides/slide4.xml><?xml version="1.0" encoding="utf-8"?>
+<p:sld xmlns:a="http://schemas.openxmlformats.org/drawingml/2006/main" xmlns:r="http://schemas.openxmlformats.org/officeDocument/2006/relationships" xmlns:p="http://schemas.openxmlformats.org/presentationml/2006/main">
+  <p:cSld>
+    <p:spTree>
+      <p:nvGrpSpPr>
+        <p:cNvPr id="1" name=""/>
+        <p:cNvGrpSpPr/>
+        <p:nvPr/>
+      </p:nvGrpSpPr>
+      <p:grpSpPr>
+        <a:xfrm>
+          <a:off x="0" y="0"/>
+          <a:ext cx="0" cy="0"/>
+          <a:chOff x="0" y="0"/>
+          <a:chExt cx="0" cy="0"/>
+        </a:xfrm>
+      </p:grpSpPr>
+      <p:pic>
+        <p:nvPicPr>
+          <p:cNvPr id="9" name="Picture 8"/>
+          <p:cNvPicPr>
+            <a:picLocks noChangeAspect="1"/>
+          </p:cNvPicPr>
+          <p:nvPr/>
+        </p:nvPicPr>
+        <p:blipFill>
+          <a:blip r:embed="rId3"/>
+          <a:stretch>
+            <a:fillRect/>
+          </a:stretch>
+        </p:blipFill>
+        <p:spPr>
+          <a:xfrm>
+            <a:off x="2869474" y="1219097"/>
+            <a:ext cx="3759621" cy="5501211"/>
+          </a:xfrm>
+          <a:prstGeom prst="rect">
+            <a:avLst/>
+          </a:prstGeom>
+        </p:spPr>
+      </p:pic>
+      <p:sp>
+        <p:nvSpPr>
+          <p:cNvPr id="2" name="Title 1"/>
+          <p:cNvSpPr>
+            <a:spLocks noGrp="1"/>
+          </p:cNvSpPr>
+          <p:nvPr>
+            <p:ph type="title"/>
+          </p:nvPr>
+        </p:nvSpPr>
+        <p:spPr>
+          <a:xfrm>
+            <a:off x="2173480" y="274638"/>
+            <a:ext cx="6513319" cy="1143000"/>
+          </a:xfrm>
+        </p:spPr>
+        <p:txBody>
+          <a:bodyPr/>
+          <a:lstStyle/>
+          <a:p>
+            <a:r>
+              <a:rPr lang="en-US" dirty="0" smtClean="0"/>
+              <a:t>Problem with Paper Charts</a:t>
+            </a:r>
+            <a:endParaRPr lang="en-US" dirty="0"/>
+          </a:p>
+        </p:txBody>
+      </p:sp>
+      <p:pic>
+        <p:nvPicPr>
+          <p:cNvPr id="4" name="Picture 3" descr="Logo_Login.png"/>
+          <p:cNvPicPr>
+            <a:picLocks noChangeAspect="1"/>
+          </p:cNvPicPr>
+          <p:nvPr/>
+        </p:nvPicPr>
+        <p:blipFill>
+          <a:blip r:embed="rId4"/>
+          <a:stretch>
+            <a:fillRect/>
+          </a:stretch>
+        </p:blipFill>
+        <p:spPr>
+          <a:xfrm>
+            <a:off x="432095" y="366633"/>
+            <a:ext cx="1584249" cy="990156"/>
+          </a:xfrm>
+          <a:prstGeom prst="rect">
+            <a:avLst/>
+          </a:prstGeom>
+        </p:spPr>
+      </p:pic>
+      <p:pic>
+        <p:nvPicPr>
+          <p:cNvPr id="7" name="Picture 6"/>
+          <p:cNvPicPr>
+            <a:picLocks noChangeAspect="1"/>
+          </p:cNvPicPr>
+          <p:nvPr/>
+        </p:nvPicPr>
+        <p:blipFill>
+          <a:blip r:embed="rId5"/>
+          <a:stretch>
+            <a:fillRect/>
+          </a:stretch>
+        </p:blipFill>
+        <p:spPr>
+          <a:xfrm>
+            <a:off x="3198646" y="2028582"/>
+            <a:ext cx="3055775" cy="4299159"/>
+          </a:xfrm>
+          <a:prstGeom prst="rect">
+            <a:avLst/>
+          </a:prstGeom>
+        </p:spPr>
+      </p:pic>
+    </p:spTree>
+  </p:cSld>
+  <p:clrMapOvr>
+    <a:masterClrMapping/>
+  </p:clrMapOvr>
+  <p:timing>
+    <p:tnLst>
+      <p:par>
+        <p:cTn xmlns:p14="http://schemas.microsoft.com/office/powerpoint/2010/main" id="1" dur="indefinite" restart="never" nodeType="tmRoot"/>
+      </p:par>
+    </p:tnLst>
+  </p:timing>
+</p:sld>
+</file>
+
+<file path=ppt/slides/slide5.xml><?xml version="1.0" encoding="utf-8"?>
+<p:sld xmlns:a="http://schemas.openxmlformats.org/drawingml/2006/main" xmlns:r="http://schemas.openxmlformats.org/officeDocument/2006/relationships" xmlns:p="http://schemas.openxmlformats.org/presentationml/2006/main">
+  <p:cSld>
+    <p:spTree>
+      <p:nvGrpSpPr>
+        <p:cNvPr id="1" name=""/>
+        <p:cNvGrpSpPr/>
+        <p:nvPr/>
+      </p:nvGrpSpPr>
+      <p:grpSpPr>
+        <a:xfrm>
+          <a:off x="0" y="0"/>
+          <a:ext cx="0" cy="0"/>
+          <a:chOff x="0" y="0"/>
+          <a:chExt cx="0" cy="0"/>
+        </a:xfrm>
+      </p:grpSpPr>
+      <p:sp>
+        <p:nvSpPr>
+          <p:cNvPr id="2" name="Title 1"/>
+          <p:cNvSpPr>
+            <a:spLocks noGrp="1"/>
+          </p:cNvSpPr>
+          <p:nvPr>
+            <p:ph type="title"/>
+          </p:nvPr>
+        </p:nvSpPr>
+        <p:spPr>
+          <a:xfrm>
+            <a:off x="2173480" y="274638"/>
+            <a:ext cx="6513319" cy="1143000"/>
+          </a:xfrm>
+        </p:spPr>
+        <p:txBody>
+          <a:bodyPr>
+            <a:normAutofit fontScale="90000"/>
+          </a:bodyPr>
+          <a:lstStyle/>
+          <a:p>
+            <a:r>
+              <a:rPr lang="en-US" dirty="0" smtClean="0"/>
+              <a:t>Problems with  Electronic Charts</a:t>
+            </a:r>
+            <a:endParaRPr lang="en-US" dirty="0"/>
+          </a:p>
+        </p:txBody>
+      </p:sp>
+      <p:pic>
+        <p:nvPicPr>
+          <p:cNvPr id="4" name="Picture 3" descr="Logo_Login.png"/>
+          <p:cNvPicPr>
+            <a:picLocks noChangeAspect="1"/>
+          </p:cNvPicPr>
+          <p:nvPr/>
+        </p:nvPicPr>
+        <p:blipFill>
+          <a:blip r:embed="rId3"/>
+          <a:stretch>
+            <a:fillRect/>
+          </a:stretch>
+        </p:blipFill>
+        <p:spPr>
+          <a:xfrm>
+            <a:off x="432095" y="366633"/>
+            <a:ext cx="1584249" cy="990156"/>
+          </a:xfrm>
+          <a:prstGeom prst="rect">
+            <a:avLst/>
+          </a:prstGeom>
+        </p:spPr>
+      </p:pic>
+      <p:pic>
+        <p:nvPicPr>
+          <p:cNvPr id="7" name="Picture 6"/>
+          <p:cNvPicPr>
+            <a:picLocks noChangeAspect="1"/>
+          </p:cNvPicPr>
+          <p:nvPr/>
+        </p:nvPicPr>
+        <p:blipFill>
+          <a:blip r:embed="rId4"/>
+          <a:stretch>
+            <a:fillRect/>
+          </a:stretch>
+        </p:blipFill>
+        <p:spPr>
+          <a:xfrm>
+            <a:off x="1376662" y="1600199"/>
+            <a:ext cx="6393821" cy="4525963"/>
+          </a:xfrm>
+          <a:prstGeom prst="rect">
+            <a:avLst/>
+          </a:prstGeom>
+        </p:spPr>
+      </p:pic>
+      <p:pic>
+        <p:nvPicPr>
+          <p:cNvPr id="6" name="Picture 5"/>
+          <p:cNvPicPr>
+            <a:picLocks noChangeAspect="1"/>
+          </p:cNvPicPr>
+          <p:nvPr/>
+        </p:nvPicPr>
+        <p:blipFill>
+          <a:blip r:embed="rId5"/>
+          <a:stretch>
+            <a:fillRect/>
+          </a:stretch>
+        </p:blipFill>
+        <p:spPr>
+          <a:xfrm>
+            <a:off x="3251357" y="2218427"/>
+            <a:ext cx="1190699" cy="1667645"/>
+          </a:xfrm>
+          <a:prstGeom prst="rect">
+            <a:avLst/>
+          </a:prstGeom>
+        </p:spPr>
+      </p:pic>
+      <p:pic>
+        <p:nvPicPr>
+          <p:cNvPr id="9" name="Picture 8"/>
+          <p:cNvPicPr>
+            <a:picLocks noChangeAspect="1"/>
+          </p:cNvPicPr>
+          <p:nvPr/>
+        </p:nvPicPr>
+        <p:blipFill rotWithShape="1">
+          <a:blip r:embed="rId6"/>
+          <a:srcRect l="39746"/>
+          <a:stretch/>
+        </p:blipFill>
+        <p:spPr>
+          <a:xfrm>
+            <a:off x="4564464" y="2218427"/>
+            <a:ext cx="1527657" cy="1673333"/>
+          </a:xfrm>
+          <a:prstGeom prst="rect">
+            <a:avLst/>
+          </a:prstGeom>
+        </p:spPr>
+      </p:pic>
+    </p:spTree>
+    <p:extLst>
+      <p:ext uri="{BB962C8B-B14F-4D97-AF65-F5344CB8AC3E}">
+        <p14:creationId xmlns:p14="http://schemas.microsoft.com/office/powerpoint/2010/main" val="1951842473"/>
+      </p:ext>
+    </p:extLst>
+  </p:cSld>
+  <p:clrMapOvr>
+    <a:masterClrMapping/>
+  </p:clrMapOvr>
+  <p:timing>
+    <p:tnLst>
+      <p:par>
+        <p:cTn xmlns:p14="http://schemas.microsoft.com/office/powerpoint/2010/main" id="1" dur="indefinite" restart="never" nodeType="tmRoot"/>
+      </p:par>
+    </p:tnLst>
+  </p:timing>
+</p:sld>
+</file>
+
+<file path=ppt/slides/slide6.xml><?xml version="1.0" encoding="utf-8"?>
+<p:sld xmlns:a="http://schemas.openxmlformats.org/drawingml/2006/main" xmlns:r="http://schemas.openxmlformats.org/officeDocument/2006/relationships" xmlns:p="http://schemas.openxmlformats.org/presentationml/2006/main">
+  <p:cSld>
+    <p:spTree>
+      <p:nvGrpSpPr>
+        <p:cNvPr id="1" name=""/>
+        <p:cNvGrpSpPr/>
+        <p:nvPr/>
+      </p:nvGrpSpPr>
+      <p:grpSpPr>
+        <a:xfrm>
+          <a:off x="0" y="0"/>
+          <a:ext cx="0" cy="0"/>
+          <a:chOff x="0" y="0"/>
+          <a:chExt cx="0" cy="0"/>
+        </a:xfrm>
+      </p:grpSpPr>
+      <p:sp>
+        <p:nvSpPr>
+          <p:cNvPr id="2" name="Title 1"/>
+          <p:cNvSpPr>
+            <a:spLocks noGrp="1"/>
+          </p:cNvSpPr>
+          <p:nvPr>
+            <p:ph type="title"/>
+          </p:nvPr>
+        </p:nvSpPr>
+        <p:spPr>
+          <a:xfrm>
+            <a:off x="2173480" y="274638"/>
+            <a:ext cx="6513319" cy="1143000"/>
+          </a:xfrm>
+        </p:spPr>
         <p:txBody>
           <a:bodyPr>
             <a:normAutofit/>
@@ -4799,43 +5644,389 @@
           <a:p>
             <a:r>
               <a:rPr lang="en-US" dirty="0" smtClean="0"/>
-              <a:t>Appropriate growth is a measure of good health</a:t>
-            </a:r>
-          </a:p>
-          <a:p>
+              <a:t>Limitations</a:t>
+            </a:r>
+            <a:endParaRPr lang="en-US" dirty="0"/>
+          </a:p>
+        </p:txBody>
+      </p:sp>
+      <p:pic>
+        <p:nvPicPr>
+          <p:cNvPr id="4" name="Picture 3" descr="Logo_Login.png"/>
+          <p:cNvPicPr>
+            <a:picLocks noChangeAspect="1"/>
+          </p:cNvPicPr>
+          <p:nvPr/>
+        </p:nvPicPr>
+        <p:blipFill>
+          <a:blip r:embed="rId3"/>
+          <a:stretch>
+            <a:fillRect/>
+          </a:stretch>
+        </p:blipFill>
+        <p:spPr>
+          <a:xfrm>
+            <a:off x="432095" y="366633"/>
+            <a:ext cx="1584249" cy="990156"/>
+          </a:xfrm>
+          <a:prstGeom prst="rect">
+            <a:avLst/>
+          </a:prstGeom>
+        </p:spPr>
+      </p:pic>
+      <p:pic>
+        <p:nvPicPr>
+          <p:cNvPr id="7" name="Picture 6" descr="Screen Shot 2015-06-18 at 7.01.50 PM.png"/>
+          <p:cNvPicPr>
+            <a:picLocks noChangeAspect="1"/>
+          </p:cNvPicPr>
+          <p:nvPr/>
+        </p:nvPicPr>
+        <p:blipFill>
+          <a:blip r:embed="rId4">
+            <a:extLst>
+              <a:ext uri="{28A0092B-C50C-407E-A947-70E740481C1C}">
+                <a14:useLocalDpi xmlns:a14="http://schemas.microsoft.com/office/drawing/2010/main" val="0"/>
+              </a:ext>
+            </a:extLst>
+          </a:blip>
+          <a:stretch>
+            <a:fillRect/>
+          </a:stretch>
+        </p:blipFill>
+        <p:spPr>
+          <a:xfrm>
+            <a:off x="592608" y="2074469"/>
+            <a:ext cx="3966960" cy="3177185"/>
+          </a:xfrm>
+          <a:prstGeom prst="rect">
+            <a:avLst/>
+          </a:prstGeom>
+        </p:spPr>
+      </p:pic>
+      <p:sp>
+        <p:nvSpPr>
+          <p:cNvPr id="8" name="TextBox 7"/>
+          <p:cNvSpPr txBox="1"/>
+          <p:nvPr/>
+        </p:nvSpPr>
+        <p:spPr>
+          <a:xfrm>
+            <a:off x="592608" y="5247727"/>
+            <a:ext cx="3966960" cy="369332"/>
+          </a:xfrm>
+          <a:prstGeom prst="rect">
+            <a:avLst/>
+          </a:prstGeom>
+          <a:noFill/>
+        </p:spPr>
+        <p:txBody>
+          <a:bodyPr wrap="square" rtlCol="0">
+            <a:spAutoFit/>
+          </a:bodyPr>
+          <a:lstStyle/>
+          <a:p>
+            <a:pPr algn="ctr"/>
             <a:r>
               <a:rPr lang="en-US" dirty="0" smtClean="0"/>
-              <a:t>This involves serially measuring and tracking:</a:t>
-            </a:r>
-          </a:p>
-          <a:p>
-            <a:pPr lvl="1"/>
+              <a:t>BC Children’s Growth Chart Plotter App</a:t>
+            </a:r>
+            <a:endParaRPr lang="en-US" dirty="0"/>
+          </a:p>
+        </p:txBody>
+      </p:sp>
+      <p:sp>
+        <p:nvSpPr>
+          <p:cNvPr id="11" name="TextBox 10"/>
+          <p:cNvSpPr txBox="1"/>
+          <p:nvPr/>
+        </p:nvSpPr>
+        <p:spPr>
+          <a:xfrm>
+            <a:off x="4945750" y="5251654"/>
+            <a:ext cx="3966960" cy="369332"/>
+          </a:xfrm>
+          <a:prstGeom prst="rect">
+            <a:avLst/>
+          </a:prstGeom>
+          <a:noFill/>
+        </p:spPr>
+        <p:txBody>
+          <a:bodyPr wrap="square" rtlCol="0">
+            <a:spAutoFit/>
+          </a:bodyPr>
+          <a:lstStyle/>
+          <a:p>
+            <a:pPr algn="ctr"/>
             <a:r>
               <a:rPr lang="en-US" dirty="0" smtClean="0"/>
-              <a:t>length/height</a:t>
-            </a:r>
-          </a:p>
-          <a:p>
-            <a:pPr lvl="1"/>
+              <a:t>Device-exclusive</a:t>
+            </a:r>
+            <a:endParaRPr lang="en-US" dirty="0"/>
+          </a:p>
+        </p:txBody>
+      </p:sp>
+      <p:pic>
+        <p:nvPicPr>
+          <p:cNvPr id="12" name="Picture 11"/>
+          <p:cNvPicPr>
+            <a:picLocks noChangeAspect="1"/>
+          </p:cNvPicPr>
+          <p:nvPr/>
+        </p:nvPicPr>
+        <p:blipFill>
+          <a:blip r:embed="rId5"/>
+          <a:stretch>
+            <a:fillRect/>
+          </a:stretch>
+        </p:blipFill>
+        <p:spPr>
+          <a:xfrm>
+            <a:off x="6013117" y="2521992"/>
+            <a:ext cx="3098666" cy="2193438"/>
+          </a:xfrm>
+          <a:prstGeom prst="rect">
+            <a:avLst/>
+          </a:prstGeom>
+        </p:spPr>
+      </p:pic>
+      <p:pic>
+        <p:nvPicPr>
+          <p:cNvPr id="10" name="Picture 9"/>
+          <p:cNvPicPr>
+            <a:picLocks noChangeAspect="1"/>
+          </p:cNvPicPr>
+          <p:nvPr/>
+        </p:nvPicPr>
+        <p:blipFill>
+          <a:blip r:embed="rId6"/>
+          <a:stretch>
+            <a:fillRect/>
+          </a:stretch>
+        </p:blipFill>
+        <p:spPr>
+          <a:xfrm>
+            <a:off x="5142058" y="2952802"/>
+            <a:ext cx="772936" cy="1560548"/>
+          </a:xfrm>
+          <a:prstGeom prst="rect">
+            <a:avLst/>
+          </a:prstGeom>
+        </p:spPr>
+      </p:pic>
+    </p:spTree>
+  </p:cSld>
+  <p:clrMapOvr>
+    <a:masterClrMapping/>
+  </p:clrMapOvr>
+  <p:timing>
+    <p:tnLst>
+      <p:par>
+        <p:cTn xmlns:p14="http://schemas.microsoft.com/office/powerpoint/2010/main" id="1" dur="indefinite" restart="never" nodeType="tmRoot"/>
+      </p:par>
+    </p:tnLst>
+  </p:timing>
+</p:sld>
+</file>
+
+<file path=ppt/slides/slide7.xml><?xml version="1.0" encoding="utf-8"?>
+<p:sld xmlns:a="http://schemas.openxmlformats.org/drawingml/2006/main" xmlns:r="http://schemas.openxmlformats.org/officeDocument/2006/relationships" xmlns:p="http://schemas.openxmlformats.org/presentationml/2006/main">
+  <p:cSld>
+    <p:spTree>
+      <p:nvGrpSpPr>
+        <p:cNvPr id="1" name=""/>
+        <p:cNvGrpSpPr/>
+        <p:nvPr/>
+      </p:nvGrpSpPr>
+      <p:grpSpPr>
+        <a:xfrm>
+          <a:off x="0" y="0"/>
+          <a:ext cx="0" cy="0"/>
+          <a:chOff x="0" y="0"/>
+          <a:chExt cx="0" cy="0"/>
+        </a:xfrm>
+      </p:grpSpPr>
+      <p:sp>
+        <p:nvSpPr>
+          <p:cNvPr id="2" name="Title 1"/>
+          <p:cNvSpPr>
+            <a:spLocks noGrp="1"/>
+          </p:cNvSpPr>
+          <p:nvPr>
+            <p:ph type="title"/>
+          </p:nvPr>
+        </p:nvSpPr>
+        <p:spPr>
+          <a:xfrm>
+            <a:off x="2173480" y="274638"/>
+            <a:ext cx="6513319" cy="1143000"/>
+          </a:xfrm>
+        </p:spPr>
+        <p:txBody>
+          <a:bodyPr/>
+          <a:lstStyle/>
+          <a:p>
             <a:r>
               <a:rPr lang="en-US" dirty="0" smtClean="0"/>
-              <a:t>head circumference</a:t>
-            </a:r>
-          </a:p>
-          <a:p>
-            <a:pPr lvl="1"/>
+              <a:t>Our Approach</a:t>
+            </a:r>
+            <a:endParaRPr lang="en-US" dirty="0"/>
+          </a:p>
+        </p:txBody>
+      </p:sp>
+      <p:sp>
+        <p:nvSpPr>
+          <p:cNvPr id="3" name="Content Placeholder 2"/>
+          <p:cNvSpPr>
+            <a:spLocks noGrp="1"/>
+          </p:cNvSpPr>
+          <p:nvPr>
+            <p:ph idx="1"/>
+          </p:nvPr>
+        </p:nvSpPr>
+        <p:spPr/>
+        <p:txBody>
+          <a:bodyPr/>
+          <a:lstStyle/>
+          <a:p>
             <a:r>
               <a:rPr lang="en-US" dirty="0" smtClean="0"/>
-              <a:t>weight</a:t>
-            </a:r>
-          </a:p>
-          <a:p>
-            <a:pPr lvl="1"/>
+              <a:t>Make it easy for patients to input and share the data</a:t>
+            </a:r>
+          </a:p>
+          <a:p>
+            <a:r>
+              <a:rPr lang="en-US" dirty="0"/>
+              <a:t>(</a:t>
+            </a:r>
             <a:r>
               <a:rPr lang="en-US" dirty="0" smtClean="0"/>
-              <a:t>BMI</a:t>
-            </a:r>
+              <a:t>Include the multiple growth points) </a:t>
+            </a:r>
+          </a:p>
+          <a:p>
+            <a:r>
+              <a:rPr lang="en-US" dirty="0" smtClean="0"/>
+              <a:t>(Ability to switch between curves)</a:t>
+            </a:r>
+          </a:p>
+          <a:p>
+            <a:r>
+              <a:rPr lang="en-US" dirty="0" smtClean="0"/>
+              <a:t>Visually appealing (graphs)</a:t>
+            </a:r>
+          </a:p>
+          <a:p>
+            <a:r>
+              <a:rPr lang="en-US" dirty="0" smtClean="0"/>
+              <a:t>Maintaining accuracy (tables + calculations)</a:t>
+            </a:r>
+          </a:p>
+          <a:p>
             <a:endParaRPr lang="en-US" dirty="0"/>
+          </a:p>
+        </p:txBody>
+      </p:sp>
+      <p:pic>
+        <p:nvPicPr>
+          <p:cNvPr id="4" name="Picture 3" descr="Logo_Login.png"/>
+          <p:cNvPicPr>
+            <a:picLocks noChangeAspect="1"/>
+          </p:cNvPicPr>
+          <p:nvPr/>
+        </p:nvPicPr>
+        <p:blipFill>
+          <a:blip r:embed="rId3"/>
+          <a:stretch>
+            <a:fillRect/>
+          </a:stretch>
+        </p:blipFill>
+        <p:spPr>
+          <a:xfrm>
+            <a:off x="432095" y="366633"/>
+            <a:ext cx="1584249" cy="990156"/>
+          </a:xfrm>
+          <a:prstGeom prst="rect">
+            <a:avLst/>
+          </a:prstGeom>
+        </p:spPr>
+      </p:pic>
+    </p:spTree>
+  </p:cSld>
+  <p:clrMapOvr>
+    <a:masterClrMapping/>
+  </p:clrMapOvr>
+  <p:timing>
+    <p:tnLst>
+      <p:par>
+        <p:cTn xmlns:p14="http://schemas.microsoft.com/office/powerpoint/2010/main" id="1" dur="indefinite" restart="never" nodeType="tmRoot"/>
+      </p:par>
+    </p:tnLst>
+  </p:timing>
+</p:sld>
+</file>
+
+<file path=ppt/slides/slide8.xml><?xml version="1.0" encoding="utf-8"?>
+<p:sld xmlns:a="http://schemas.openxmlformats.org/drawingml/2006/main" xmlns:r="http://schemas.openxmlformats.org/officeDocument/2006/relationships" xmlns:p="http://schemas.openxmlformats.org/presentationml/2006/main">
+  <p:cSld>
+    <p:spTree>
+      <p:nvGrpSpPr>
+        <p:cNvPr id="1" name=""/>
+        <p:cNvGrpSpPr/>
+        <p:nvPr/>
+      </p:nvGrpSpPr>
+      <p:grpSpPr>
+        <a:xfrm>
+          <a:off x="0" y="0"/>
+          <a:ext cx="0" cy="0"/>
+          <a:chOff x="0" y="0"/>
+          <a:chExt cx="0" cy="0"/>
+        </a:xfrm>
+      </p:grpSpPr>
+      <p:sp>
+        <p:nvSpPr>
+          <p:cNvPr id="2" name="Title 1"/>
+          <p:cNvSpPr>
+            <a:spLocks noGrp="1"/>
+          </p:cNvSpPr>
+          <p:nvPr>
+            <p:ph type="title"/>
+          </p:nvPr>
+        </p:nvSpPr>
+        <p:spPr>
+          <a:xfrm>
+            <a:off x="2173480" y="274638"/>
+            <a:ext cx="6513319" cy="1143000"/>
+          </a:xfrm>
+        </p:spPr>
+        <p:txBody>
+          <a:bodyPr/>
+          <a:lstStyle/>
+          <a:p>
+            <a:r>
+              <a:rPr lang="en-US" dirty="0" smtClean="0"/>
+              <a:t>Features</a:t>
+            </a:r>
+            <a:endParaRPr lang="en-US" dirty="0"/>
+          </a:p>
+        </p:txBody>
+      </p:sp>
+      <p:sp>
+        <p:nvSpPr>
+          <p:cNvPr id="3" name="Content Placeholder 2"/>
+          <p:cNvSpPr>
+            <a:spLocks noGrp="1"/>
+          </p:cNvSpPr>
+          <p:nvPr>
+            <p:ph idx="1"/>
+          </p:nvPr>
+        </p:nvSpPr>
+        <p:spPr/>
+        <p:txBody>
+          <a:bodyPr/>
+          <a:lstStyle/>
+          <a:p>
+            <a:endParaRPr lang="en-US"/>
           </a:p>
         </p:txBody>
       </p:sp>
@@ -4878,838 +6069,7 @@
 </p:sld>
 </file>
 
-<file path=ppt/slides/slide4.xml><?xml version="1.0" encoding="utf-8"?>
-<p:sld xmlns:a="http://schemas.openxmlformats.org/drawingml/2006/main" xmlns:r="http://schemas.openxmlformats.org/officeDocument/2006/relationships" xmlns:p="http://schemas.openxmlformats.org/presentationml/2006/main">
-  <p:cSld>
-    <p:spTree>
-      <p:nvGrpSpPr>
-        <p:cNvPr id="1" name=""/>
-        <p:cNvGrpSpPr/>
-        <p:nvPr/>
-      </p:nvGrpSpPr>
-      <p:grpSpPr>
-        <a:xfrm>
-          <a:off x="0" y="0"/>
-          <a:ext cx="0" cy="0"/>
-          <a:chOff x="0" y="0"/>
-          <a:chExt cx="0" cy="0"/>
-        </a:xfrm>
-      </p:grpSpPr>
-      <p:sp>
-        <p:nvSpPr>
-          <p:cNvPr id="2" name="Title 1"/>
-          <p:cNvSpPr>
-            <a:spLocks noGrp="1"/>
-          </p:cNvSpPr>
-          <p:nvPr>
-            <p:ph type="title"/>
-          </p:nvPr>
-        </p:nvSpPr>
-        <p:spPr>
-          <a:xfrm>
-            <a:off x="2173480" y="274638"/>
-            <a:ext cx="6513319" cy="1143000"/>
-          </a:xfrm>
-        </p:spPr>
-        <p:txBody>
-          <a:bodyPr/>
-          <a:lstStyle/>
-          <a:p>
-            <a:r>
-              <a:rPr lang="en-US" dirty="0" smtClean="0"/>
-              <a:t>Problem</a:t>
-            </a:r>
-            <a:endParaRPr lang="en-US" dirty="0"/>
-          </a:p>
-        </p:txBody>
-      </p:sp>
-      <p:sp>
-        <p:nvSpPr>
-          <p:cNvPr id="3" name="Content Placeholder 2"/>
-          <p:cNvSpPr>
-            <a:spLocks noGrp="1"/>
-          </p:cNvSpPr>
-          <p:nvPr>
-            <p:ph idx="1"/>
-          </p:nvPr>
-        </p:nvSpPr>
-        <p:spPr>
-          <a:xfrm>
-            <a:off x="4954158" y="1600200"/>
-            <a:ext cx="3732641" cy="4525963"/>
-          </a:xfrm>
-        </p:spPr>
-        <p:txBody>
-          <a:bodyPr/>
-          <a:lstStyle/>
-          <a:p>
-            <a:r>
-              <a:rPr lang="en-US" dirty="0" smtClean="0"/>
-              <a:t>INSERT PIC OF PAPER CHART</a:t>
-            </a:r>
-            <a:endParaRPr lang="en-US" dirty="0"/>
-          </a:p>
-        </p:txBody>
-      </p:sp>
-      <p:pic>
-        <p:nvPicPr>
-          <p:cNvPr id="4" name="Picture 3" descr="Logo_Login.png"/>
-          <p:cNvPicPr>
-            <a:picLocks noChangeAspect="1"/>
-          </p:cNvPicPr>
-          <p:nvPr/>
-        </p:nvPicPr>
-        <p:blipFill>
-          <a:blip r:embed="rId3"/>
-          <a:stretch>
-            <a:fillRect/>
-          </a:stretch>
-        </p:blipFill>
-        <p:spPr>
-          <a:xfrm>
-            <a:off x="432095" y="366633"/>
-            <a:ext cx="1584249" cy="990156"/>
-          </a:xfrm>
-          <a:prstGeom prst="rect">
-            <a:avLst/>
-          </a:prstGeom>
-        </p:spPr>
-      </p:pic>
-      <p:sp>
-        <p:nvSpPr>
-          <p:cNvPr id="5" name="Content Placeholder 2"/>
-          <p:cNvSpPr txBox="1">
-            <a:spLocks/>
-          </p:cNvSpPr>
-          <p:nvPr/>
-        </p:nvSpPr>
-        <p:spPr>
-          <a:xfrm>
-            <a:off x="851251" y="1600200"/>
-            <a:ext cx="3732641" cy="4525963"/>
-          </a:xfrm>
-          <a:prstGeom prst="rect">
-            <a:avLst/>
-          </a:prstGeom>
-        </p:spPr>
-        <p:txBody>
-          <a:bodyPr vert="horz" lIns="91440" tIns="45720" rIns="91440" bIns="45720" rtlCol="0">
-            <a:normAutofit fontScale="92500" lnSpcReduction="10000"/>
-          </a:bodyPr>
-          <a:lstStyle/>
-          <a:p>
-            <a:pPr marL="342900" marR="0" lvl="0" indent="-342900" algn="l" defTabSz="457200" rtl="0" eaLnBrk="1" fontAlgn="auto" latinLnBrk="0" hangingPunct="1">
-              <a:lnSpc>
-                <a:spcPct val="100000"/>
-              </a:lnSpc>
-              <a:spcBef>
-                <a:spcPct val="20000"/>
-              </a:spcBef>
-              <a:spcAft>
-                <a:spcPts val="0"/>
-              </a:spcAft>
-              <a:buClrTx/>
-              <a:buSzTx/>
-              <a:buFont typeface="Arial"/>
-              <a:buChar char="•"/>
-              <a:tabLst/>
-              <a:defRPr/>
-            </a:pPr>
-            <a:r>
-              <a:rPr lang="en-US" sz="3200" dirty="0" smtClean="0"/>
-              <a:t>Current charts are:</a:t>
-            </a:r>
-            <a:endParaRPr lang="en-US" sz="2800" dirty="0" smtClean="0">
-              <a:solidFill>
-                <a:prstClr val="black"/>
-              </a:solidFill>
-            </a:endParaRPr>
-          </a:p>
-          <a:p>
-            <a:pPr marL="742950" lvl="1" indent="-285750">
-              <a:spcBef>
-                <a:spcPct val="20000"/>
-              </a:spcBef>
-              <a:buFont typeface="Arial"/>
-              <a:buChar char="–"/>
-            </a:pPr>
-            <a:r>
-              <a:rPr lang="en-US" sz="2800" dirty="0">
-                <a:solidFill>
-                  <a:prstClr val="black"/>
-                </a:solidFill>
-              </a:rPr>
-              <a:t>hard-to-plot </a:t>
-            </a:r>
-          </a:p>
-          <a:p>
-            <a:pPr marL="742950" lvl="1" indent="-285750">
-              <a:spcBef>
-                <a:spcPct val="20000"/>
-              </a:spcBef>
-              <a:buFont typeface="Arial"/>
-              <a:buChar char="–"/>
-            </a:pPr>
-            <a:r>
-              <a:rPr lang="en-US" sz="2800" dirty="0" smtClean="0">
-                <a:solidFill>
-                  <a:prstClr val="black"/>
-                </a:solidFill>
-              </a:rPr>
-              <a:t>hard-to-read</a:t>
-            </a:r>
-          </a:p>
-          <a:p>
-            <a:pPr marL="1200150" lvl="2" indent="-285750">
-              <a:spcBef>
-                <a:spcPct val="20000"/>
-              </a:spcBef>
-              <a:buFont typeface="Arial"/>
-              <a:buChar char="–"/>
-            </a:pPr>
-            <a:r>
-              <a:rPr lang="en-US" sz="2800" dirty="0">
-                <a:solidFill>
-                  <a:prstClr val="black"/>
-                </a:solidFill>
-              </a:rPr>
-              <a:t>does not provide exact </a:t>
-            </a:r>
-            <a:r>
-              <a:rPr lang="en-US" sz="2800" dirty="0" smtClean="0">
-                <a:solidFill>
-                  <a:prstClr val="black"/>
-                </a:solidFill>
-              </a:rPr>
-              <a:t>percentiles</a:t>
-            </a:r>
-          </a:p>
-          <a:p>
-            <a:pPr marL="742950" lvl="1" indent="-285750">
-              <a:spcBef>
-                <a:spcPct val="20000"/>
-              </a:spcBef>
-              <a:buFont typeface="Arial"/>
-              <a:buChar char="–"/>
-            </a:pPr>
-            <a:r>
-              <a:rPr lang="en-US" sz="2800" dirty="0" smtClean="0">
-                <a:solidFill>
-                  <a:prstClr val="black"/>
-                </a:solidFill>
-              </a:rPr>
-              <a:t>not available to the families</a:t>
-            </a:r>
-          </a:p>
-          <a:p>
-            <a:pPr marL="742950" lvl="1" indent="-285750">
-              <a:spcBef>
-                <a:spcPct val="20000"/>
-              </a:spcBef>
-              <a:buFont typeface="Arial"/>
-              <a:buChar char="–"/>
-            </a:pPr>
-            <a:r>
-              <a:rPr lang="en-US" sz="2800" dirty="0" smtClean="0">
-                <a:solidFill>
-                  <a:prstClr val="black"/>
-                </a:solidFill>
-              </a:rPr>
-              <a:t>incomplete</a:t>
-            </a:r>
-          </a:p>
-          <a:p>
-            <a:pPr marL="1200150" lvl="2" indent="-285750">
-              <a:spcBef>
-                <a:spcPct val="20000"/>
-              </a:spcBef>
-              <a:buFont typeface="Arial"/>
-              <a:buChar char="–"/>
-            </a:pPr>
-            <a:r>
-              <a:rPr lang="en-US" sz="2800" dirty="0" smtClean="0">
-                <a:solidFill>
-                  <a:prstClr val="black"/>
-                </a:solidFill>
-              </a:rPr>
-              <a:t>living in different places</a:t>
-            </a:r>
-          </a:p>
-          <a:p>
-            <a:pPr marL="1200150" lvl="2" indent="-285750">
-              <a:spcBef>
-                <a:spcPct val="20000"/>
-              </a:spcBef>
-              <a:buFont typeface="Arial"/>
-              <a:buChar char="–"/>
-            </a:pPr>
-            <a:endParaRPr lang="en-US" sz="2800" dirty="0" smtClean="0">
-              <a:solidFill>
-                <a:prstClr val="black"/>
-              </a:solidFill>
-            </a:endParaRPr>
-          </a:p>
-          <a:p>
-            <a:pPr marL="342900" marR="0" lvl="0" indent="-342900" algn="l" defTabSz="457200" rtl="0" eaLnBrk="1" fontAlgn="auto" latinLnBrk="0" hangingPunct="1">
-              <a:lnSpc>
-                <a:spcPct val="100000"/>
-              </a:lnSpc>
-              <a:spcBef>
-                <a:spcPct val="20000"/>
-              </a:spcBef>
-              <a:spcAft>
-                <a:spcPts val="0"/>
-              </a:spcAft>
-              <a:buClrTx/>
-              <a:buSzTx/>
-              <a:tabLst/>
-              <a:defRPr/>
-            </a:pPr>
-            <a:endParaRPr lang="en-US" sz="3200" dirty="0" smtClean="0"/>
-          </a:p>
-        </p:txBody>
-      </p:sp>
-    </p:spTree>
-  </p:cSld>
-  <p:clrMapOvr>
-    <a:masterClrMapping/>
-  </p:clrMapOvr>
-  <p:timing>
-    <p:tnLst>
-      <p:par>
-        <p:cTn xmlns:p14="http://schemas.microsoft.com/office/powerpoint/2010/main" id="1" dur="indefinite" restart="never" nodeType="tmRoot"/>
-      </p:par>
-    </p:tnLst>
-  </p:timing>
-</p:sld>
-</file>
-
-<file path=ppt/slides/slide5.xml><?xml version="1.0" encoding="utf-8"?>
-<p:sld xmlns:a="http://schemas.openxmlformats.org/drawingml/2006/main" xmlns:r="http://schemas.openxmlformats.org/officeDocument/2006/relationships" xmlns:p="http://schemas.openxmlformats.org/presentationml/2006/main">
-  <p:cSld>
-    <p:spTree>
-      <p:nvGrpSpPr>
-        <p:cNvPr id="1" name=""/>
-        <p:cNvGrpSpPr/>
-        <p:nvPr/>
-      </p:nvGrpSpPr>
-      <p:grpSpPr>
-        <a:xfrm>
-          <a:off x="0" y="0"/>
-          <a:ext cx="0" cy="0"/>
-          <a:chOff x="0" y="0"/>
-          <a:chExt cx="0" cy="0"/>
-        </a:xfrm>
-      </p:grpSpPr>
-      <p:sp>
-        <p:nvSpPr>
-          <p:cNvPr id="2" name="Title 1"/>
-          <p:cNvSpPr>
-            <a:spLocks noGrp="1"/>
-          </p:cNvSpPr>
-          <p:nvPr>
-            <p:ph type="title"/>
-          </p:nvPr>
-        </p:nvSpPr>
-        <p:spPr>
-          <a:xfrm>
-            <a:off x="2173480" y="274638"/>
-            <a:ext cx="6513319" cy="1143000"/>
-          </a:xfrm>
-        </p:spPr>
-        <p:txBody>
-          <a:bodyPr/>
-          <a:lstStyle/>
-          <a:p>
-            <a:r>
-              <a:rPr lang="en-US" dirty="0" smtClean="0"/>
-              <a:t>Other Solutions</a:t>
-            </a:r>
-            <a:endParaRPr lang="en-US" dirty="0"/>
-          </a:p>
-        </p:txBody>
-      </p:sp>
-      <p:sp>
-        <p:nvSpPr>
-          <p:cNvPr id="3" name="Content Placeholder 2"/>
-          <p:cNvSpPr>
-            <a:spLocks noGrp="1"/>
-          </p:cNvSpPr>
-          <p:nvPr>
-            <p:ph idx="1"/>
-          </p:nvPr>
-        </p:nvSpPr>
-        <p:spPr>
-          <a:xfrm>
-            <a:off x="457200" y="1600200"/>
-            <a:ext cx="4688448" cy="4525963"/>
-          </a:xfrm>
-        </p:spPr>
-        <p:txBody>
-          <a:bodyPr>
-            <a:normAutofit fontScale="85000" lnSpcReduction="20000"/>
-          </a:bodyPr>
-          <a:lstStyle/>
-          <a:p>
-            <a:r>
-              <a:rPr lang="en-US" dirty="0" smtClean="0"/>
-              <a:t>Shortcomings include:</a:t>
-            </a:r>
-          </a:p>
-          <a:p>
-            <a:pPr lvl="1"/>
-            <a:r>
-              <a:rPr lang="en-US" dirty="0" smtClean="0"/>
-              <a:t>Does not store the information</a:t>
-            </a:r>
-          </a:p>
-          <a:p>
-            <a:pPr lvl="1"/>
-            <a:r>
-              <a:rPr lang="en-US" dirty="0" smtClean="0"/>
-              <a:t>Can’t access it from certain devices</a:t>
-            </a:r>
-          </a:p>
-          <a:p>
-            <a:pPr lvl="1"/>
-            <a:r>
-              <a:rPr lang="en-US" dirty="0" smtClean="0"/>
-              <a:t>Cost</a:t>
-            </a:r>
-          </a:p>
-          <a:p>
-            <a:pPr lvl="2"/>
-            <a:r>
-              <a:rPr lang="en-US" dirty="0" smtClean="0"/>
-              <a:t>Limiting # of children</a:t>
-            </a:r>
-          </a:p>
-          <a:p>
-            <a:pPr lvl="2"/>
-            <a:r>
-              <a:rPr lang="en-US" dirty="0" smtClean="0"/>
-              <a:t>Advertisements in the way</a:t>
-            </a:r>
-          </a:p>
-          <a:p>
-            <a:pPr lvl="1"/>
-            <a:r>
-              <a:rPr lang="en-US" dirty="0" smtClean="0"/>
-              <a:t>Not user-friendly</a:t>
-            </a:r>
-          </a:p>
-          <a:p>
-            <a:pPr lvl="1"/>
-            <a:r>
-              <a:rPr lang="en-US" dirty="0" smtClean="0"/>
-              <a:t>Not share-able</a:t>
-            </a:r>
-          </a:p>
-          <a:p>
-            <a:pPr lvl="1"/>
-            <a:r>
-              <a:rPr lang="en-US" dirty="0" smtClean="0"/>
-              <a:t>Metrics not right</a:t>
-            </a:r>
-          </a:p>
-          <a:p>
-            <a:pPr lvl="1"/>
-            <a:r>
-              <a:rPr lang="en-US" dirty="0" smtClean="0"/>
-              <a:t>Doesn’t include WHO Canadian curves</a:t>
-            </a:r>
-            <a:endParaRPr lang="en-US" dirty="0"/>
-          </a:p>
-        </p:txBody>
-      </p:sp>
-      <p:pic>
-        <p:nvPicPr>
-          <p:cNvPr id="4" name="Picture 3" descr="Logo_Login.png"/>
-          <p:cNvPicPr>
-            <a:picLocks noChangeAspect="1"/>
-          </p:cNvPicPr>
-          <p:nvPr/>
-        </p:nvPicPr>
-        <p:blipFill>
-          <a:blip r:embed="rId3"/>
-          <a:stretch>
-            <a:fillRect/>
-          </a:stretch>
-        </p:blipFill>
-        <p:spPr>
-          <a:xfrm>
-            <a:off x="432095" y="366633"/>
-            <a:ext cx="1584249" cy="990156"/>
-          </a:xfrm>
-          <a:prstGeom prst="rect">
-            <a:avLst/>
-          </a:prstGeom>
-        </p:spPr>
-      </p:pic>
-      <p:sp>
-        <p:nvSpPr>
-          <p:cNvPr id="5" name="Content Placeholder 2"/>
-          <p:cNvSpPr txBox="1">
-            <a:spLocks/>
-          </p:cNvSpPr>
-          <p:nvPr/>
-        </p:nvSpPr>
-        <p:spPr>
-          <a:xfrm>
-            <a:off x="4954158" y="1600200"/>
-            <a:ext cx="3732641" cy="4525963"/>
-          </a:xfrm>
-          <a:prstGeom prst="rect">
-            <a:avLst/>
-          </a:prstGeom>
-        </p:spPr>
-        <p:txBody>
-          <a:bodyPr vert="horz" lIns="91440" tIns="45720" rIns="91440" bIns="45720" rtlCol="0">
-            <a:normAutofit/>
-          </a:bodyPr>
-          <a:lstStyle/>
-          <a:p>
-            <a:pPr marL="342900" marR="0" lvl="0" indent="-342900" algn="l" defTabSz="457200" rtl="0" eaLnBrk="1" fontAlgn="auto" latinLnBrk="0" hangingPunct="1">
-              <a:lnSpc>
-                <a:spcPct val="100000"/>
-              </a:lnSpc>
-              <a:spcBef>
-                <a:spcPct val="20000"/>
-              </a:spcBef>
-              <a:spcAft>
-                <a:spcPts val="0"/>
-              </a:spcAft>
-              <a:buClrTx/>
-              <a:buSzTx/>
-              <a:buFont typeface="Arial"/>
-              <a:buChar char="•"/>
-              <a:tabLst/>
-              <a:defRPr/>
-            </a:pPr>
-            <a:r>
-              <a:rPr kumimoji="0" lang="en-US" sz="3200" b="0" i="0" u="none" strike="noStrike" kern="1200" cap="none" spc="0" normalizeH="0" baseline="0" noProof="0" dirty="0" smtClean="0">
-                <a:ln>
-                  <a:noFill/>
-                </a:ln>
-                <a:solidFill>
-                  <a:schemeClr val="tx1"/>
-                </a:solidFill>
-                <a:effectLst/>
-                <a:uLnTx/>
-                <a:uFillTx/>
-                <a:latin typeface="+mn-lt"/>
-                <a:ea typeface="+mn-ea"/>
-                <a:cs typeface="+mn-cs"/>
-              </a:rPr>
-              <a:t>INSERT PIC </a:t>
-            </a:r>
-            <a:r>
-              <a:rPr kumimoji="0" lang="en-US" sz="3200" b="0" i="0" u="none" strike="noStrike" kern="1200" cap="none" spc="0" normalizeH="0" baseline="0" noProof="0" dirty="0" smtClean="0">
-                <a:ln>
-                  <a:noFill/>
-                </a:ln>
-                <a:solidFill>
-                  <a:schemeClr val="tx1"/>
-                </a:solidFill>
-                <a:effectLst/>
-                <a:uLnTx/>
-                <a:uFillTx/>
-                <a:latin typeface="+mn-lt"/>
-                <a:ea typeface="+mn-ea"/>
-                <a:cs typeface="+mn-cs"/>
-              </a:rPr>
-              <a:t>OF</a:t>
-            </a:r>
-            <a:r>
-              <a:rPr kumimoji="0" lang="en-US" sz="3200" b="0" i="0" u="none" strike="noStrike" kern="1200" cap="none" spc="0" normalizeH="0" noProof="0" dirty="0" smtClean="0">
-                <a:ln>
-                  <a:noFill/>
-                </a:ln>
-                <a:solidFill>
-                  <a:schemeClr val="tx1"/>
-                </a:solidFill>
-                <a:effectLst/>
-                <a:uLnTx/>
-                <a:uFillTx/>
-                <a:latin typeface="+mn-lt"/>
-                <a:ea typeface="+mn-ea"/>
-                <a:cs typeface="+mn-cs"/>
-              </a:rPr>
-              <a:t> OTHER APPS/SITES</a:t>
-            </a:r>
-            <a:endParaRPr kumimoji="0" lang="en-US" sz="3200" b="0" i="0" u="none" strike="noStrike" kern="1200" cap="none" spc="0" normalizeH="0" baseline="0" noProof="0" dirty="0" smtClean="0">
-              <a:ln>
-                <a:noFill/>
-              </a:ln>
-              <a:solidFill>
-                <a:schemeClr val="tx1"/>
-              </a:solidFill>
-              <a:effectLst/>
-              <a:uLnTx/>
-              <a:uFillTx/>
-              <a:latin typeface="+mn-lt"/>
-              <a:ea typeface="+mn-ea"/>
-              <a:cs typeface="+mn-cs"/>
-            </a:endParaRPr>
-          </a:p>
-        </p:txBody>
-      </p:sp>
-    </p:spTree>
-  </p:cSld>
-  <p:clrMapOvr>
-    <a:masterClrMapping/>
-  </p:clrMapOvr>
-  <p:timing>
-    <p:tnLst>
-      <p:par>
-        <p:cTn xmlns:p14="http://schemas.microsoft.com/office/powerpoint/2010/main" id="1" dur="indefinite" restart="never" nodeType="tmRoot"/>
-      </p:par>
-    </p:tnLst>
-  </p:timing>
-</p:sld>
-</file>
-
-<file path=ppt/slides/slide6.xml><?xml version="1.0" encoding="utf-8"?>
-<p:sld xmlns:a="http://schemas.openxmlformats.org/drawingml/2006/main" xmlns:r="http://schemas.openxmlformats.org/officeDocument/2006/relationships" xmlns:p="http://schemas.openxmlformats.org/presentationml/2006/main">
-  <p:cSld>
-    <p:spTree>
-      <p:nvGrpSpPr>
-        <p:cNvPr id="1" name=""/>
-        <p:cNvGrpSpPr/>
-        <p:nvPr/>
-      </p:nvGrpSpPr>
-      <p:grpSpPr>
-        <a:xfrm>
-          <a:off x="0" y="0"/>
-          <a:ext cx="0" cy="0"/>
-          <a:chOff x="0" y="0"/>
-          <a:chExt cx="0" cy="0"/>
-        </a:xfrm>
-      </p:grpSpPr>
-      <p:sp>
-        <p:nvSpPr>
-          <p:cNvPr id="2" name="Title 1"/>
-          <p:cNvSpPr>
-            <a:spLocks noGrp="1"/>
-          </p:cNvSpPr>
-          <p:nvPr>
-            <p:ph type="title"/>
-          </p:nvPr>
-        </p:nvSpPr>
-        <p:spPr>
-          <a:xfrm>
-            <a:off x="2173480" y="274638"/>
-            <a:ext cx="6513319" cy="1143000"/>
-          </a:xfrm>
-        </p:spPr>
-        <p:txBody>
-          <a:bodyPr/>
-          <a:lstStyle/>
-          <a:p>
-            <a:r>
-              <a:rPr lang="en-US" dirty="0" smtClean="0"/>
-              <a:t>Our Approach</a:t>
-            </a:r>
-            <a:endParaRPr lang="en-US" dirty="0"/>
-          </a:p>
-        </p:txBody>
-      </p:sp>
-      <p:sp>
-        <p:nvSpPr>
-          <p:cNvPr id="3" name="Content Placeholder 2"/>
-          <p:cNvSpPr>
-            <a:spLocks noGrp="1"/>
-          </p:cNvSpPr>
-          <p:nvPr>
-            <p:ph idx="1"/>
-          </p:nvPr>
-        </p:nvSpPr>
-        <p:spPr/>
-        <p:txBody>
-          <a:bodyPr/>
-          <a:lstStyle/>
-          <a:p>
-            <a:r>
-              <a:rPr lang="en-US" dirty="0" smtClean="0"/>
-              <a:t>Make it easy for patients to input and share the data</a:t>
-            </a:r>
-          </a:p>
-          <a:p>
-            <a:r>
-              <a:rPr lang="en-US" dirty="0"/>
-              <a:t>(</a:t>
-            </a:r>
-            <a:r>
-              <a:rPr lang="en-US" dirty="0" smtClean="0"/>
-              <a:t>Include the multiple growth points) </a:t>
-            </a:r>
-          </a:p>
-          <a:p>
-            <a:r>
-              <a:rPr lang="en-US" dirty="0" smtClean="0"/>
-              <a:t>(Ability to switch between curves)</a:t>
-            </a:r>
-          </a:p>
-          <a:p>
-            <a:r>
-              <a:rPr lang="en-US" dirty="0" smtClean="0"/>
-              <a:t>Visually appealing (graphs)</a:t>
-            </a:r>
-          </a:p>
-          <a:p>
-            <a:r>
-              <a:rPr lang="en-US" dirty="0" smtClean="0"/>
-              <a:t>Maintaining accuracy (tables + calculations)</a:t>
-            </a:r>
-          </a:p>
-          <a:p>
-            <a:endParaRPr lang="en-US" dirty="0"/>
-          </a:p>
-        </p:txBody>
-      </p:sp>
-      <p:pic>
-        <p:nvPicPr>
-          <p:cNvPr id="4" name="Picture 3" descr="Logo_Login.png"/>
-          <p:cNvPicPr>
-            <a:picLocks noChangeAspect="1"/>
-          </p:cNvPicPr>
-          <p:nvPr/>
-        </p:nvPicPr>
-        <p:blipFill>
-          <a:blip r:embed="rId3"/>
-          <a:stretch>
-            <a:fillRect/>
-          </a:stretch>
-        </p:blipFill>
-        <p:spPr>
-          <a:xfrm>
-            <a:off x="432095" y="366633"/>
-            <a:ext cx="1584249" cy="990156"/>
-          </a:xfrm>
-          <a:prstGeom prst="rect">
-            <a:avLst/>
-          </a:prstGeom>
-        </p:spPr>
-      </p:pic>
-    </p:spTree>
-  </p:cSld>
-  <p:clrMapOvr>
-    <a:masterClrMapping/>
-  </p:clrMapOvr>
-  <p:timing>
-    <p:tnLst>
-      <p:par>
-        <p:cTn xmlns:p14="http://schemas.microsoft.com/office/powerpoint/2010/main" id="1" dur="indefinite" restart="never" nodeType="tmRoot"/>
-      </p:par>
-    </p:tnLst>
-  </p:timing>
-</p:sld>
-</file>
-
-<file path=ppt/slides/slide7.xml><?xml version="1.0" encoding="utf-8"?>
-<p:sld xmlns:a="http://schemas.openxmlformats.org/drawingml/2006/main" xmlns:r="http://schemas.openxmlformats.org/officeDocument/2006/relationships" xmlns:p="http://schemas.openxmlformats.org/presentationml/2006/main">
-  <p:cSld>
-    <p:spTree>
-      <p:nvGrpSpPr>
-        <p:cNvPr id="1" name=""/>
-        <p:cNvGrpSpPr/>
-        <p:nvPr/>
-      </p:nvGrpSpPr>
-      <p:grpSpPr>
-        <a:xfrm>
-          <a:off x="0" y="0"/>
-          <a:ext cx="0" cy="0"/>
-          <a:chOff x="0" y="0"/>
-          <a:chExt cx="0" cy="0"/>
-        </a:xfrm>
-      </p:grpSpPr>
-      <p:sp>
-        <p:nvSpPr>
-          <p:cNvPr id="2" name="Title 1"/>
-          <p:cNvSpPr>
-            <a:spLocks noGrp="1"/>
-          </p:cNvSpPr>
-          <p:nvPr>
-            <p:ph type="title"/>
-          </p:nvPr>
-        </p:nvSpPr>
-        <p:spPr>
-          <a:xfrm>
-            <a:off x="2173480" y="274638"/>
-            <a:ext cx="6513319" cy="1143000"/>
-          </a:xfrm>
-        </p:spPr>
-        <p:txBody>
-          <a:bodyPr/>
-          <a:lstStyle/>
-          <a:p>
-            <a:r>
-              <a:rPr lang="en-US" dirty="0" smtClean="0"/>
-              <a:t>Features</a:t>
-            </a:r>
-            <a:endParaRPr lang="en-US" dirty="0"/>
-          </a:p>
-        </p:txBody>
-      </p:sp>
-      <p:sp>
-        <p:nvSpPr>
-          <p:cNvPr id="3" name="Content Placeholder 2"/>
-          <p:cNvSpPr>
-            <a:spLocks noGrp="1"/>
-          </p:cNvSpPr>
-          <p:nvPr>
-            <p:ph idx="1"/>
-          </p:nvPr>
-        </p:nvSpPr>
-        <p:spPr/>
-        <p:txBody>
-          <a:bodyPr/>
-          <a:lstStyle/>
-          <a:p>
-            <a:endParaRPr lang="en-US"/>
-          </a:p>
-        </p:txBody>
-      </p:sp>
-      <p:pic>
-        <p:nvPicPr>
-          <p:cNvPr id="4" name="Picture 3" descr="Logo_Login.png"/>
-          <p:cNvPicPr>
-            <a:picLocks noChangeAspect="1"/>
-          </p:cNvPicPr>
-          <p:nvPr/>
-        </p:nvPicPr>
-        <p:blipFill>
-          <a:blip r:embed="rId2"/>
-          <a:stretch>
-            <a:fillRect/>
-          </a:stretch>
-        </p:blipFill>
-        <p:spPr>
-          <a:xfrm>
-            <a:off x="432095" y="366633"/>
-            <a:ext cx="1584249" cy="990156"/>
-          </a:xfrm>
-          <a:prstGeom prst="rect">
-            <a:avLst/>
-          </a:prstGeom>
-        </p:spPr>
-      </p:pic>
-    </p:spTree>
-  </p:cSld>
-  <p:clrMapOvr>
-    <a:masterClrMapping/>
-  </p:clrMapOvr>
-  <p:timing>
-    <p:tnLst>
-      <p:par>
-        <p:cTn xmlns:p14="http://schemas.microsoft.com/office/powerpoint/2010/main" id="1" dur="indefinite" restart="never" nodeType="tmRoot"/>
-      </p:par>
-    </p:tnLst>
-  </p:timing>
-</p:sld>
-</file>
-
-<file path=ppt/slides/slide8.xml><?xml version="1.0" encoding="utf-8"?>
+<file path=ppt/slides/slide9.xml><?xml version="1.0" encoding="utf-8"?>
 <p:sld xmlns:a="http://schemas.openxmlformats.org/drawingml/2006/main" xmlns:r="http://schemas.openxmlformats.org/officeDocument/2006/relationships" xmlns:p="http://schemas.openxmlformats.org/presentationml/2006/main">
   <p:cSld>
     <p:spTree>
@@ -6186,109 +6546,6 @@
           </a:p>
         </p:txBody>
       </p:sp>
-    </p:spTree>
-  </p:cSld>
-  <p:clrMapOvr>
-    <a:masterClrMapping/>
-  </p:clrMapOvr>
-  <p:timing>
-    <p:tnLst>
-      <p:par>
-        <p:cTn xmlns:p14="http://schemas.microsoft.com/office/powerpoint/2010/main" id="1" dur="indefinite" restart="never" nodeType="tmRoot"/>
-      </p:par>
-    </p:tnLst>
-  </p:timing>
-</p:sld>
-</file>
-
-<file path=ppt/slides/slide9.xml><?xml version="1.0" encoding="utf-8"?>
-<p:sld xmlns:a="http://schemas.openxmlformats.org/drawingml/2006/main" xmlns:r="http://schemas.openxmlformats.org/officeDocument/2006/relationships" xmlns:p="http://schemas.openxmlformats.org/presentationml/2006/main">
-  <p:cSld>
-    <p:spTree>
-      <p:nvGrpSpPr>
-        <p:cNvPr id="1" name=""/>
-        <p:cNvGrpSpPr/>
-        <p:nvPr/>
-      </p:nvGrpSpPr>
-      <p:grpSpPr>
-        <a:xfrm>
-          <a:off x="0" y="0"/>
-          <a:ext cx="0" cy="0"/>
-          <a:chOff x="0" y="0"/>
-          <a:chExt cx="0" cy="0"/>
-        </a:xfrm>
-      </p:grpSpPr>
-      <p:sp>
-        <p:nvSpPr>
-          <p:cNvPr id="2" name="Title 1"/>
-          <p:cNvSpPr>
-            <a:spLocks noGrp="1"/>
-          </p:cNvSpPr>
-          <p:nvPr>
-            <p:ph type="title"/>
-          </p:nvPr>
-        </p:nvSpPr>
-        <p:spPr>
-          <a:xfrm>
-            <a:off x="2173480" y="274638"/>
-            <a:ext cx="6513319" cy="1143000"/>
-          </a:xfrm>
-        </p:spPr>
-        <p:txBody>
-          <a:bodyPr/>
-          <a:lstStyle/>
-          <a:p>
-            <a:r>
-              <a:rPr lang="en-US" dirty="0" smtClean="0"/>
-              <a:t>Feedback</a:t>
-            </a:r>
-            <a:endParaRPr lang="en-US" dirty="0"/>
-          </a:p>
-        </p:txBody>
-      </p:sp>
-      <p:sp>
-        <p:nvSpPr>
-          <p:cNvPr id="3" name="Content Placeholder 2"/>
-          <p:cNvSpPr>
-            <a:spLocks noGrp="1"/>
-          </p:cNvSpPr>
-          <p:nvPr>
-            <p:ph idx="1"/>
-          </p:nvPr>
-        </p:nvSpPr>
-        <p:spPr/>
-        <p:txBody>
-          <a:bodyPr/>
-          <a:lstStyle/>
-          <a:p>
-            <a:endParaRPr lang="en-US"/>
-          </a:p>
-        </p:txBody>
-      </p:sp>
-      <p:pic>
-        <p:nvPicPr>
-          <p:cNvPr id="4" name="Picture 3" descr="Logo_Login.png"/>
-          <p:cNvPicPr>
-            <a:picLocks noChangeAspect="1"/>
-          </p:cNvPicPr>
-          <p:nvPr/>
-        </p:nvPicPr>
-        <p:blipFill>
-          <a:blip r:embed="rId2"/>
-          <a:stretch>
-            <a:fillRect/>
-          </a:stretch>
-        </p:blipFill>
-        <p:spPr>
-          <a:xfrm>
-            <a:off x="432095" y="366633"/>
-            <a:ext cx="1584249" cy="990156"/>
-          </a:xfrm>
-          <a:prstGeom prst="rect">
-            <a:avLst/>
-          </a:prstGeom>
-        </p:spPr>
-      </p:pic>
     </p:spTree>
   </p:cSld>
   <p:clrMapOvr>

</xml_diff>